<commit_message>
the day before presentation
</commit_message>
<xml_diff>
--- a/Flying flamingos_draft.pptx
+++ b/Flying flamingos_draft.pptx
@@ -9,11 +9,14 @@
     <p:sldId id="257" r:id="rId3"/>
     <p:sldId id="258" r:id="rId4"/>
     <p:sldId id="259" r:id="rId5"/>
-    <p:sldId id="266" r:id="rId6"/>
-    <p:sldId id="263" r:id="rId7"/>
-    <p:sldId id="261" r:id="rId8"/>
-    <p:sldId id="265" r:id="rId9"/>
-    <p:sldId id="264" r:id="rId10"/>
+    <p:sldId id="271" r:id="rId6"/>
+    <p:sldId id="266" r:id="rId7"/>
+    <p:sldId id="263" r:id="rId8"/>
+    <p:sldId id="261" r:id="rId9"/>
+    <p:sldId id="269" r:id="rId10"/>
+    <p:sldId id="270" r:id="rId11"/>
+    <p:sldId id="268" r:id="rId12"/>
+    <p:sldId id="264" r:id="rId13"/>
   </p:sldIdLst>
   <p:sldSz cx="9144000" cy="5143500" type="screen16x9"/>
   <p:notesSz cx="6858000" cy="9144000"/>
@@ -112,6 +115,22 @@
       </a:defRPr>
     </a:lvl9pPr>
   </p:defaultTextStyle>
+  <p:extLst>
+    <p:ext uri="{EFAFB233-063F-42B5-8137-9DF3F51BA10A}">
+      <p15:sldGuideLst xmlns:p15="http://schemas.microsoft.com/office/powerpoint/2012/main">
+        <p15:guide id="1" orient="horz" pos="1620">
+          <p15:clr>
+            <a:srgbClr val="A4A3A4"/>
+          </p15:clr>
+        </p15:guide>
+        <p15:guide id="2" pos="2880">
+          <p15:clr>
+            <a:srgbClr val="A4A3A4"/>
+          </p15:clr>
+        </p15:guide>
+      </p15:sldGuideLst>
+    </p:ext>
+  </p:extLst>
 </p:presentation>
 </file>
 
@@ -296,7 +315,7 @@
           <a:p>
             <a:fld id="{99C5D5DF-09CB-4FBB-9151-8C8679745D1E}" type="datetimeFigureOut">
               <a:rPr lang="en-US" smtClean="0"/>
-              <a:t>11/18/2016</a:t>
+              <a:t>11/22/16</a:t>
             </a:fld>
             <a:endParaRPr lang="en-US"/>
           </a:p>
@@ -466,7 +485,7 @@
           <a:p>
             <a:fld id="{99C5D5DF-09CB-4FBB-9151-8C8679745D1E}" type="datetimeFigureOut">
               <a:rPr lang="en-US" smtClean="0"/>
-              <a:t>11/18/2016</a:t>
+              <a:t>11/22/16</a:t>
             </a:fld>
             <a:endParaRPr lang="en-US"/>
           </a:p>
@@ -646,7 +665,7 @@
           <a:p>
             <a:fld id="{99C5D5DF-09CB-4FBB-9151-8C8679745D1E}" type="datetimeFigureOut">
               <a:rPr lang="en-US" smtClean="0"/>
-              <a:t>11/18/2016</a:t>
+              <a:t>11/22/16</a:t>
             </a:fld>
             <a:endParaRPr lang="en-US"/>
           </a:p>
@@ -816,7 +835,7 @@
           <a:p>
             <a:fld id="{99C5D5DF-09CB-4FBB-9151-8C8679745D1E}" type="datetimeFigureOut">
               <a:rPr lang="en-US" smtClean="0"/>
-              <a:t>11/18/2016</a:t>
+              <a:t>11/22/16</a:t>
             </a:fld>
             <a:endParaRPr lang="en-US"/>
           </a:p>
@@ -1062,7 +1081,7 @@
           <a:p>
             <a:fld id="{99C5D5DF-09CB-4FBB-9151-8C8679745D1E}" type="datetimeFigureOut">
               <a:rPr lang="en-US" smtClean="0"/>
-              <a:t>11/18/2016</a:t>
+              <a:t>11/22/16</a:t>
             </a:fld>
             <a:endParaRPr lang="en-US"/>
           </a:p>
@@ -1350,7 +1369,7 @@
           <a:p>
             <a:fld id="{99C5D5DF-09CB-4FBB-9151-8C8679745D1E}" type="datetimeFigureOut">
               <a:rPr lang="en-US" smtClean="0"/>
-              <a:t>11/18/2016</a:t>
+              <a:t>11/22/16</a:t>
             </a:fld>
             <a:endParaRPr lang="en-US"/>
           </a:p>
@@ -1772,7 +1791,7 @@
           <a:p>
             <a:fld id="{99C5D5DF-09CB-4FBB-9151-8C8679745D1E}" type="datetimeFigureOut">
               <a:rPr lang="en-US" smtClean="0"/>
-              <a:t>11/18/2016</a:t>
+              <a:t>11/22/16</a:t>
             </a:fld>
             <a:endParaRPr lang="en-US"/>
           </a:p>
@@ -1890,7 +1909,7 @@
           <a:p>
             <a:fld id="{99C5D5DF-09CB-4FBB-9151-8C8679745D1E}" type="datetimeFigureOut">
               <a:rPr lang="en-US" smtClean="0"/>
-              <a:t>11/18/2016</a:t>
+              <a:t>11/22/16</a:t>
             </a:fld>
             <a:endParaRPr lang="en-US"/>
           </a:p>
@@ -1985,7 +2004,7 @@
           <a:p>
             <a:fld id="{99C5D5DF-09CB-4FBB-9151-8C8679745D1E}" type="datetimeFigureOut">
               <a:rPr lang="en-US" smtClean="0"/>
-              <a:t>11/18/2016</a:t>
+              <a:t>11/22/16</a:t>
             </a:fld>
             <a:endParaRPr lang="en-US"/>
           </a:p>
@@ -2262,7 +2281,7 @@
           <a:p>
             <a:fld id="{99C5D5DF-09CB-4FBB-9151-8C8679745D1E}" type="datetimeFigureOut">
               <a:rPr lang="en-US" smtClean="0"/>
-              <a:t>11/18/2016</a:t>
+              <a:t>11/22/16</a:t>
             </a:fld>
             <a:endParaRPr lang="en-US"/>
           </a:p>
@@ -2515,7 +2534,7 @@
           <a:p>
             <a:fld id="{99C5D5DF-09CB-4FBB-9151-8C8679745D1E}" type="datetimeFigureOut">
               <a:rPr lang="en-US" smtClean="0"/>
-              <a:t>11/18/2016</a:t>
+              <a:t>11/22/16</a:t>
             </a:fld>
             <a:endParaRPr lang="en-US"/>
           </a:p>
@@ -2728,7 +2747,7 @@
           <a:p>
             <a:fld id="{99C5D5DF-09CB-4FBB-9151-8C8679745D1E}" type="datetimeFigureOut">
               <a:rPr lang="en-US" smtClean="0"/>
-              <a:t>11/18/2016</a:t>
+              <a:t>11/22/16</a:t>
             </a:fld>
             <a:endParaRPr lang="en-US"/>
           </a:p>
@@ -3204,6 +3223,1436 @@
   <p:clrMapOvr>
     <a:masterClrMapping/>
   </p:clrMapOvr>
+  <p:timing>
+    <p:tnLst>
+      <p:par>
+        <p:cTn id="1" dur="indefinite" restart="never" nodeType="tmRoot"/>
+      </p:par>
+    </p:tnLst>
+  </p:timing>
+</p:sld>
+</file>
+
+<file path=ppt/slides/slide10.xml><?xml version="1.0" encoding="utf-8"?>
+<p:sld xmlns:a="http://schemas.openxmlformats.org/drawingml/2006/main" xmlns:r="http://schemas.openxmlformats.org/officeDocument/2006/relationships" xmlns:p="http://schemas.openxmlformats.org/presentationml/2006/main">
+  <p:cSld>
+    <p:spTree>
+      <p:nvGrpSpPr>
+        <p:cNvPr id="1" name=""/>
+        <p:cNvGrpSpPr/>
+        <p:nvPr/>
+      </p:nvGrpSpPr>
+      <p:grpSpPr>
+        <a:xfrm>
+          <a:off x="0" y="0"/>
+          <a:ext cx="0" cy="0"/>
+          <a:chOff x="0" y="0"/>
+          <a:chExt cx="0" cy="0"/>
+        </a:xfrm>
+      </p:grpSpPr>
+      <p:sp>
+        <p:nvSpPr>
+          <p:cNvPr id="2" name="Title 1"/>
+          <p:cNvSpPr>
+            <a:spLocks noGrp="1"/>
+          </p:cNvSpPr>
+          <p:nvPr>
+            <p:ph type="title"/>
+          </p:nvPr>
+        </p:nvSpPr>
+        <p:spPr/>
+        <p:txBody>
+          <a:bodyPr>
+            <a:normAutofit/>
+          </a:bodyPr>
+          <a:lstStyle/>
+          <a:p>
+            <a:pPr algn="l"/>
+            <a:r>
+              <a:rPr lang="en-US" sz="2800" b="1" i="1" dirty="0" smtClean="0">
+                <a:latin typeface="Times New Roman" panose="02020603050405020304" pitchFamily="18" charset="0"/>
+                <a:cs typeface="Times New Roman" panose="02020603050405020304" pitchFamily="18" charset="0"/>
+              </a:rPr>
+              <a:t>Mesh </a:t>
+            </a:r>
+            <a:r>
+              <a:rPr lang="en-US" sz="2800" b="1" i="1" dirty="0" smtClean="0">
+                <a:latin typeface="Times New Roman" panose="02020603050405020304" pitchFamily="18" charset="0"/>
+                <a:cs typeface="Times New Roman" panose="02020603050405020304" pitchFamily="18" charset="0"/>
+              </a:rPr>
+              <a:t>manipulation: flamingo</a:t>
+            </a:r>
+            <a:endParaRPr lang="en-US" sz="2800" b="1" i="1" dirty="0">
+              <a:latin typeface="Times New Roman" panose="02020603050405020304" pitchFamily="18" charset="0"/>
+              <a:cs typeface="Times New Roman" panose="02020603050405020304" pitchFamily="18" charset="0"/>
+            </a:endParaRPr>
+          </a:p>
+        </p:txBody>
+      </p:sp>
+      <p:sp>
+        <p:nvSpPr>
+          <p:cNvPr id="7" name="内容占位符 6"/>
+          <p:cNvSpPr>
+            <a:spLocks noGrp="1"/>
+          </p:cNvSpPr>
+          <p:nvPr>
+            <p:ph idx="1"/>
+          </p:nvPr>
+        </p:nvSpPr>
+        <p:spPr/>
+        <p:txBody>
+          <a:bodyPr/>
+          <a:lstStyle/>
+          <a:p>
+            <a:r>
+              <a:rPr kumimoji="1" lang="en-US" altLang="zh-CN" dirty="0" smtClean="0"/>
+              <a:t>Animation: morph targets</a:t>
+            </a:r>
+          </a:p>
+          <a:p>
+            <a:pPr marL="0" indent="0">
+              <a:buNone/>
+            </a:pPr>
+            <a:endParaRPr kumimoji="1" lang="en-US" altLang="zh-CN" dirty="0" smtClean="0"/>
+          </a:p>
+          <a:p>
+            <a:endParaRPr kumimoji="1" lang="zh-CN" altLang="en-US" dirty="0"/>
+          </a:p>
+        </p:txBody>
+      </p:sp>
+      <p:sp>
+        <p:nvSpPr>
+          <p:cNvPr id="24" name="文本框 23"/>
+          <p:cNvSpPr txBox="1"/>
+          <p:nvPr/>
+        </p:nvSpPr>
+        <p:spPr>
+          <a:xfrm>
+            <a:off x="457201" y="1772534"/>
+            <a:ext cx="2962671" cy="1015663"/>
+          </a:xfrm>
+          <a:prstGeom prst="rect">
+            <a:avLst/>
+          </a:prstGeom>
+          <a:noFill/>
+        </p:spPr>
+        <p:txBody>
+          <a:bodyPr wrap="square" rtlCol="0">
+            <a:spAutoFit/>
+          </a:bodyPr>
+          <a:lstStyle>
+            <a:defPPr>
+              <a:defRPr lang="zh-HK"/>
+            </a:defPPr>
+            <a:lvl1pPr>
+              <a:defRPr kumimoji="1"/>
+            </a:lvl1pPr>
+          </a:lstStyle>
+          <a:p>
+            <a:r>
+              <a:rPr lang="en-US" altLang="zh-CN" sz="1200" dirty="0" err="1">
+                <a:latin typeface="Times New Roman" panose="02020603050405020304" pitchFamily="18" charset="0"/>
+                <a:cs typeface="Times New Roman" panose="02020603050405020304" pitchFamily="18" charset="0"/>
+              </a:rPr>
+              <a:t>var</a:t>
+            </a:r>
+            <a:r>
+              <a:rPr lang="en-US" altLang="zh-CN" sz="1200" dirty="0">
+                <a:latin typeface="Times New Roman" panose="02020603050405020304" pitchFamily="18" charset="0"/>
+                <a:cs typeface="Times New Roman" panose="02020603050405020304" pitchFamily="18" charset="0"/>
+              </a:rPr>
+              <a:t> mixer = new </a:t>
+            </a:r>
+            <a:r>
+              <a:rPr lang="en-US" altLang="zh-CN" sz="1200" dirty="0" err="1">
+                <a:latin typeface="Times New Roman" panose="02020603050405020304" pitchFamily="18" charset="0"/>
+                <a:cs typeface="Times New Roman" panose="02020603050405020304" pitchFamily="18" charset="0"/>
+              </a:rPr>
+              <a:t>THREE.AnimationMixer</a:t>
+            </a:r>
+            <a:r>
+              <a:rPr lang="en-US" altLang="zh-CN" sz="1200" dirty="0">
+                <a:latin typeface="Times New Roman" panose="02020603050405020304" pitchFamily="18" charset="0"/>
+                <a:cs typeface="Times New Roman" panose="02020603050405020304" pitchFamily="18" charset="0"/>
+              </a:rPr>
+              <a:t>( mesh </a:t>
+            </a:r>
+            <a:r>
+              <a:rPr lang="en-US" altLang="zh-CN" sz="1200" dirty="0" smtClean="0">
+                <a:latin typeface="Times New Roman" panose="02020603050405020304" pitchFamily="18" charset="0"/>
+                <a:cs typeface="Times New Roman" panose="02020603050405020304" pitchFamily="18" charset="0"/>
+              </a:rPr>
+              <a:t>); </a:t>
+            </a:r>
+            <a:r>
+              <a:rPr lang="en-US" altLang="zh-CN" sz="1200" dirty="0" err="1" smtClean="0">
+                <a:latin typeface="Times New Roman" panose="02020603050405020304" pitchFamily="18" charset="0"/>
+                <a:cs typeface="Times New Roman" panose="02020603050405020304" pitchFamily="18" charset="0"/>
+              </a:rPr>
+              <a:t>mixer.clipAction</a:t>
+            </a:r>
+            <a:r>
+              <a:rPr lang="en-US" altLang="zh-CN" sz="1200" dirty="0">
+                <a:latin typeface="Times New Roman" panose="02020603050405020304" pitchFamily="18" charset="0"/>
+                <a:cs typeface="Times New Roman" panose="02020603050405020304" pitchFamily="18" charset="0"/>
+              </a:rPr>
+              <a:t>( </a:t>
+            </a:r>
+            <a:r>
+              <a:rPr lang="en-US" altLang="zh-CN" sz="1200" dirty="0" err="1" smtClean="0">
+                <a:latin typeface="Times New Roman" panose="02020603050405020304" pitchFamily="18" charset="0"/>
+                <a:cs typeface="Times New Roman" panose="02020603050405020304" pitchFamily="18" charset="0"/>
+              </a:rPr>
+              <a:t>geometry.animations</a:t>
+            </a:r>
+            <a:r>
+              <a:rPr lang="en-US" altLang="zh-CN" sz="1200" dirty="0">
+                <a:latin typeface="Times New Roman" panose="02020603050405020304" pitchFamily="18" charset="0"/>
+                <a:cs typeface="Times New Roman" panose="02020603050405020304" pitchFamily="18" charset="0"/>
+              </a:rPr>
+              <a:t>[ 0 ] ).</a:t>
+            </a:r>
+            <a:r>
+              <a:rPr lang="en-US" altLang="zh-CN" sz="1200" dirty="0" err="1">
+                <a:latin typeface="Times New Roman" panose="02020603050405020304" pitchFamily="18" charset="0"/>
+                <a:cs typeface="Times New Roman" panose="02020603050405020304" pitchFamily="18" charset="0"/>
+              </a:rPr>
+              <a:t>setDuration</a:t>
+            </a:r>
+            <a:r>
+              <a:rPr lang="en-US" altLang="zh-CN" sz="1200" dirty="0">
+                <a:latin typeface="Times New Roman" panose="02020603050405020304" pitchFamily="18" charset="0"/>
+                <a:cs typeface="Times New Roman" panose="02020603050405020304" pitchFamily="18" charset="0"/>
+              </a:rPr>
+              <a:t>( 1 ).play</a:t>
+            </a:r>
+            <a:r>
+              <a:rPr lang="en-US" altLang="zh-CN" sz="1200" dirty="0" smtClean="0">
+                <a:latin typeface="Times New Roman" panose="02020603050405020304" pitchFamily="18" charset="0"/>
+                <a:cs typeface="Times New Roman" panose="02020603050405020304" pitchFamily="18" charset="0"/>
+              </a:rPr>
+              <a:t>();</a:t>
+            </a:r>
+          </a:p>
+          <a:p>
+            <a:r>
+              <a:rPr lang="en-US" altLang="zh-CN" sz="1200" dirty="0" smtClean="0">
+                <a:latin typeface="Times New Roman" panose="02020603050405020304" pitchFamily="18" charset="0"/>
+                <a:cs typeface="Times New Roman" panose="02020603050405020304" pitchFamily="18" charset="0"/>
+              </a:rPr>
+              <a:t> </a:t>
+            </a:r>
+            <a:r>
+              <a:rPr lang="en-US" altLang="zh-CN" sz="1200" dirty="0" err="1" smtClean="0">
+                <a:latin typeface="Times New Roman" panose="02020603050405020304" pitchFamily="18" charset="0"/>
+                <a:cs typeface="Times New Roman" panose="02020603050405020304" pitchFamily="18" charset="0"/>
+              </a:rPr>
+              <a:t>mixers.push</a:t>
+            </a:r>
+            <a:r>
+              <a:rPr lang="en-US" altLang="zh-CN" sz="1200" dirty="0">
+                <a:latin typeface="Times New Roman" panose="02020603050405020304" pitchFamily="18" charset="0"/>
+                <a:cs typeface="Times New Roman" panose="02020603050405020304" pitchFamily="18" charset="0"/>
+              </a:rPr>
+              <a:t>( mixer );</a:t>
+            </a:r>
+            <a:endParaRPr lang="zh-CN" altLang="en-US" sz="1200" dirty="0">
+              <a:latin typeface="Times New Roman" panose="02020603050405020304" pitchFamily="18" charset="0"/>
+              <a:cs typeface="Times New Roman" panose="02020603050405020304" pitchFamily="18" charset="0"/>
+            </a:endParaRPr>
+          </a:p>
+        </p:txBody>
+      </p:sp>
+      <p:sp>
+        <p:nvSpPr>
+          <p:cNvPr id="25" name="文本框 24"/>
+          <p:cNvSpPr txBox="1"/>
+          <p:nvPr/>
+        </p:nvSpPr>
+        <p:spPr>
+          <a:xfrm>
+            <a:off x="3995936" y="1772534"/>
+            <a:ext cx="5400600" cy="2308324"/>
+          </a:xfrm>
+          <a:prstGeom prst="rect">
+            <a:avLst/>
+          </a:prstGeom>
+          <a:noFill/>
+        </p:spPr>
+        <p:txBody>
+          <a:bodyPr wrap="square" rtlCol="0">
+            <a:spAutoFit/>
+          </a:bodyPr>
+          <a:lstStyle>
+            <a:defPPr>
+              <a:defRPr lang="zh-HK"/>
+            </a:defPPr>
+            <a:lvl1pPr>
+              <a:defRPr kumimoji="1"/>
+            </a:lvl1pPr>
+          </a:lstStyle>
+          <a:p>
+            <a:r>
+              <a:rPr lang="en-US" altLang="zh-CN" sz="1200" dirty="0" err="1">
+                <a:latin typeface="Times New Roman" panose="02020603050405020304" pitchFamily="18" charset="0"/>
+                <a:cs typeface="Times New Roman" panose="02020603050405020304" pitchFamily="18" charset="0"/>
+              </a:rPr>
+              <a:t>var</a:t>
+            </a:r>
+            <a:r>
+              <a:rPr lang="en-US" altLang="zh-CN" sz="1200" dirty="0">
+                <a:latin typeface="Times New Roman" panose="02020603050405020304" pitchFamily="18" charset="0"/>
+                <a:cs typeface="Times New Roman" panose="02020603050405020304" pitchFamily="18" charset="0"/>
+              </a:rPr>
+              <a:t> vertices = </a:t>
+            </a:r>
+            <a:r>
+              <a:rPr lang="en-US" altLang="zh-CN" sz="1200" dirty="0" smtClean="0">
+                <a:latin typeface="Times New Roman" panose="02020603050405020304" pitchFamily="18" charset="0"/>
+                <a:cs typeface="Times New Roman" panose="02020603050405020304" pitchFamily="18" charset="0"/>
+              </a:rPr>
+              <a:t>[];</a:t>
+            </a:r>
+          </a:p>
+          <a:p>
+            <a:r>
+              <a:rPr lang="en-US" altLang="zh-CN" sz="1200" dirty="0" smtClean="0">
+                <a:latin typeface="Times New Roman" panose="02020603050405020304" pitchFamily="18" charset="0"/>
+                <a:cs typeface="Times New Roman" panose="02020603050405020304" pitchFamily="18" charset="0"/>
+              </a:rPr>
+              <a:t> for </a:t>
+            </a:r>
+            <a:r>
+              <a:rPr lang="en-US" altLang="zh-CN" sz="1200" dirty="0">
+                <a:latin typeface="Times New Roman" panose="02020603050405020304" pitchFamily="18" charset="0"/>
+                <a:cs typeface="Times New Roman" panose="02020603050405020304" pitchFamily="18" charset="0"/>
+              </a:rPr>
+              <a:t>( </a:t>
+            </a:r>
+            <a:r>
+              <a:rPr lang="en-US" altLang="zh-CN" sz="1200" dirty="0" err="1">
+                <a:latin typeface="Times New Roman" panose="02020603050405020304" pitchFamily="18" charset="0"/>
+                <a:cs typeface="Times New Roman" panose="02020603050405020304" pitchFamily="18" charset="0"/>
+              </a:rPr>
+              <a:t>var</a:t>
+            </a:r>
+            <a:r>
+              <a:rPr lang="en-US" altLang="zh-CN" sz="1200" dirty="0">
+                <a:latin typeface="Times New Roman" panose="02020603050405020304" pitchFamily="18" charset="0"/>
+                <a:cs typeface="Times New Roman" panose="02020603050405020304" pitchFamily="18" charset="0"/>
+              </a:rPr>
+              <a:t> v = 0; v &lt; geometry2.vertices.length; v ++ ) </a:t>
+            </a:r>
+            <a:r>
+              <a:rPr lang="en-US" altLang="zh-CN" sz="1200" dirty="0" smtClean="0">
+                <a:latin typeface="Times New Roman" panose="02020603050405020304" pitchFamily="18" charset="0"/>
+                <a:cs typeface="Times New Roman" panose="02020603050405020304" pitchFamily="18" charset="0"/>
+              </a:rPr>
+              <a:t>{</a:t>
+            </a:r>
+            <a:r>
+              <a:rPr lang="en-US" altLang="zh-CN" sz="1200" dirty="0" err="1" smtClean="0">
+                <a:latin typeface="Times New Roman" panose="02020603050405020304" pitchFamily="18" charset="0"/>
+                <a:cs typeface="Times New Roman" panose="02020603050405020304" pitchFamily="18" charset="0"/>
+              </a:rPr>
+              <a:t>vertices.push</a:t>
+            </a:r>
+            <a:r>
+              <a:rPr lang="en-US" altLang="zh-CN" sz="1200" dirty="0">
+                <a:latin typeface="Times New Roman" panose="02020603050405020304" pitchFamily="18" charset="0"/>
+                <a:cs typeface="Times New Roman" panose="02020603050405020304" pitchFamily="18" charset="0"/>
+              </a:rPr>
+              <a:t>( geometry2.vertices[ v ].clone() </a:t>
+            </a:r>
+            <a:r>
+              <a:rPr lang="en-US" altLang="zh-CN" sz="1200" dirty="0" smtClean="0">
+                <a:latin typeface="Times New Roman" panose="02020603050405020304" pitchFamily="18" charset="0"/>
+                <a:cs typeface="Times New Roman" panose="02020603050405020304" pitchFamily="18" charset="0"/>
+              </a:rPr>
+              <a:t>);</a:t>
+            </a:r>
+          </a:p>
+          <a:p>
+            <a:r>
+              <a:rPr lang="en-US" altLang="zh-CN" sz="1200" dirty="0" smtClean="0">
+                <a:latin typeface="Times New Roman" panose="02020603050405020304" pitchFamily="18" charset="0"/>
+                <a:cs typeface="Times New Roman" panose="02020603050405020304" pitchFamily="18" charset="0"/>
+              </a:rPr>
+              <a:t> vertices</a:t>
+            </a:r>
+            <a:r>
+              <a:rPr lang="en-US" altLang="zh-CN" sz="1200" dirty="0">
+                <a:latin typeface="Times New Roman" panose="02020603050405020304" pitchFamily="18" charset="0"/>
+                <a:cs typeface="Times New Roman" panose="02020603050405020304" pitchFamily="18" charset="0"/>
+              </a:rPr>
+              <a:t>[ </a:t>
+            </a:r>
+            <a:r>
+              <a:rPr lang="en-US" altLang="zh-CN" sz="1200" dirty="0" err="1">
+                <a:latin typeface="Times New Roman" panose="02020603050405020304" pitchFamily="18" charset="0"/>
+                <a:cs typeface="Times New Roman" panose="02020603050405020304" pitchFamily="18" charset="0"/>
+              </a:rPr>
+              <a:t>vertices.length</a:t>
+            </a:r>
+            <a:r>
+              <a:rPr lang="en-US" altLang="zh-CN" sz="1200" dirty="0">
+                <a:latin typeface="Times New Roman" panose="02020603050405020304" pitchFamily="18" charset="0"/>
+                <a:cs typeface="Times New Roman" panose="02020603050405020304" pitchFamily="18" charset="0"/>
+              </a:rPr>
+              <a:t> - 1 ].x *= 2</a:t>
+            </a:r>
+            <a:r>
+              <a:rPr lang="en-US" altLang="zh-CN" sz="1200" dirty="0" smtClean="0">
+                <a:latin typeface="Times New Roman" panose="02020603050405020304" pitchFamily="18" charset="0"/>
+                <a:cs typeface="Times New Roman" panose="02020603050405020304" pitchFamily="18" charset="0"/>
+              </a:rPr>
+              <a:t>;</a:t>
+            </a:r>
+          </a:p>
+          <a:p>
+            <a:r>
+              <a:rPr lang="en-US" altLang="zh-CN" sz="1200" dirty="0" smtClean="0">
+                <a:latin typeface="Times New Roman" panose="02020603050405020304" pitchFamily="18" charset="0"/>
+                <a:cs typeface="Times New Roman" panose="02020603050405020304" pitchFamily="18" charset="0"/>
+              </a:rPr>
+              <a:t> vertices</a:t>
+            </a:r>
+            <a:r>
+              <a:rPr lang="en-US" altLang="zh-CN" sz="1200" dirty="0">
+                <a:latin typeface="Times New Roman" panose="02020603050405020304" pitchFamily="18" charset="0"/>
+                <a:cs typeface="Times New Roman" panose="02020603050405020304" pitchFamily="18" charset="0"/>
+              </a:rPr>
+              <a:t>[ </a:t>
+            </a:r>
+            <a:r>
+              <a:rPr lang="en-US" altLang="zh-CN" sz="1200" dirty="0" err="1">
+                <a:latin typeface="Times New Roman" panose="02020603050405020304" pitchFamily="18" charset="0"/>
+                <a:cs typeface="Times New Roman" panose="02020603050405020304" pitchFamily="18" charset="0"/>
+              </a:rPr>
+              <a:t>vertices.length</a:t>
+            </a:r>
+            <a:r>
+              <a:rPr lang="en-US" altLang="zh-CN" sz="1200" dirty="0">
+                <a:latin typeface="Times New Roman" panose="02020603050405020304" pitchFamily="18" charset="0"/>
+                <a:cs typeface="Times New Roman" panose="02020603050405020304" pitchFamily="18" charset="0"/>
+              </a:rPr>
+              <a:t> - 1 ].x *= 10*</a:t>
+            </a:r>
+            <a:r>
+              <a:rPr lang="en-US" altLang="zh-CN" sz="1200" dirty="0" err="1">
+                <a:latin typeface="Times New Roman" panose="02020603050405020304" pitchFamily="18" charset="0"/>
+                <a:cs typeface="Times New Roman" panose="02020603050405020304" pitchFamily="18" charset="0"/>
+              </a:rPr>
+              <a:t>Math.abs</a:t>
+            </a:r>
+            <a:r>
+              <a:rPr lang="en-US" altLang="zh-CN" sz="1200" dirty="0">
+                <a:latin typeface="Times New Roman" panose="02020603050405020304" pitchFamily="18" charset="0"/>
+                <a:cs typeface="Times New Roman" panose="02020603050405020304" pitchFamily="18" charset="0"/>
+              </a:rPr>
+              <a:t>(i-2.5</a:t>
+            </a:r>
+            <a:r>
+              <a:rPr lang="en-US" altLang="zh-CN" sz="1200" dirty="0" smtClean="0">
+                <a:latin typeface="Times New Roman" panose="02020603050405020304" pitchFamily="18" charset="0"/>
+                <a:cs typeface="Times New Roman" panose="02020603050405020304" pitchFamily="18" charset="0"/>
+              </a:rPr>
+              <a:t>);</a:t>
+            </a:r>
+          </a:p>
+          <a:p>
+            <a:r>
+              <a:rPr lang="en-US" altLang="zh-CN" sz="1200" dirty="0" smtClean="0">
+                <a:latin typeface="Times New Roman" panose="02020603050405020304" pitchFamily="18" charset="0"/>
+                <a:cs typeface="Times New Roman" panose="02020603050405020304" pitchFamily="18" charset="0"/>
+              </a:rPr>
+              <a:t> vertices</a:t>
+            </a:r>
+            <a:r>
+              <a:rPr lang="en-US" altLang="zh-CN" sz="1200" dirty="0">
+                <a:latin typeface="Times New Roman" panose="02020603050405020304" pitchFamily="18" charset="0"/>
+                <a:cs typeface="Times New Roman" panose="02020603050405020304" pitchFamily="18" charset="0"/>
+              </a:rPr>
+              <a:t>[ </a:t>
+            </a:r>
+            <a:r>
+              <a:rPr lang="en-US" altLang="zh-CN" sz="1200" dirty="0" err="1">
+                <a:latin typeface="Times New Roman" panose="02020603050405020304" pitchFamily="18" charset="0"/>
+                <a:cs typeface="Times New Roman" panose="02020603050405020304" pitchFamily="18" charset="0"/>
+              </a:rPr>
+              <a:t>vertices.length</a:t>
+            </a:r>
+            <a:r>
+              <a:rPr lang="en-US" altLang="zh-CN" sz="1200" dirty="0">
+                <a:latin typeface="Times New Roman" panose="02020603050405020304" pitchFamily="18" charset="0"/>
+                <a:cs typeface="Times New Roman" panose="02020603050405020304" pitchFamily="18" charset="0"/>
+              </a:rPr>
+              <a:t> - 1 ].z *= </a:t>
+            </a:r>
+            <a:r>
+              <a:rPr lang="en-US" altLang="zh-CN" sz="1200" dirty="0" smtClean="0">
+                <a:latin typeface="Times New Roman" panose="02020603050405020304" pitchFamily="18" charset="0"/>
+                <a:cs typeface="Times New Roman" panose="02020603050405020304" pitchFamily="18" charset="0"/>
+              </a:rPr>
+              <a:t>2;</a:t>
+            </a:r>
+          </a:p>
+          <a:p>
+            <a:r>
+              <a:rPr lang="en-US" altLang="zh-CN" sz="1200" dirty="0" smtClean="0">
+                <a:latin typeface="Times New Roman" panose="02020603050405020304" pitchFamily="18" charset="0"/>
+                <a:cs typeface="Times New Roman" panose="02020603050405020304" pitchFamily="18" charset="0"/>
+              </a:rPr>
+              <a:t>geometry2.morphTargets.push</a:t>
+            </a:r>
+            <a:r>
+              <a:rPr lang="en-US" altLang="zh-CN" sz="1200" dirty="0">
+                <a:latin typeface="Times New Roman" panose="02020603050405020304" pitchFamily="18" charset="0"/>
+                <a:cs typeface="Times New Roman" panose="02020603050405020304" pitchFamily="18" charset="0"/>
+              </a:rPr>
+              <a:t>( { name: "target" + </a:t>
+            </a:r>
+            <a:r>
+              <a:rPr lang="en-US" altLang="zh-CN" sz="1200" dirty="0" err="1">
+                <a:latin typeface="Times New Roman" panose="02020603050405020304" pitchFamily="18" charset="0"/>
+                <a:cs typeface="Times New Roman" panose="02020603050405020304" pitchFamily="18" charset="0"/>
+              </a:rPr>
+              <a:t>i</a:t>
+            </a:r>
+            <a:r>
+              <a:rPr lang="en-US" altLang="zh-CN" sz="1200" dirty="0">
+                <a:latin typeface="Times New Roman" panose="02020603050405020304" pitchFamily="18" charset="0"/>
+                <a:cs typeface="Times New Roman" panose="02020603050405020304" pitchFamily="18" charset="0"/>
+              </a:rPr>
+              <a:t>, vertices: vertices } </a:t>
+            </a:r>
+            <a:r>
+              <a:rPr lang="en-US" altLang="zh-CN" sz="1200" dirty="0" smtClean="0">
+                <a:latin typeface="Times New Roman" panose="02020603050405020304" pitchFamily="18" charset="0"/>
+                <a:cs typeface="Times New Roman" panose="02020603050405020304" pitchFamily="18" charset="0"/>
+              </a:rPr>
+              <a:t>);</a:t>
+            </a:r>
+          </a:p>
+          <a:p>
+            <a:endParaRPr lang="en-US" altLang="zh-CN" sz="1200" dirty="0">
+              <a:latin typeface="Times New Roman" panose="02020603050405020304" pitchFamily="18" charset="0"/>
+              <a:cs typeface="Times New Roman" panose="02020603050405020304" pitchFamily="18" charset="0"/>
+            </a:endParaRPr>
+          </a:p>
+          <a:p>
+            <a:r>
+              <a:rPr lang="en-US" altLang="zh-CN" sz="1200" dirty="0" err="1">
+                <a:latin typeface="Times New Roman" panose="02020603050405020304" pitchFamily="18" charset="0"/>
+                <a:cs typeface="Times New Roman" panose="02020603050405020304" pitchFamily="18" charset="0"/>
+              </a:rPr>
+              <a:t>var</a:t>
+            </a:r>
+            <a:r>
+              <a:rPr lang="en-US" altLang="zh-CN" sz="1200" dirty="0">
+                <a:latin typeface="Times New Roman" panose="02020603050405020304" pitchFamily="18" charset="0"/>
+                <a:cs typeface="Times New Roman" panose="02020603050405020304" pitchFamily="18" charset="0"/>
+              </a:rPr>
+              <a:t> mixer = new </a:t>
+            </a:r>
+            <a:r>
+              <a:rPr lang="en-US" altLang="zh-CN" sz="1200" dirty="0" err="1">
+                <a:latin typeface="Times New Roman" panose="02020603050405020304" pitchFamily="18" charset="0"/>
+                <a:cs typeface="Times New Roman" panose="02020603050405020304" pitchFamily="18" charset="0"/>
+              </a:rPr>
+              <a:t>THREE.AnimationMixer</a:t>
+            </a:r>
+            <a:r>
+              <a:rPr lang="en-US" altLang="zh-CN" sz="1200" dirty="0">
+                <a:latin typeface="Times New Roman" panose="02020603050405020304" pitchFamily="18" charset="0"/>
+                <a:cs typeface="Times New Roman" panose="02020603050405020304" pitchFamily="18" charset="0"/>
+              </a:rPr>
+              <a:t>( mesh </a:t>
+            </a:r>
+            <a:r>
+              <a:rPr lang="en-US" altLang="zh-CN" sz="1200" dirty="0" smtClean="0">
+                <a:latin typeface="Times New Roman" panose="02020603050405020304" pitchFamily="18" charset="0"/>
+                <a:cs typeface="Times New Roman" panose="02020603050405020304" pitchFamily="18" charset="0"/>
+              </a:rPr>
+              <a:t>); </a:t>
+            </a:r>
+          </a:p>
+          <a:p>
+            <a:r>
+              <a:rPr lang="en-US" altLang="zh-CN" sz="1200" dirty="0" err="1" smtClean="0">
+                <a:latin typeface="Times New Roman" panose="02020603050405020304" pitchFamily="18" charset="0"/>
+                <a:cs typeface="Times New Roman" panose="02020603050405020304" pitchFamily="18" charset="0"/>
+              </a:rPr>
+              <a:t>var</a:t>
+            </a:r>
+            <a:r>
+              <a:rPr lang="en-US" altLang="zh-CN" sz="1200" dirty="0" smtClean="0">
+                <a:latin typeface="Times New Roman" panose="02020603050405020304" pitchFamily="18" charset="0"/>
+                <a:cs typeface="Times New Roman" panose="02020603050405020304" pitchFamily="18" charset="0"/>
+              </a:rPr>
+              <a:t> </a:t>
+            </a:r>
+            <a:r>
+              <a:rPr lang="en-US" altLang="zh-CN" sz="1200" dirty="0">
+                <a:latin typeface="Times New Roman" panose="02020603050405020304" pitchFamily="18" charset="0"/>
+                <a:cs typeface="Times New Roman" panose="02020603050405020304" pitchFamily="18" charset="0"/>
+              </a:rPr>
+              <a:t>clip =</a:t>
+            </a:r>
+            <a:r>
+              <a:rPr lang="en-US" altLang="zh-CN" sz="1200" dirty="0" err="1" smtClean="0">
+                <a:latin typeface="Times New Roman" panose="02020603050405020304" pitchFamily="18" charset="0"/>
+                <a:cs typeface="Times New Roman" panose="02020603050405020304" pitchFamily="18" charset="0"/>
+              </a:rPr>
+              <a:t>THREE.AnimationClip.CreateFromMorphTargetSequence</a:t>
+            </a:r>
+            <a:r>
+              <a:rPr lang="en-US" altLang="zh-CN" sz="1200" dirty="0">
+                <a:latin typeface="Times New Roman" panose="02020603050405020304" pitchFamily="18" charset="0"/>
+                <a:cs typeface="Times New Roman" panose="02020603050405020304" pitchFamily="18" charset="0"/>
+              </a:rPr>
+              <a:t>( 'gallop', geometry2.morphTargets, 3 </a:t>
+            </a:r>
+            <a:r>
+              <a:rPr lang="en-US" altLang="zh-CN" sz="1200" dirty="0" smtClean="0">
+                <a:latin typeface="Times New Roman" panose="02020603050405020304" pitchFamily="18" charset="0"/>
+                <a:cs typeface="Times New Roman" panose="02020603050405020304" pitchFamily="18" charset="0"/>
+              </a:rPr>
+              <a:t>); </a:t>
+            </a:r>
+            <a:r>
+              <a:rPr lang="en-US" altLang="zh-CN" sz="1200" dirty="0" err="1" smtClean="0">
+                <a:latin typeface="Times New Roman" panose="02020603050405020304" pitchFamily="18" charset="0"/>
+                <a:cs typeface="Times New Roman" panose="02020603050405020304" pitchFamily="18" charset="0"/>
+              </a:rPr>
+              <a:t>mixer.clipAction</a:t>
+            </a:r>
+            <a:r>
+              <a:rPr lang="en-US" altLang="zh-CN" sz="1200" dirty="0">
+                <a:latin typeface="Times New Roman" panose="02020603050405020304" pitchFamily="18" charset="0"/>
+                <a:cs typeface="Times New Roman" panose="02020603050405020304" pitchFamily="18" charset="0"/>
+              </a:rPr>
+              <a:t>( clip ).</a:t>
+            </a:r>
+            <a:r>
+              <a:rPr lang="en-US" altLang="zh-CN" sz="1200" dirty="0" err="1">
+                <a:latin typeface="Times New Roman" panose="02020603050405020304" pitchFamily="18" charset="0"/>
+                <a:cs typeface="Times New Roman" panose="02020603050405020304" pitchFamily="18" charset="0"/>
+              </a:rPr>
+              <a:t>setDuration</a:t>
+            </a:r>
+            <a:r>
+              <a:rPr lang="en-US" altLang="zh-CN" sz="1200" dirty="0">
+                <a:latin typeface="Times New Roman" panose="02020603050405020304" pitchFamily="18" charset="0"/>
+                <a:cs typeface="Times New Roman" panose="02020603050405020304" pitchFamily="18" charset="0"/>
+              </a:rPr>
+              <a:t>( 0.8+0.2*</a:t>
+            </a:r>
+            <a:r>
+              <a:rPr lang="en-US" altLang="zh-CN" sz="1200" dirty="0" err="1">
+                <a:latin typeface="Times New Roman" panose="02020603050405020304" pitchFamily="18" charset="0"/>
+                <a:cs typeface="Times New Roman" panose="02020603050405020304" pitchFamily="18" charset="0"/>
+              </a:rPr>
+              <a:t>Math.random</a:t>
+            </a:r>
+            <a:r>
+              <a:rPr lang="en-US" altLang="zh-CN" sz="1200" dirty="0">
+                <a:latin typeface="Times New Roman" panose="02020603050405020304" pitchFamily="18" charset="0"/>
+                <a:cs typeface="Times New Roman" panose="02020603050405020304" pitchFamily="18" charset="0"/>
+              </a:rPr>
+              <a:t>() ).play();</a:t>
+            </a:r>
+            <a:endParaRPr lang="zh-CN" altLang="en-US" sz="1200" dirty="0">
+              <a:latin typeface="Times New Roman" panose="02020603050405020304" pitchFamily="18" charset="0"/>
+              <a:cs typeface="Times New Roman" panose="02020603050405020304" pitchFamily="18" charset="0"/>
+            </a:endParaRPr>
+          </a:p>
+        </p:txBody>
+      </p:sp>
+    </p:spTree>
+    <p:extLst>
+      <p:ext uri="{BB962C8B-B14F-4D97-AF65-F5344CB8AC3E}">
+        <p14:creationId xmlns:p14="http://schemas.microsoft.com/office/powerpoint/2010/main" val="1060584307"/>
+      </p:ext>
+    </p:extLst>
+  </p:cSld>
+  <p:clrMapOvr>
+    <a:masterClrMapping/>
+  </p:clrMapOvr>
+  <p:timing>
+    <p:tnLst>
+      <p:par>
+        <p:cTn id="1" dur="indefinite" restart="never" nodeType="tmRoot"/>
+      </p:par>
+    </p:tnLst>
+  </p:timing>
+</p:sld>
+</file>
+
+<file path=ppt/slides/slide11.xml><?xml version="1.0" encoding="utf-8"?>
+<p:sld xmlns:a="http://schemas.openxmlformats.org/drawingml/2006/main" xmlns:r="http://schemas.openxmlformats.org/officeDocument/2006/relationships" xmlns:p="http://schemas.openxmlformats.org/presentationml/2006/main">
+  <p:cSld>
+    <p:spTree>
+      <p:nvGrpSpPr>
+        <p:cNvPr id="1" name=""/>
+        <p:cNvGrpSpPr/>
+        <p:nvPr/>
+      </p:nvGrpSpPr>
+      <p:grpSpPr>
+        <a:xfrm>
+          <a:off x="0" y="0"/>
+          <a:ext cx="0" cy="0"/>
+          <a:chOff x="0" y="0"/>
+          <a:chExt cx="0" cy="0"/>
+        </a:xfrm>
+      </p:grpSpPr>
+      <p:sp>
+        <p:nvSpPr>
+          <p:cNvPr id="2" name="Title 1"/>
+          <p:cNvSpPr>
+            <a:spLocks noGrp="1"/>
+          </p:cNvSpPr>
+          <p:nvPr>
+            <p:ph type="title"/>
+          </p:nvPr>
+        </p:nvSpPr>
+        <p:spPr/>
+        <p:txBody>
+          <a:bodyPr>
+            <a:normAutofit/>
+          </a:bodyPr>
+          <a:lstStyle/>
+          <a:p>
+            <a:pPr algn="l"/>
+            <a:r>
+              <a:rPr lang="en-US" sz="2800" b="1" i="1" dirty="0" smtClean="0">
+                <a:latin typeface="Times New Roman" panose="02020603050405020304" pitchFamily="18" charset="0"/>
+                <a:cs typeface="Times New Roman" panose="02020603050405020304" pitchFamily="18" charset="0"/>
+              </a:rPr>
+              <a:t>Mesh </a:t>
+            </a:r>
+            <a:r>
+              <a:rPr lang="en-US" sz="2800" b="1" i="1" dirty="0" smtClean="0">
+                <a:latin typeface="Times New Roman" panose="02020603050405020304" pitchFamily="18" charset="0"/>
+                <a:cs typeface="Times New Roman" panose="02020603050405020304" pitchFamily="18" charset="0"/>
+              </a:rPr>
+              <a:t>manipulation: hitting ball</a:t>
+            </a:r>
+            <a:endParaRPr lang="en-US" sz="2800" b="1" i="1" dirty="0">
+              <a:latin typeface="Times New Roman" panose="02020603050405020304" pitchFamily="18" charset="0"/>
+              <a:cs typeface="Times New Roman" panose="02020603050405020304" pitchFamily="18" charset="0"/>
+            </a:endParaRPr>
+          </a:p>
+        </p:txBody>
+      </p:sp>
+      <p:sp>
+        <p:nvSpPr>
+          <p:cNvPr id="3" name="Content Placeholder 2"/>
+          <p:cNvSpPr>
+            <a:spLocks noGrp="1"/>
+          </p:cNvSpPr>
+          <p:nvPr>
+            <p:ph idx="1"/>
+          </p:nvPr>
+        </p:nvSpPr>
+        <p:spPr>
+          <a:xfrm>
+            <a:off x="457200" y="987574"/>
+            <a:ext cx="8229600" cy="3394472"/>
+          </a:xfrm>
+        </p:spPr>
+        <p:txBody>
+          <a:bodyPr>
+            <a:normAutofit/>
+          </a:bodyPr>
+          <a:lstStyle/>
+          <a:p>
+            <a:r>
+              <a:rPr lang="en-US" sz="2400" dirty="0" smtClean="0">
+                <a:latin typeface="Times New Roman" panose="02020603050405020304" pitchFamily="18" charset="0"/>
+                <a:cs typeface="Times New Roman" panose="02020603050405020304" pitchFamily="18" charset="0"/>
+              </a:rPr>
+              <a:t>Hitting </a:t>
+            </a:r>
+            <a:r>
+              <a:rPr lang="en-US" sz="2400" dirty="0" smtClean="0">
+                <a:latin typeface="Times New Roman" panose="02020603050405020304" pitchFamily="18" charset="0"/>
+                <a:cs typeface="Times New Roman" panose="02020603050405020304" pitchFamily="18" charset="0"/>
+              </a:rPr>
+              <a:t>ball</a:t>
+            </a:r>
+          </a:p>
+          <a:p>
+            <a:pPr lvl="1"/>
+            <a:r>
+              <a:rPr lang="en-US" sz="2000" dirty="0" smtClean="0">
+                <a:latin typeface="Times New Roman" panose="02020603050405020304" pitchFamily="18" charset="0"/>
+                <a:cs typeface="Times New Roman" panose="02020603050405020304" pitchFamily="18" charset="0"/>
+              </a:rPr>
+              <a:t>Ball geometry</a:t>
+            </a:r>
+          </a:p>
+          <a:p>
+            <a:pPr lvl="1"/>
+            <a:r>
+              <a:rPr lang="en-US" sz="2000" dirty="0" smtClean="0">
+                <a:latin typeface="Times New Roman" panose="02020603050405020304" pitchFamily="18" charset="0"/>
+                <a:cs typeface="Times New Roman" panose="02020603050405020304" pitchFamily="18" charset="0"/>
+              </a:rPr>
+              <a:t>vertexShader2 and fragmentShader2</a:t>
+            </a:r>
+          </a:p>
+          <a:p>
+            <a:pPr lvl="1"/>
+            <a:endParaRPr lang="en-US" sz="2000" dirty="0">
+              <a:latin typeface="Times New Roman" panose="02020603050405020304" pitchFamily="18" charset="0"/>
+              <a:cs typeface="Times New Roman" panose="02020603050405020304" pitchFamily="18" charset="0"/>
+            </a:endParaRPr>
+          </a:p>
+        </p:txBody>
+      </p:sp>
+      <p:grpSp>
+        <p:nvGrpSpPr>
+          <p:cNvPr id="4" name="组 3"/>
+          <p:cNvGrpSpPr/>
+          <p:nvPr/>
+        </p:nvGrpSpPr>
+        <p:grpSpPr>
+          <a:xfrm>
+            <a:off x="468091" y="2283718"/>
+            <a:ext cx="8424389" cy="1842888"/>
+            <a:chOff x="468091" y="2385046"/>
+            <a:chExt cx="8424389" cy="1842888"/>
+          </a:xfrm>
+        </p:grpSpPr>
+        <p:pic>
+          <p:nvPicPr>
+            <p:cNvPr id="5" name="Picture 5"/>
+            <p:cNvPicPr>
+              <a:picLocks noChangeAspect="1" noChangeArrowheads="1"/>
+            </p:cNvPicPr>
+            <p:nvPr/>
+          </p:nvPicPr>
+          <p:blipFill>
+            <a:blip r:embed="rId2">
+              <a:extLst>
+                <a:ext uri="{28A0092B-C50C-407E-A947-70E740481C1C}">
+                  <a14:useLocalDpi xmlns:a14="http://schemas.microsoft.com/office/drawing/2010/main" val="0"/>
+                </a:ext>
+              </a:extLst>
+            </a:blip>
+            <a:srcRect/>
+            <a:stretch>
+              <a:fillRect/>
+            </a:stretch>
+          </p:blipFill>
+          <p:spPr bwMode="auto">
+            <a:xfrm>
+              <a:off x="468091" y="2385046"/>
+              <a:ext cx="1901137" cy="1814144"/>
+            </a:xfrm>
+            <a:prstGeom prst="rect">
+              <a:avLst/>
+            </a:prstGeom>
+            <a:noFill/>
+            <a:ln>
+              <a:noFill/>
+            </a:ln>
+            <a:extLst>
+              <a:ext uri="{909E8E84-426E-40DD-AFC4-6F175D3DCCD1}">
+                <a14:hiddenFill xmlns:a14="http://schemas.microsoft.com/office/drawing/2010/main">
+                  <a:solidFill>
+                    <a:schemeClr val="accent1"/>
+                  </a:solidFill>
+                </a14:hiddenFill>
+              </a:ext>
+              <a:ext uri="{91240B29-F687-4F45-9708-019B960494DF}">
+                <a14:hiddenLine xmlns:a14="http://schemas.microsoft.com/office/drawing/2010/main" w="9525">
+                  <a:solidFill>
+                    <a:schemeClr val="tx1"/>
+                  </a:solidFill>
+                  <a:miter lim="800000"/>
+                  <a:headEnd/>
+                  <a:tailEnd/>
+                </a14:hiddenLine>
+              </a:ext>
+            </a:extLst>
+          </p:spPr>
+        </p:pic>
+        <p:pic>
+          <p:nvPicPr>
+            <p:cNvPr id="6" name="Picture 6"/>
+            <p:cNvPicPr>
+              <a:picLocks noChangeAspect="1" noChangeArrowheads="1"/>
+            </p:cNvPicPr>
+            <p:nvPr/>
+          </p:nvPicPr>
+          <p:blipFill>
+            <a:blip r:embed="rId3">
+              <a:extLst>
+                <a:ext uri="{28A0092B-C50C-407E-A947-70E740481C1C}">
+                  <a14:useLocalDpi xmlns:a14="http://schemas.microsoft.com/office/drawing/2010/main" val="0"/>
+                </a:ext>
+              </a:extLst>
+            </a:blip>
+            <a:srcRect/>
+            <a:stretch>
+              <a:fillRect/>
+            </a:stretch>
+          </p:blipFill>
+          <p:spPr bwMode="auto">
+            <a:xfrm>
+              <a:off x="7032099" y="2402412"/>
+              <a:ext cx="1860381" cy="1796778"/>
+            </a:xfrm>
+            <a:prstGeom prst="rect">
+              <a:avLst/>
+            </a:prstGeom>
+            <a:noFill/>
+            <a:ln>
+              <a:noFill/>
+            </a:ln>
+            <a:extLst>
+              <a:ext uri="{909E8E84-426E-40DD-AFC4-6F175D3DCCD1}">
+                <a14:hiddenFill xmlns:a14="http://schemas.microsoft.com/office/drawing/2010/main">
+                  <a:solidFill>
+                    <a:schemeClr val="accent1"/>
+                  </a:solidFill>
+                </a14:hiddenFill>
+              </a:ext>
+              <a:ext uri="{91240B29-F687-4F45-9708-019B960494DF}">
+                <a14:hiddenLine xmlns:a14="http://schemas.microsoft.com/office/drawing/2010/main" w="9525">
+                  <a:solidFill>
+                    <a:schemeClr val="tx1"/>
+                  </a:solidFill>
+                  <a:miter lim="800000"/>
+                  <a:headEnd/>
+                  <a:tailEnd/>
+                </a14:hiddenLine>
+              </a:ext>
+            </a:extLst>
+          </p:spPr>
+        </p:pic>
+        <p:sp>
+          <p:nvSpPr>
+            <p:cNvPr id="7" name="TextBox 6"/>
+            <p:cNvSpPr txBox="1"/>
+            <p:nvPr/>
+          </p:nvSpPr>
+          <p:spPr>
+            <a:xfrm>
+              <a:off x="5567458" y="2426235"/>
+              <a:ext cx="1515305" cy="1200329"/>
+            </a:xfrm>
+            <a:prstGeom prst="rect">
+              <a:avLst/>
+            </a:prstGeom>
+            <a:noFill/>
+          </p:spPr>
+          <p:txBody>
+            <a:bodyPr wrap="square" rtlCol="0">
+              <a:spAutoFit/>
+            </a:bodyPr>
+            <a:lstStyle/>
+            <a:p>
+              <a:r>
+                <a:rPr lang="en-US" dirty="0" smtClean="0">
+                  <a:latin typeface="Times New Roman" panose="02020603050405020304" pitchFamily="18" charset="0"/>
+                  <a:cs typeface="Times New Roman" panose="02020603050405020304" pitchFamily="18" charset="0"/>
+                </a:rPr>
+                <a:t>Bump</a:t>
+              </a:r>
+            </a:p>
+            <a:p>
+              <a:r>
+                <a:rPr lang="en-US" dirty="0" smtClean="0">
+                  <a:latin typeface="Times New Roman" panose="02020603050405020304" pitchFamily="18" charset="0"/>
+                  <a:cs typeface="Times New Roman" panose="02020603050405020304" pitchFamily="18" charset="0"/>
+                </a:rPr>
+                <a:t>(in vertex </a:t>
+              </a:r>
+              <a:r>
+                <a:rPr lang="en-US" dirty="0" err="1" smtClean="0">
+                  <a:latin typeface="Times New Roman" panose="02020603050405020304" pitchFamily="18" charset="0"/>
+                  <a:cs typeface="Times New Roman" panose="02020603050405020304" pitchFamily="18" charset="0"/>
+                </a:rPr>
+                <a:t>shader</a:t>
+              </a:r>
+              <a:r>
+                <a:rPr lang="en-US" dirty="0" smtClean="0">
+                  <a:latin typeface="Times New Roman" panose="02020603050405020304" pitchFamily="18" charset="0"/>
+                  <a:cs typeface="Times New Roman" panose="02020603050405020304" pitchFamily="18" charset="0"/>
+                </a:rPr>
+                <a:t>, </a:t>
+              </a:r>
+              <a:r>
+                <a:rPr lang="en-US" dirty="0" err="1" smtClean="0">
+                  <a:latin typeface="Times New Roman" panose="02020603050405020304" pitchFamily="18" charset="0"/>
+                  <a:cs typeface="Times New Roman" panose="02020603050405020304" pitchFamily="18" charset="0"/>
+                </a:rPr>
+                <a:t>chage</a:t>
+              </a:r>
+              <a:r>
+                <a:rPr lang="en-US" dirty="0" smtClean="0">
+                  <a:latin typeface="Times New Roman" panose="02020603050405020304" pitchFamily="18" charset="0"/>
+                  <a:cs typeface="Times New Roman" panose="02020603050405020304" pitchFamily="18" charset="0"/>
+                </a:rPr>
+                <a:t> position)</a:t>
+              </a:r>
+              <a:endParaRPr lang="en-US" dirty="0">
+                <a:latin typeface="Times New Roman" panose="02020603050405020304" pitchFamily="18" charset="0"/>
+                <a:cs typeface="Times New Roman" panose="02020603050405020304" pitchFamily="18" charset="0"/>
+              </a:endParaRPr>
+            </a:p>
+          </p:txBody>
+        </p:sp>
+        <p:pic>
+          <p:nvPicPr>
+            <p:cNvPr id="8" name="图片 7"/>
+            <p:cNvPicPr>
+              <a:picLocks noChangeAspect="1"/>
+            </p:cNvPicPr>
+            <p:nvPr/>
+          </p:nvPicPr>
+          <p:blipFill rotWithShape="1">
+            <a:blip r:embed="rId4"/>
+            <a:srcRect l="8916" r="19759"/>
+            <a:stretch/>
+          </p:blipFill>
+          <p:spPr>
+            <a:xfrm>
+              <a:off x="3839266" y="2402412"/>
+              <a:ext cx="1728192" cy="1825522"/>
+            </a:xfrm>
+            <a:prstGeom prst="rect">
+              <a:avLst/>
+            </a:prstGeom>
+          </p:spPr>
+        </p:pic>
+        <p:sp>
+          <p:nvSpPr>
+            <p:cNvPr id="9" name="右箭头 8"/>
+            <p:cNvSpPr/>
+            <p:nvPr/>
+          </p:nvSpPr>
+          <p:spPr>
+            <a:xfrm>
+              <a:off x="5701957" y="3833491"/>
+              <a:ext cx="1246307" cy="322435"/>
+            </a:xfrm>
+            <a:prstGeom prst="rightArrow">
+              <a:avLst/>
+            </a:prstGeom>
+            <a:ln>
+              <a:noFill/>
+            </a:ln>
+          </p:spPr>
+          <p:style>
+            <a:lnRef idx="2">
+              <a:schemeClr val="accent1">
+                <a:shade val="50000"/>
+              </a:schemeClr>
+            </a:lnRef>
+            <a:fillRef idx="1">
+              <a:schemeClr val="accent1"/>
+            </a:fillRef>
+            <a:effectRef idx="0">
+              <a:schemeClr val="accent1"/>
+            </a:effectRef>
+            <a:fontRef idx="minor">
+              <a:schemeClr val="lt1"/>
+            </a:fontRef>
+          </p:style>
+          <p:txBody>
+            <a:bodyPr rtlCol="0" anchor="ctr"/>
+            <a:lstStyle/>
+            <a:p>
+              <a:pPr algn="ctr"/>
+              <a:endParaRPr kumimoji="1" lang="zh-CN" altLang="en-US"/>
+            </a:p>
+          </p:txBody>
+        </p:sp>
+        <p:sp>
+          <p:nvSpPr>
+            <p:cNvPr id="10" name="右箭头 9"/>
+            <p:cNvSpPr/>
+            <p:nvPr/>
+          </p:nvSpPr>
+          <p:spPr>
+            <a:xfrm>
+              <a:off x="2668156" y="3843952"/>
+              <a:ext cx="937873" cy="322435"/>
+            </a:xfrm>
+            <a:prstGeom prst="rightArrow">
+              <a:avLst/>
+            </a:prstGeom>
+            <a:ln>
+              <a:noFill/>
+            </a:ln>
+          </p:spPr>
+          <p:style>
+            <a:lnRef idx="2">
+              <a:schemeClr val="accent1">
+                <a:shade val="50000"/>
+              </a:schemeClr>
+            </a:lnRef>
+            <a:fillRef idx="1">
+              <a:schemeClr val="accent1"/>
+            </a:fillRef>
+            <a:effectRef idx="0">
+              <a:schemeClr val="accent1"/>
+            </a:effectRef>
+            <a:fontRef idx="minor">
+              <a:schemeClr val="lt1"/>
+            </a:fontRef>
+          </p:style>
+          <p:txBody>
+            <a:bodyPr rtlCol="0" anchor="ctr"/>
+            <a:lstStyle/>
+            <a:p>
+              <a:pPr algn="ctr"/>
+              <a:endParaRPr kumimoji="1" lang="zh-CN" altLang="en-US"/>
+            </a:p>
+          </p:txBody>
+        </p:sp>
+        <p:sp>
+          <p:nvSpPr>
+            <p:cNvPr id="11" name="TextBox 6"/>
+            <p:cNvSpPr txBox="1"/>
+            <p:nvPr/>
+          </p:nvSpPr>
+          <p:spPr>
+            <a:xfrm>
+              <a:off x="2339752" y="2436524"/>
+              <a:ext cx="1749198" cy="1200329"/>
+            </a:xfrm>
+            <a:prstGeom prst="rect">
+              <a:avLst/>
+            </a:prstGeom>
+            <a:noFill/>
+          </p:spPr>
+          <p:txBody>
+            <a:bodyPr wrap="square" rtlCol="0">
+              <a:spAutoFit/>
+            </a:bodyPr>
+            <a:lstStyle/>
+            <a:p>
+              <a:r>
+                <a:rPr lang="en-US" dirty="0" smtClean="0">
+                  <a:latin typeface="Times New Roman" panose="02020603050405020304" pitchFamily="18" charset="0"/>
+                  <a:cs typeface="Times New Roman" panose="02020603050405020304" pitchFamily="18" charset="0"/>
+                </a:rPr>
+                <a:t> </a:t>
+              </a:r>
+              <a:r>
+                <a:rPr lang="en-US" dirty="0" smtClean="0">
+                  <a:latin typeface="Times New Roman" panose="02020603050405020304" pitchFamily="18" charset="0"/>
+                  <a:cs typeface="Times New Roman" panose="02020603050405020304" pitchFamily="18" charset="0"/>
+                </a:rPr>
+                <a:t>texture</a:t>
+              </a:r>
+            </a:p>
+            <a:p>
+              <a:r>
+                <a:rPr lang="en-US" dirty="0" smtClean="0">
+                  <a:latin typeface="Times New Roman" panose="02020603050405020304" pitchFamily="18" charset="0"/>
+                  <a:cs typeface="Times New Roman" panose="02020603050405020304" pitchFamily="18" charset="0"/>
+                </a:rPr>
+                <a:t>(in fragment </a:t>
+              </a:r>
+              <a:r>
+                <a:rPr lang="en-US" dirty="0" err="1" smtClean="0">
+                  <a:latin typeface="Times New Roman" panose="02020603050405020304" pitchFamily="18" charset="0"/>
+                  <a:cs typeface="Times New Roman" panose="02020603050405020304" pitchFamily="18" charset="0"/>
+                </a:rPr>
+                <a:t>shader</a:t>
+              </a:r>
+              <a:r>
+                <a:rPr lang="en-US" dirty="0" smtClean="0">
+                  <a:latin typeface="Times New Roman" panose="02020603050405020304" pitchFamily="18" charset="0"/>
+                  <a:cs typeface="Times New Roman" panose="02020603050405020304" pitchFamily="18" charset="0"/>
+                </a:rPr>
+                <a:t>, change fragment color)</a:t>
+              </a:r>
+              <a:endParaRPr lang="en-US" dirty="0">
+                <a:latin typeface="Times New Roman" panose="02020603050405020304" pitchFamily="18" charset="0"/>
+                <a:cs typeface="Times New Roman" panose="02020603050405020304" pitchFamily="18" charset="0"/>
+              </a:endParaRPr>
+            </a:p>
+          </p:txBody>
+        </p:sp>
+      </p:grpSp>
+      <p:sp>
+        <p:nvSpPr>
+          <p:cNvPr id="12" name="文本框 11"/>
+          <p:cNvSpPr txBox="1"/>
+          <p:nvPr/>
+        </p:nvSpPr>
+        <p:spPr>
+          <a:xfrm>
+            <a:off x="468091" y="4382046"/>
+            <a:ext cx="4895997" cy="369332"/>
+          </a:xfrm>
+          <a:prstGeom prst="rect">
+            <a:avLst/>
+          </a:prstGeom>
+          <a:noFill/>
+        </p:spPr>
+        <p:txBody>
+          <a:bodyPr wrap="square" rtlCol="0">
+            <a:spAutoFit/>
+          </a:bodyPr>
+          <a:lstStyle/>
+          <a:p>
+            <a:r>
+              <a:rPr kumimoji="1" lang="en-US" altLang="zh-CN" dirty="0" smtClean="0"/>
+              <a:t>The same method for island mesh</a:t>
+            </a:r>
+            <a:endParaRPr kumimoji="1" lang="zh-CN" altLang="en-US" dirty="0"/>
+          </a:p>
+        </p:txBody>
+      </p:sp>
+    </p:spTree>
+    <p:extLst>
+      <p:ext uri="{BB962C8B-B14F-4D97-AF65-F5344CB8AC3E}">
+        <p14:creationId xmlns:p14="http://schemas.microsoft.com/office/powerpoint/2010/main" val="1975462033"/>
+      </p:ext>
+    </p:extLst>
+  </p:cSld>
+  <p:clrMapOvr>
+    <a:masterClrMapping/>
+  </p:clrMapOvr>
+  <p:timing>
+    <p:tnLst>
+      <p:par>
+        <p:cTn id="1" dur="indefinite" restart="never" nodeType="tmRoot"/>
+      </p:par>
+    </p:tnLst>
+  </p:timing>
+</p:sld>
+</file>
+
+<file path=ppt/slides/slide12.xml><?xml version="1.0" encoding="utf-8"?>
+<p:sld xmlns:a="http://schemas.openxmlformats.org/drawingml/2006/main" xmlns:r="http://schemas.openxmlformats.org/officeDocument/2006/relationships" xmlns:p="http://schemas.openxmlformats.org/presentationml/2006/main">
+  <p:cSld>
+    <p:spTree>
+      <p:nvGrpSpPr>
+        <p:cNvPr id="1" name=""/>
+        <p:cNvGrpSpPr/>
+        <p:nvPr/>
+      </p:nvGrpSpPr>
+      <p:grpSpPr>
+        <a:xfrm>
+          <a:off x="0" y="0"/>
+          <a:ext cx="0" cy="0"/>
+          <a:chOff x="0" y="0"/>
+          <a:chExt cx="0" cy="0"/>
+        </a:xfrm>
+      </p:grpSpPr>
+      <p:sp>
+        <p:nvSpPr>
+          <p:cNvPr id="2" name="Title 1"/>
+          <p:cNvSpPr>
+            <a:spLocks noGrp="1"/>
+          </p:cNvSpPr>
+          <p:nvPr>
+            <p:ph type="title"/>
+          </p:nvPr>
+        </p:nvSpPr>
+        <p:spPr/>
+        <p:txBody>
+          <a:bodyPr>
+            <a:normAutofit/>
+          </a:bodyPr>
+          <a:lstStyle/>
+          <a:p>
+            <a:pPr algn="l"/>
+            <a:r>
+              <a:rPr lang="en-US" sz="2800" b="1" i="1" dirty="0" smtClean="0">
+                <a:latin typeface="Times New Roman" panose="02020603050405020304" pitchFamily="18" charset="0"/>
+                <a:cs typeface="Times New Roman" panose="02020603050405020304" pitchFamily="18" charset="0"/>
+              </a:rPr>
+              <a:t>User Interaction</a:t>
+            </a:r>
+            <a:endParaRPr lang="en-US" sz="2800" b="1" i="1" dirty="0">
+              <a:latin typeface="Times New Roman" panose="02020603050405020304" pitchFamily="18" charset="0"/>
+              <a:cs typeface="Times New Roman" panose="02020603050405020304" pitchFamily="18" charset="0"/>
+            </a:endParaRPr>
+          </a:p>
+        </p:txBody>
+      </p:sp>
+      <p:sp>
+        <p:nvSpPr>
+          <p:cNvPr id="3" name="Content Placeholder 2"/>
+          <p:cNvSpPr>
+            <a:spLocks noGrp="1"/>
+          </p:cNvSpPr>
+          <p:nvPr>
+            <p:ph idx="1"/>
+          </p:nvPr>
+        </p:nvSpPr>
+        <p:spPr/>
+        <p:txBody>
+          <a:bodyPr>
+            <a:normAutofit/>
+          </a:bodyPr>
+          <a:lstStyle/>
+          <a:p>
+            <a:r>
+              <a:rPr lang="en-US" sz="2400" dirty="0" smtClean="0">
+                <a:latin typeface="Times New Roman" panose="02020603050405020304" pitchFamily="18" charset="0"/>
+                <a:cs typeface="Times New Roman" panose="02020603050405020304" pitchFamily="18" charset="0"/>
+              </a:rPr>
+              <a:t>Keyboard</a:t>
+            </a:r>
+          </a:p>
+          <a:p>
+            <a:pPr lvl="1"/>
+            <a:r>
+              <a:rPr lang="en-US" sz="2000" dirty="0" smtClean="0">
+                <a:latin typeface="Times New Roman" panose="02020603050405020304" pitchFamily="18" charset="0"/>
+                <a:cs typeface="Times New Roman" panose="02020603050405020304" pitchFamily="18" charset="0"/>
+              </a:rPr>
+              <a:t>0: stop or continue any movement;</a:t>
+            </a:r>
+          </a:p>
+          <a:p>
+            <a:pPr lvl="1"/>
+            <a:r>
+              <a:rPr lang="en-US" sz="2000" dirty="0" smtClean="0">
+                <a:latin typeface="Times New Roman" panose="02020603050405020304" pitchFamily="18" charset="0"/>
+                <a:cs typeface="Times New Roman" panose="02020603050405020304" pitchFamily="18" charset="0"/>
+              </a:rPr>
+              <a:t>1: </a:t>
+            </a:r>
+            <a:r>
+              <a:rPr lang="en-US" altLang="zh-HK" sz="2000" dirty="0" smtClean="0">
+                <a:latin typeface="Times New Roman" panose="02020603050405020304" pitchFamily="18" charset="0"/>
+                <a:cs typeface="Times New Roman" panose="02020603050405020304" pitchFamily="18" charset="0"/>
+              </a:rPr>
+              <a:t>move along positive x (right);</a:t>
+            </a:r>
+            <a:endParaRPr lang="en-US" sz="2000" dirty="0" smtClean="0">
+              <a:latin typeface="Times New Roman" panose="02020603050405020304" pitchFamily="18" charset="0"/>
+              <a:cs typeface="Times New Roman" panose="02020603050405020304" pitchFamily="18" charset="0"/>
+            </a:endParaRPr>
+          </a:p>
+          <a:p>
+            <a:pPr lvl="1"/>
+            <a:r>
+              <a:rPr lang="en-US" sz="2000" dirty="0" smtClean="0">
+                <a:latin typeface="Times New Roman" panose="02020603050405020304" pitchFamily="18" charset="0"/>
+                <a:cs typeface="Times New Roman" panose="02020603050405020304" pitchFamily="18" charset="0"/>
+              </a:rPr>
+              <a:t>2: move along negative x (left, by default);</a:t>
+            </a:r>
+          </a:p>
+          <a:p>
+            <a:pPr lvl="1"/>
+            <a:r>
+              <a:rPr lang="en-US" sz="2000" dirty="0" smtClean="0">
+                <a:latin typeface="Times New Roman" panose="02020603050405020304" pitchFamily="18" charset="0"/>
+                <a:cs typeface="Times New Roman" panose="02020603050405020304" pitchFamily="18" charset="0"/>
+              </a:rPr>
+              <a:t>3: </a:t>
+            </a:r>
+            <a:r>
+              <a:rPr lang="en-US" altLang="zh-HK" sz="2000" dirty="0" smtClean="0">
+                <a:latin typeface="Times New Roman" panose="02020603050405020304" pitchFamily="18" charset="0"/>
+                <a:cs typeface="Times New Roman" panose="02020603050405020304" pitchFamily="18" charset="0"/>
+              </a:rPr>
+              <a:t>move along positive y (down); </a:t>
+            </a:r>
+          </a:p>
+          <a:p>
+            <a:pPr lvl="1"/>
+            <a:r>
+              <a:rPr lang="en-US" sz="2000" dirty="0" smtClean="0">
+                <a:latin typeface="Times New Roman" panose="02020603050405020304" pitchFamily="18" charset="0"/>
+                <a:cs typeface="Times New Roman" panose="02020603050405020304" pitchFamily="18" charset="0"/>
+              </a:rPr>
+              <a:t>4: </a:t>
+            </a:r>
+            <a:r>
+              <a:rPr lang="en-US" altLang="zh-HK" sz="2000" dirty="0" smtClean="0">
+                <a:latin typeface="Times New Roman" panose="02020603050405020304" pitchFamily="18" charset="0"/>
+                <a:cs typeface="Times New Roman" panose="02020603050405020304" pitchFamily="18" charset="0"/>
+              </a:rPr>
+              <a:t>move along negative y (up); </a:t>
+            </a:r>
+          </a:p>
+          <a:p>
+            <a:pPr lvl="1"/>
+            <a:r>
+              <a:rPr lang="en-US" altLang="zh-HK" sz="2000" dirty="0" smtClean="0">
+                <a:latin typeface="Times New Roman" panose="02020603050405020304" pitchFamily="18" charset="0"/>
+                <a:cs typeface="Times New Roman" panose="02020603050405020304" pitchFamily="18" charset="0"/>
+              </a:rPr>
+              <a:t>5: move along positive z (farther); </a:t>
+            </a:r>
+          </a:p>
+          <a:p>
+            <a:pPr lvl="1"/>
+            <a:r>
+              <a:rPr lang="en-US" altLang="zh-HK" sz="2000" dirty="0">
+                <a:latin typeface="Times New Roman" panose="02020603050405020304" pitchFamily="18" charset="0"/>
+                <a:cs typeface="Times New Roman" panose="02020603050405020304" pitchFamily="18" charset="0"/>
+              </a:rPr>
+              <a:t>6</a:t>
+            </a:r>
+            <a:r>
+              <a:rPr lang="en-US" altLang="zh-HK" sz="2000" dirty="0" smtClean="0">
+                <a:latin typeface="Times New Roman" panose="02020603050405020304" pitchFamily="18" charset="0"/>
+                <a:cs typeface="Times New Roman" panose="02020603050405020304" pitchFamily="18" charset="0"/>
+              </a:rPr>
+              <a:t>: move along negative z (nearer); </a:t>
+            </a:r>
+          </a:p>
+          <a:p>
+            <a:pPr lvl="1"/>
+            <a:endParaRPr lang="en-US" sz="2000" dirty="0" smtClean="0">
+              <a:latin typeface="Times New Roman" panose="02020603050405020304" pitchFamily="18" charset="0"/>
+              <a:cs typeface="Times New Roman" panose="02020603050405020304" pitchFamily="18" charset="0"/>
+            </a:endParaRPr>
+          </a:p>
+          <a:p>
+            <a:endParaRPr lang="en-US" sz="2400" dirty="0">
+              <a:latin typeface="Times New Roman" panose="02020603050405020304" pitchFamily="18" charset="0"/>
+              <a:cs typeface="Times New Roman" panose="02020603050405020304" pitchFamily="18" charset="0"/>
+            </a:endParaRPr>
+          </a:p>
+          <a:p>
+            <a:endParaRPr lang="en-US" sz="2000" dirty="0" smtClean="0">
+              <a:latin typeface="Times New Roman" panose="02020603050405020304" pitchFamily="18" charset="0"/>
+              <a:cs typeface="Times New Roman" panose="02020603050405020304" pitchFamily="18" charset="0"/>
+            </a:endParaRPr>
+          </a:p>
+          <a:p>
+            <a:pPr lvl="1"/>
+            <a:endParaRPr lang="en-US" sz="2000" dirty="0">
+              <a:latin typeface="Times New Roman" panose="02020603050405020304" pitchFamily="18" charset="0"/>
+              <a:cs typeface="Times New Roman" panose="02020603050405020304" pitchFamily="18" charset="0"/>
+            </a:endParaRPr>
+          </a:p>
+        </p:txBody>
+      </p:sp>
+    </p:spTree>
+    <p:extLst>
+      <p:ext uri="{BB962C8B-B14F-4D97-AF65-F5344CB8AC3E}">
+        <p14:creationId xmlns:p14="http://schemas.microsoft.com/office/powerpoint/2010/main" val="1518543636"/>
+      </p:ext>
+    </p:extLst>
+  </p:cSld>
+  <p:clrMapOvr>
+    <a:masterClrMapping/>
+  </p:clrMapOvr>
+  <p:timing>
+    <p:tnLst>
+      <p:par>
+        <p:cTn id="1" dur="indefinite" restart="never" nodeType="tmRoot"/>
+      </p:par>
+    </p:tnLst>
+  </p:timing>
 </p:sld>
 </file>
 
@@ -3339,6 +4788,13 @@
   <p:clrMapOvr>
     <a:masterClrMapping/>
   </p:clrMapOvr>
+  <p:timing>
+    <p:tnLst>
+      <p:par>
+        <p:cTn id="1" dur="indefinite" restart="never" nodeType="tmRoot"/>
+      </p:par>
+    </p:tnLst>
+  </p:timing>
 </p:sld>
 </file>
 
@@ -3401,7 +4857,12 @@
             <p:ph idx="1"/>
           </p:nvPr>
         </p:nvSpPr>
-        <p:spPr/>
+        <p:spPr>
+          <a:xfrm>
+            <a:off x="457200" y="1200151"/>
+            <a:ext cx="4762872" cy="3394472"/>
+          </a:xfrm>
+        </p:spPr>
         <p:txBody>
           <a:bodyPr>
             <a:normAutofit/>
@@ -3444,45 +4905,9 @@
             </a:r>
           </a:p>
           <a:p>
-            <a:pPr lvl="1"/>
-            <a:r>
-              <a:rPr lang="en-US" sz="2000" dirty="0" smtClean="0">
-                <a:latin typeface="Times New Roman" panose="02020603050405020304" pitchFamily="18" charset="0"/>
-                <a:cs typeface="Times New Roman" panose="02020603050405020304" pitchFamily="18" charset="0"/>
-              </a:rPr>
-              <a:t>Method: </a:t>
-            </a:r>
-            <a:r>
-              <a:rPr lang="en-US" sz="2000" dirty="0" err="1" smtClean="0">
-                <a:latin typeface="Times New Roman" panose="02020603050405020304" pitchFamily="18" charset="0"/>
-                <a:cs typeface="Times New Roman" panose="02020603050405020304" pitchFamily="18" charset="0"/>
-              </a:rPr>
-              <a:t>THREE.AnimationClip.CreateFromMorphTargetSequence</a:t>
-            </a:r>
-            <a:r>
-              <a:rPr lang="en-US" sz="2000" dirty="0" smtClean="0">
-                <a:latin typeface="Times New Roman" panose="02020603050405020304" pitchFamily="18" charset="0"/>
-                <a:cs typeface="Times New Roman" panose="02020603050405020304" pitchFamily="18" charset="0"/>
-              </a:rPr>
-              <a:t>(name, </a:t>
-            </a:r>
-            <a:r>
-              <a:rPr lang="en-US" sz="2000" dirty="0" err="1" smtClean="0">
-                <a:latin typeface="Times New Roman" panose="02020603050405020304" pitchFamily="18" charset="0"/>
-                <a:cs typeface="Times New Roman" panose="02020603050405020304" pitchFamily="18" charset="0"/>
-              </a:rPr>
-              <a:t>morphTargetSequence</a:t>
-            </a:r>
-            <a:r>
-              <a:rPr lang="en-US" sz="2000" dirty="0" smtClean="0">
-                <a:latin typeface="Times New Roman" panose="02020603050405020304" pitchFamily="18" charset="0"/>
-                <a:cs typeface="Times New Roman" panose="02020603050405020304" pitchFamily="18" charset="0"/>
-              </a:rPr>
-              <a:t>, fps)</a:t>
-            </a:r>
-          </a:p>
-          <a:p>
-            <a:pPr lvl="1"/>
+            <a:pPr marL="457200" lvl="1" indent="0">
+              <a:buNone/>
+            </a:pPr>
             <a:endParaRPr lang="en-US" sz="2000" dirty="0">
               <a:latin typeface="Times New Roman" panose="02020603050405020304" pitchFamily="18" charset="0"/>
               <a:cs typeface="Times New Roman" panose="02020603050405020304" pitchFamily="18" charset="0"/>
@@ -3506,6 +4931,30 @@
           </a:p>
         </p:txBody>
       </p:sp>
+      <p:pic>
+        <p:nvPicPr>
+          <p:cNvPr id="4" name="图片 3"/>
+          <p:cNvPicPr>
+            <a:picLocks noChangeAspect="1"/>
+          </p:cNvPicPr>
+          <p:nvPr/>
+        </p:nvPicPr>
+        <p:blipFill>
+          <a:blip r:embed="rId2"/>
+          <a:stretch>
+            <a:fillRect/>
+          </a:stretch>
+        </p:blipFill>
+        <p:spPr>
+          <a:xfrm>
+            <a:off x="5220072" y="1169165"/>
+            <a:ext cx="3675510" cy="2499942"/>
+          </a:xfrm>
+          <a:prstGeom prst="rect">
+            <a:avLst/>
+          </a:prstGeom>
+        </p:spPr>
+      </p:pic>
     </p:spTree>
     <p:extLst>
       <p:ext uri="{BB962C8B-B14F-4D97-AF65-F5344CB8AC3E}">
@@ -3516,6 +4965,13 @@
   <p:clrMapOvr>
     <a:masterClrMapping/>
   </p:clrMapOvr>
+  <p:timing>
+    <p:tnLst>
+      <p:par>
+        <p:cTn id="1" dur="indefinite" restart="never" nodeType="tmRoot"/>
+      </p:par>
+    </p:tnLst>
+  </p:timing>
 </p:sld>
 </file>
 
@@ -3590,55 +5046,51 @@
                 <a:latin typeface="Times New Roman" panose="02020603050405020304" pitchFamily="18" charset="0"/>
                 <a:cs typeface="Times New Roman" panose="02020603050405020304" pitchFamily="18" charset="0"/>
               </a:rPr>
-              <a:t>3 pairs of fragment and vertex </a:t>
-            </a:r>
+              <a:t>6 flamingos with animation effects</a:t>
+            </a:r>
+          </a:p>
+          <a:p>
+            <a:r>
+              <a:rPr lang="en-US" sz="2400" dirty="0" smtClean="0">
+                <a:latin typeface="Times New Roman" panose="02020603050405020304" pitchFamily="18" charset="0"/>
+                <a:cs typeface="Times New Roman" panose="02020603050405020304" pitchFamily="18" charset="0"/>
+              </a:rPr>
+              <a:t>Camera moves with flamingos</a:t>
+            </a:r>
+          </a:p>
+          <a:p>
+            <a:r>
+              <a:rPr lang="en-US" sz="2400" dirty="0" smtClean="0">
+                <a:latin typeface="Times New Roman" panose="02020603050405020304" pitchFamily="18" charset="0"/>
+                <a:cs typeface="Times New Roman" panose="02020603050405020304" pitchFamily="18" charset="0"/>
+              </a:rPr>
+              <a:t>Fireball heading to flamingos</a:t>
+            </a:r>
+          </a:p>
+          <a:p>
             <a:r>
               <a:rPr lang="en-US" sz="2400" dirty="0" err="1" smtClean="0">
                 <a:latin typeface="Times New Roman" panose="02020603050405020304" pitchFamily="18" charset="0"/>
                 <a:cs typeface="Times New Roman" panose="02020603050405020304" pitchFamily="18" charset="0"/>
               </a:rPr>
-              <a:t>shaders</a:t>
-            </a:r>
-            <a:endParaRPr lang="en-US" sz="2400" dirty="0" smtClean="0">
-              <a:latin typeface="Times New Roman" panose="02020603050405020304" pitchFamily="18" charset="0"/>
-              <a:cs typeface="Times New Roman" panose="02020603050405020304" pitchFamily="18" charset="0"/>
-            </a:endParaRPr>
-          </a:p>
-          <a:p>
+              <a:t>Eviroment</a:t>
+            </a:r>
             <a:r>
               <a:rPr lang="en-US" sz="2400" dirty="0" smtClean="0">
                 <a:latin typeface="Times New Roman" panose="02020603050405020304" pitchFamily="18" charset="0"/>
                 <a:cs typeface="Times New Roman" panose="02020603050405020304" pitchFamily="18" charset="0"/>
               </a:rPr>
-              <a:t>Initialized </a:t>
-            </a:r>
-            <a:r>
-              <a:rPr lang="en-US" altLang="zh-HK" sz="2400" dirty="0" smtClean="0">
-                <a:latin typeface="Times New Roman" panose="02020603050405020304" pitchFamily="18" charset="0"/>
-                <a:cs typeface="Times New Roman" panose="02020603050405020304" pitchFamily="18" charset="0"/>
-              </a:rPr>
-              <a:t>scene</a:t>
-            </a:r>
+              <a:t>: sky, ocean, island</a:t>
+            </a:r>
+          </a:p>
+          <a:p>
             <a:r>
               <a:rPr lang="en-US" sz="2400" dirty="0" smtClean="0">
                 <a:latin typeface="Times New Roman" panose="02020603050405020304" pitchFamily="18" charset="0"/>
                 <a:cs typeface="Times New Roman" panose="02020603050405020304" pitchFamily="18" charset="0"/>
               </a:rPr>
-              <a:t>: camera, light, background texture, mesh loader and render setting</a:t>
-            </a:r>
-          </a:p>
-          <a:p>
-            <a:r>
-              <a:rPr lang="en-US" sz="2400" dirty="0" smtClean="0">
-                <a:latin typeface="Times New Roman" panose="02020603050405020304" pitchFamily="18" charset="0"/>
-                <a:cs typeface="Times New Roman" panose="02020603050405020304" pitchFamily="18" charset="0"/>
-              </a:rPr>
-              <a:t>Animated scene: Light position, mesh position and texture, camera position</a:t>
-            </a:r>
-            <a:endParaRPr lang="en-US" sz="2400" dirty="0">
-              <a:latin typeface="Times New Roman" panose="02020603050405020304" pitchFamily="18" charset="0"/>
-              <a:cs typeface="Times New Roman" panose="02020603050405020304" pitchFamily="18" charset="0"/>
-            </a:endParaRPr>
+              <a:t>Ambient light and direct light</a:t>
+            </a:r>
           </a:p>
         </p:txBody>
       </p:sp>
@@ -3652,11 +5104,18 @@
   <p:clrMapOvr>
     <a:masterClrMapping/>
   </p:clrMapOvr>
+  <p:timing>
+    <p:tnLst>
+      <p:par>
+        <p:cTn id="1" dur="indefinite" restart="never" nodeType="tmRoot"/>
+      </p:par>
+    </p:tnLst>
+  </p:timing>
 </p:sld>
 </file>
 
 <file path=ppt/slides/slide5.xml><?xml version="1.0" encoding="utf-8"?>
-<p:sld xmlns:a="http://schemas.openxmlformats.org/drawingml/2006/main" xmlns:r="http://schemas.openxmlformats.org/officeDocument/2006/relationships" xmlns:p="http://schemas.openxmlformats.org/presentationml/2006/main">
+<p:sld xmlns:a="http://schemas.openxmlformats.org/drawingml/2006/main" xmlns:r="http://schemas.openxmlformats.org/officeDocument/2006/relationships" xmlns:p="http://schemas.openxmlformats.org/presentationml/2006/main" show="0">
   <p:cSld>
     <p:spTree>
       <p:nvGrpSpPr>
@@ -3695,7 +5154,7 @@
                 <a:latin typeface="Times New Roman" panose="02020603050405020304" pitchFamily="18" charset="0"/>
                 <a:cs typeface="Times New Roman" panose="02020603050405020304" pitchFamily="18" charset="0"/>
               </a:rPr>
-              <a:t>Terrain design</a:t>
+              <a:t>Overall structures</a:t>
             </a:r>
             <a:endParaRPr lang="en-US" sz="2800" b="1" i="1" dirty="0">
               <a:latin typeface="Times New Roman" panose="02020603050405020304" pitchFamily="18" charset="0"/>
@@ -3726,124 +5185,123 @@
                 <a:latin typeface="Times New Roman" panose="02020603050405020304" pitchFamily="18" charset="0"/>
                 <a:cs typeface="Times New Roman" panose="02020603050405020304" pitchFamily="18" charset="0"/>
               </a:rPr>
-              <a:t>Ball space</a:t>
-            </a:r>
-          </a:p>
-          <a:p>
-            <a:pPr lvl="1"/>
-            <a:r>
-              <a:rPr lang="en-US" sz="2000" dirty="0" smtClean="0">
-                <a:latin typeface="Times New Roman" panose="02020603050405020304" pitchFamily="18" charset="0"/>
-                <a:cs typeface="Times New Roman" panose="02020603050405020304" pitchFamily="18" charset="0"/>
-              </a:rPr>
-              <a:t>Create double-side texture by </a:t>
-            </a:r>
-            <a:r>
-              <a:rPr lang="en-US" altLang="zh-HK" sz="2000" dirty="0" err="1" smtClean="0">
-                <a:latin typeface="Times New Roman" panose="02020603050405020304" pitchFamily="18" charset="0"/>
-                <a:cs typeface="Times New Roman" panose="02020603050405020304" pitchFamily="18" charset="0"/>
-              </a:rPr>
-              <a:t>vertexShader</a:t>
-            </a:r>
-            <a:r>
-              <a:rPr lang="en-US" altLang="zh-HK" sz="2000" dirty="0" smtClean="0">
-                <a:latin typeface="Times New Roman" panose="02020603050405020304" pitchFamily="18" charset="0"/>
-                <a:cs typeface="Times New Roman" panose="02020603050405020304" pitchFamily="18" charset="0"/>
-              </a:rPr>
-              <a:t> and </a:t>
-            </a:r>
-            <a:r>
-              <a:rPr lang="en-US" altLang="zh-HK" sz="2000" dirty="0" err="1" smtClean="0">
-                <a:latin typeface="Times New Roman" panose="02020603050405020304" pitchFamily="18" charset="0"/>
-                <a:cs typeface="Times New Roman" panose="02020603050405020304" pitchFamily="18" charset="0"/>
-              </a:rPr>
-              <a:t>fragmentShader</a:t>
-            </a:r>
-            <a:endParaRPr lang="en-US" altLang="zh-HK" sz="2000" dirty="0" smtClean="0">
+              <a:t>3</a:t>
+            </a:r>
+            <a:r>
+              <a:rPr lang="en-US" sz="2400" dirty="0" smtClean="0">
+                <a:latin typeface="Times New Roman" panose="02020603050405020304" pitchFamily="18" charset="0"/>
+                <a:cs typeface="Times New Roman" panose="02020603050405020304" pitchFamily="18" charset="0"/>
+              </a:rPr>
+              <a:t> </a:t>
+            </a:r>
+            <a:r>
+              <a:rPr lang="en-US" sz="2400" dirty="0" smtClean="0">
+                <a:latin typeface="Times New Roman" panose="02020603050405020304" pitchFamily="18" charset="0"/>
+                <a:cs typeface="Times New Roman" panose="02020603050405020304" pitchFamily="18" charset="0"/>
+              </a:rPr>
+              <a:t>pairs of fragment and vertex </a:t>
+            </a:r>
+            <a:r>
+              <a:rPr lang="en-US" sz="2400" dirty="0" err="1" smtClean="0">
+                <a:latin typeface="Times New Roman" panose="02020603050405020304" pitchFamily="18" charset="0"/>
+                <a:cs typeface="Times New Roman" panose="02020603050405020304" pitchFamily="18" charset="0"/>
+              </a:rPr>
+              <a:t>shaders</a:t>
+            </a:r>
+            <a:endParaRPr lang="en-US" sz="2400" dirty="0" smtClean="0">
               <a:latin typeface="Times New Roman" panose="02020603050405020304" pitchFamily="18" charset="0"/>
               <a:cs typeface="Times New Roman" panose="02020603050405020304" pitchFamily="18" charset="0"/>
             </a:endParaRPr>
           </a:p>
           <a:p>
-            <a:pPr lvl="1"/>
-            <a:r>
-              <a:rPr lang="en-US" sz="2000" i="1" dirty="0" smtClean="0">
-                <a:solidFill>
-                  <a:schemeClr val="bg1">
-                    <a:lumMod val="50000"/>
-                  </a:schemeClr>
-                </a:solidFill>
-                <a:latin typeface="Times New Roman" panose="02020603050405020304" pitchFamily="18" charset="0"/>
-                <a:cs typeface="Times New Roman" panose="02020603050405020304" pitchFamily="18" charset="0"/>
-              </a:rPr>
-              <a:t>(some modification on its texture)</a:t>
-            </a:r>
-          </a:p>
-          <a:p>
             <a:r>
               <a:rPr lang="en-US" sz="2400" dirty="0" smtClean="0">
                 <a:latin typeface="Times New Roman" panose="02020603050405020304" pitchFamily="18" charset="0"/>
                 <a:cs typeface="Times New Roman" panose="02020603050405020304" pitchFamily="18" charset="0"/>
               </a:rPr>
-              <a:t>Ground sea and island </a:t>
-            </a:r>
-          </a:p>
-          <a:p>
-            <a:pPr lvl="1"/>
-            <a:r>
-              <a:rPr lang="en-US" altLang="zh-HK" sz="2000" i="1" dirty="0" smtClean="0">
-                <a:solidFill>
-                  <a:schemeClr val="bg1">
-                    <a:lumMod val="50000"/>
-                  </a:schemeClr>
-                </a:solidFill>
-                <a:latin typeface="Times New Roman" panose="02020603050405020304" pitchFamily="18" charset="0"/>
-                <a:cs typeface="Times New Roman" panose="02020603050405020304" pitchFamily="18" charset="0"/>
-              </a:rPr>
-              <a:t>(sea amination is needed especially when camera stops)</a:t>
-            </a:r>
-            <a:endParaRPr lang="en-US" altLang="zh-HK" sz="2000" dirty="0" smtClean="0">
+              <a:t>Initialized </a:t>
+            </a:r>
+            <a:r>
+              <a:rPr lang="en-US" altLang="zh-HK" sz="2400" dirty="0" smtClean="0">
+                <a:latin typeface="Times New Roman" panose="02020603050405020304" pitchFamily="18" charset="0"/>
+                <a:cs typeface="Times New Roman" panose="02020603050405020304" pitchFamily="18" charset="0"/>
+              </a:rPr>
+              <a:t>scene</a:t>
+            </a:r>
+            <a:r>
+              <a:rPr lang="en-US" sz="2400" dirty="0" smtClean="0">
+                <a:latin typeface="Times New Roman" panose="02020603050405020304" pitchFamily="18" charset="0"/>
+                <a:cs typeface="Times New Roman" panose="02020603050405020304" pitchFamily="18" charset="0"/>
+              </a:rPr>
+              <a:t>: camera, light, background texture, mesh loader and render setting</a:t>
+            </a:r>
+          </a:p>
+          <a:p>
+            <a:r>
+              <a:rPr lang="en-US" sz="2400" dirty="0" smtClean="0">
+                <a:latin typeface="Times New Roman" panose="02020603050405020304" pitchFamily="18" charset="0"/>
+                <a:cs typeface="Times New Roman" panose="02020603050405020304" pitchFamily="18" charset="0"/>
+              </a:rPr>
+              <a:t>Animated scene: Light position, </a:t>
+            </a:r>
+            <a:r>
+              <a:rPr lang="en-US" altLang="zh-CN" sz="2400" dirty="0" smtClean="0">
+                <a:latin typeface="Times New Roman" panose="02020603050405020304" pitchFamily="18" charset="0"/>
+                <a:cs typeface="Times New Roman" panose="02020603050405020304" pitchFamily="18" charset="0"/>
+              </a:rPr>
+              <a:t>light intensity, </a:t>
+            </a:r>
+            <a:r>
+              <a:rPr lang="en-US" sz="2400" dirty="0" smtClean="0">
+                <a:latin typeface="Times New Roman" panose="02020603050405020304" pitchFamily="18" charset="0"/>
+                <a:cs typeface="Times New Roman" panose="02020603050405020304" pitchFamily="18" charset="0"/>
+              </a:rPr>
+              <a:t>mesh </a:t>
+            </a:r>
+            <a:r>
+              <a:rPr lang="en-US" sz="2400" dirty="0" smtClean="0">
+                <a:latin typeface="Times New Roman" panose="02020603050405020304" pitchFamily="18" charset="0"/>
+                <a:cs typeface="Times New Roman" panose="02020603050405020304" pitchFamily="18" charset="0"/>
+              </a:rPr>
+              <a:t>position and texture, camera position</a:t>
+            </a:r>
+            <a:endParaRPr lang="en-US" sz="2400" dirty="0">
               <a:latin typeface="Times New Roman" panose="02020603050405020304" pitchFamily="18" charset="0"/>
               <a:cs typeface="Times New Roman" panose="02020603050405020304" pitchFamily="18" charset="0"/>
             </a:endParaRPr>
           </a:p>
-          <a:p>
-            <a:pPr lvl="1"/>
-            <a:r>
-              <a:rPr lang="en-US" altLang="zh-HK" sz="2000" dirty="0" smtClean="0">
-                <a:latin typeface="Times New Roman" panose="02020603050405020304" pitchFamily="18" charset="0"/>
-                <a:cs typeface="Times New Roman" panose="02020603050405020304" pitchFamily="18" charset="0"/>
-              </a:rPr>
-              <a:t>Height map simulate terrains</a:t>
-            </a:r>
-          </a:p>
-          <a:p>
-            <a:pPr lvl="1"/>
-            <a:r>
-              <a:rPr lang="en-US" sz="2000" dirty="0" smtClean="0">
-                <a:latin typeface="Times New Roman" panose="02020603050405020304" pitchFamily="18" charset="0"/>
-                <a:cs typeface="Times New Roman" panose="02020603050405020304" pitchFamily="18" charset="0"/>
-              </a:rPr>
-              <a:t>vertexShader3 and fragmentShader3</a:t>
-            </a:r>
-          </a:p>
         </p:txBody>
       </p:sp>
     </p:spTree>
     <p:extLst>
       <p:ext uri="{BB962C8B-B14F-4D97-AF65-F5344CB8AC3E}">
-        <p14:creationId xmlns:p14="http://schemas.microsoft.com/office/powerpoint/2010/main" val="2003075886"/>
+        <p14:creationId xmlns:p14="http://schemas.microsoft.com/office/powerpoint/2010/main" val="1389462536"/>
       </p:ext>
     </p:extLst>
   </p:cSld>
   <p:clrMapOvr>
     <a:masterClrMapping/>
   </p:clrMapOvr>
+  <mc:AlternateContent xmlns:mc="http://schemas.openxmlformats.org/markup-compatibility/2006">
+    <mc:Choice xmlns:p14="http://schemas.microsoft.com/office/powerpoint/2010/main" Requires="p14">
+      <p:transition spd="slow" p14:dur="2000"/>
+    </mc:Choice>
+    <mc:Fallback>
+      <p:transition spd="slow"/>
+    </mc:Fallback>
+  </mc:AlternateContent>
+  <p:timing>
+    <p:tnLst>
+      <p:par>
+        <p:cTn id="1" dur="indefinite" restart="never" nodeType="tmRoot"/>
+      </p:par>
+    </p:tnLst>
+  </p:timing>
 </p:sld>
 </file>
 
 <file path=ppt/slides/slide6.xml><?xml version="1.0" encoding="utf-8"?>
-<p:sld xmlns:a="http://schemas.openxmlformats.org/drawingml/2006/main" xmlns:r="http://schemas.openxmlformats.org/officeDocument/2006/relationships" xmlns:p="http://schemas.openxmlformats.org/presentationml/2006/main">
+<p:sld xmlns:a="http://schemas.openxmlformats.org/drawingml/2006/main" xmlns:r="http://schemas.openxmlformats.org/officeDocument/2006/relationships" xmlns:p="http://schemas.openxmlformats.org/presentationml/2006/main" show="0">
   <p:cSld>
     <p:spTree>
       <p:nvGrpSpPr>
@@ -3882,7 +5340,7 @@
                 <a:latin typeface="Times New Roman" panose="02020603050405020304" pitchFamily="18" charset="0"/>
                 <a:cs typeface="Times New Roman" panose="02020603050405020304" pitchFamily="18" charset="0"/>
               </a:rPr>
-              <a:t>Light setting</a:t>
+              <a:t>Terrain design</a:t>
             </a:r>
             <a:endParaRPr lang="en-US" sz="2800" b="1" i="1" dirty="0">
               <a:latin typeface="Times New Roman" panose="02020603050405020304" pitchFamily="18" charset="0"/>
@@ -3901,12 +5359,7 @@
             <p:ph idx="1"/>
           </p:nvPr>
         </p:nvSpPr>
-        <p:spPr>
-          <a:xfrm>
-            <a:off x="457200" y="1200150"/>
-            <a:ext cx="8229600" cy="3747863"/>
-          </a:xfrm>
-        </p:spPr>
+        <p:spPr/>
         <p:txBody>
           <a:bodyPr>
             <a:normAutofit/>
@@ -3918,7 +5371,7 @@
                 <a:latin typeface="Times New Roman" panose="02020603050405020304" pitchFamily="18" charset="0"/>
                 <a:cs typeface="Times New Roman" panose="02020603050405020304" pitchFamily="18" charset="0"/>
               </a:rPr>
-              <a:t>Ambient Light </a:t>
+              <a:t>Ball space</a:t>
             </a:r>
           </a:p>
           <a:p>
@@ -3928,86 +5381,124 @@
                 <a:latin typeface="Times New Roman" panose="02020603050405020304" pitchFamily="18" charset="0"/>
                 <a:cs typeface="Times New Roman" panose="02020603050405020304" pitchFamily="18" charset="0"/>
               </a:rPr>
-              <a:t>White color with lower density (night) and higher density (day)</a:t>
-            </a:r>
-          </a:p>
-          <a:p>
-            <a:r>
-              <a:rPr lang="en-US" sz="2400" dirty="0" smtClean="0">
-                <a:latin typeface="Times New Roman" panose="02020603050405020304" pitchFamily="18" charset="0"/>
-                <a:cs typeface="Times New Roman" panose="02020603050405020304" pitchFamily="18" charset="0"/>
-              </a:rPr>
-              <a:t>Direct Light in the night</a:t>
-            </a:r>
-          </a:p>
-          <a:p>
-            <a:pPr lvl="1"/>
-            <a:r>
-              <a:rPr lang="en-US" sz="2000" dirty="0" smtClean="0">
-                <a:latin typeface="Times New Roman" panose="02020603050405020304" pitchFamily="18" charset="0"/>
-                <a:cs typeface="Times New Roman" panose="02020603050405020304" pitchFamily="18" charset="0"/>
-              </a:rPr>
-              <a:t>Density increases gradually to certain value</a:t>
-            </a:r>
-          </a:p>
-          <a:p>
-            <a:pPr lvl="1"/>
-            <a:r>
-              <a:rPr lang="en-US" sz="2000" dirty="0" smtClean="0">
-                <a:latin typeface="Times New Roman" panose="02020603050405020304" pitchFamily="18" charset="0"/>
-                <a:cs typeface="Times New Roman" panose="02020603050405020304" pitchFamily="18" charset="0"/>
-              </a:rPr>
-              <a:t>Position change over the flamingo’s position</a:t>
-            </a:r>
-          </a:p>
-          <a:p>
-            <a:r>
-              <a:rPr lang="en-US" sz="2400" dirty="0" smtClean="0">
-                <a:latin typeface="Times New Roman" panose="02020603050405020304" pitchFamily="18" charset="0"/>
-                <a:cs typeface="Times New Roman" panose="02020603050405020304" pitchFamily="18" charset="0"/>
-              </a:rPr>
-              <a:t>Direct light in the day</a:t>
-            </a:r>
-          </a:p>
-          <a:p>
-            <a:pPr lvl="1"/>
-            <a:r>
-              <a:rPr lang="en-US" sz="2000" dirty="0" smtClean="0">
-                <a:latin typeface="Times New Roman" panose="02020603050405020304" pitchFamily="18" charset="0"/>
-                <a:cs typeface="Times New Roman" panose="02020603050405020304" pitchFamily="18" charset="0"/>
-              </a:rPr>
-              <a:t>Simulate the Sun with constant high density</a:t>
-            </a:r>
-          </a:p>
-          <a:p>
-            <a:pPr lvl="1"/>
-            <a:r>
-              <a:rPr lang="en-US" sz="2000" dirty="0" smtClean="0">
-                <a:latin typeface="Times New Roman" panose="02020603050405020304" pitchFamily="18" charset="0"/>
-                <a:cs typeface="Times New Roman" panose="02020603050405020304" pitchFamily="18" charset="0"/>
-              </a:rPr>
-              <a:t>Keep stationary on the sky</a:t>
-            </a:r>
-          </a:p>
-          <a:p>
-            <a:pPr lvl="1"/>
-            <a:endParaRPr lang="en-US" sz="2000" dirty="0">
+              <a:t>Create double-side texture by </a:t>
+            </a:r>
+            <a:r>
+              <a:rPr lang="en-US" altLang="zh-HK" sz="2000" dirty="0" err="1" smtClean="0">
+                <a:latin typeface="Times New Roman" panose="02020603050405020304" pitchFamily="18" charset="0"/>
+                <a:cs typeface="Times New Roman" panose="02020603050405020304" pitchFamily="18" charset="0"/>
+              </a:rPr>
+              <a:t>vertexShader</a:t>
+            </a:r>
+            <a:r>
+              <a:rPr lang="en-US" altLang="zh-HK" sz="2000" dirty="0" smtClean="0">
+                <a:latin typeface="Times New Roman" panose="02020603050405020304" pitchFamily="18" charset="0"/>
+                <a:cs typeface="Times New Roman" panose="02020603050405020304" pitchFamily="18" charset="0"/>
+              </a:rPr>
+              <a:t> and </a:t>
+            </a:r>
+            <a:r>
+              <a:rPr lang="en-US" altLang="zh-HK" sz="2000" dirty="0" err="1" smtClean="0">
+                <a:latin typeface="Times New Roman" panose="02020603050405020304" pitchFamily="18" charset="0"/>
+                <a:cs typeface="Times New Roman" panose="02020603050405020304" pitchFamily="18" charset="0"/>
+              </a:rPr>
+              <a:t>fragmentShader</a:t>
+            </a:r>
+            <a:endParaRPr lang="en-US" altLang="zh-HK" sz="2000" dirty="0" smtClean="0">
               <a:latin typeface="Times New Roman" panose="02020603050405020304" pitchFamily="18" charset="0"/>
               <a:cs typeface="Times New Roman" panose="02020603050405020304" pitchFamily="18" charset="0"/>
             </a:endParaRPr>
           </a:p>
+          <a:p>
+            <a:pPr lvl="1"/>
+            <a:r>
+              <a:rPr lang="en-US" sz="2000" i="1" dirty="0" smtClean="0">
+                <a:solidFill>
+                  <a:schemeClr val="bg1">
+                    <a:lumMod val="50000"/>
+                  </a:schemeClr>
+                </a:solidFill>
+                <a:latin typeface="Times New Roman" panose="02020603050405020304" pitchFamily="18" charset="0"/>
+                <a:cs typeface="Times New Roman" panose="02020603050405020304" pitchFamily="18" charset="0"/>
+              </a:rPr>
+              <a:t>(some modification on its texture)</a:t>
+            </a:r>
+          </a:p>
+          <a:p>
+            <a:r>
+              <a:rPr lang="en-US" sz="2400" dirty="0" smtClean="0">
+                <a:latin typeface="Times New Roman" panose="02020603050405020304" pitchFamily="18" charset="0"/>
+                <a:cs typeface="Times New Roman" panose="02020603050405020304" pitchFamily="18" charset="0"/>
+              </a:rPr>
+              <a:t>Ground sea and island </a:t>
+            </a:r>
+          </a:p>
+          <a:p>
+            <a:pPr lvl="1"/>
+            <a:r>
+              <a:rPr lang="en-US" altLang="zh-HK" sz="2000" i="1" dirty="0" smtClean="0">
+                <a:solidFill>
+                  <a:schemeClr val="bg1">
+                    <a:lumMod val="50000"/>
+                  </a:schemeClr>
+                </a:solidFill>
+                <a:latin typeface="Times New Roman" panose="02020603050405020304" pitchFamily="18" charset="0"/>
+                <a:cs typeface="Times New Roman" panose="02020603050405020304" pitchFamily="18" charset="0"/>
+              </a:rPr>
+              <a:t>(sea amination is needed especially when camera stops)</a:t>
+            </a:r>
+            <a:endParaRPr lang="en-US" altLang="zh-HK" sz="2000" dirty="0" smtClean="0">
+              <a:latin typeface="Times New Roman" panose="02020603050405020304" pitchFamily="18" charset="0"/>
+              <a:cs typeface="Times New Roman" panose="02020603050405020304" pitchFamily="18" charset="0"/>
+            </a:endParaRPr>
+          </a:p>
+          <a:p>
+            <a:pPr lvl="1"/>
+            <a:r>
+              <a:rPr lang="en-US" altLang="zh-HK" sz="2000" dirty="0" smtClean="0">
+                <a:latin typeface="Times New Roman" panose="02020603050405020304" pitchFamily="18" charset="0"/>
+                <a:cs typeface="Times New Roman" panose="02020603050405020304" pitchFamily="18" charset="0"/>
+              </a:rPr>
+              <a:t>Height map simulate terrains</a:t>
+            </a:r>
+          </a:p>
+          <a:p>
+            <a:pPr lvl="1"/>
+            <a:r>
+              <a:rPr lang="en-US" sz="2000" dirty="0" smtClean="0">
+                <a:latin typeface="Times New Roman" panose="02020603050405020304" pitchFamily="18" charset="0"/>
+                <a:cs typeface="Times New Roman" panose="02020603050405020304" pitchFamily="18" charset="0"/>
+              </a:rPr>
+              <a:t>vertexShader3 and fragmentShader3</a:t>
+            </a:r>
+          </a:p>
         </p:txBody>
       </p:sp>
     </p:spTree>
     <p:extLst>
       <p:ext uri="{BB962C8B-B14F-4D97-AF65-F5344CB8AC3E}">
-        <p14:creationId xmlns:p14="http://schemas.microsoft.com/office/powerpoint/2010/main" val="2227130276"/>
+        <p14:creationId xmlns:p14="http://schemas.microsoft.com/office/powerpoint/2010/main" val="2003075886"/>
       </p:ext>
     </p:extLst>
   </p:cSld>
   <p:clrMapOvr>
     <a:masterClrMapping/>
   </p:clrMapOvr>
+  <mc:AlternateContent xmlns:mc="http://schemas.openxmlformats.org/markup-compatibility/2006">
+    <mc:Choice xmlns:p14="http://schemas.microsoft.com/office/powerpoint/2010/main" Requires="p14">
+      <p:transition spd="slow" p14:dur="2000"/>
+    </mc:Choice>
+    <mc:Fallback>
+      <p:transition spd="slow"/>
+    </mc:Fallback>
+  </mc:AlternateContent>
+  <p:timing>
+    <p:tnLst>
+      <p:par>
+        <p:cTn id="1" dur="indefinite" restart="never" nodeType="tmRoot"/>
+      </p:par>
+    </p:tnLst>
+  </p:timing>
 </p:sld>
 </file>
 
@@ -4051,7 +5542,7 @@
                 <a:latin typeface="Times New Roman" panose="02020603050405020304" pitchFamily="18" charset="0"/>
                 <a:cs typeface="Times New Roman" panose="02020603050405020304" pitchFamily="18" charset="0"/>
               </a:rPr>
-              <a:t>Mesh manipulation</a:t>
+              <a:t>Light setting</a:t>
             </a:r>
             <a:endParaRPr lang="en-US" sz="2800" b="1" i="1" dirty="0">
               <a:latin typeface="Times New Roman" panose="02020603050405020304" pitchFamily="18" charset="0"/>
@@ -4060,212 +5551,141 @@
           </a:p>
         </p:txBody>
       </p:sp>
-      <mc:AlternateContent xmlns:mc="http://schemas.openxmlformats.org/markup-compatibility/2006">
-        <mc:Choice xmlns:a14="http://schemas.microsoft.com/office/drawing/2010/main" Requires="a14">
-          <p:sp>
-            <p:nvSpPr>
-              <p:cNvPr id="3" name="Content Placeholder 2"/>
-              <p:cNvSpPr>
-                <a:spLocks noGrp="1"/>
-              </p:cNvSpPr>
-              <p:nvPr>
-                <p:ph idx="1"/>
-              </p:nvPr>
-            </p:nvSpPr>
-            <p:spPr/>
-            <p:txBody>
-              <a:bodyPr>
-                <a:normAutofit/>
-              </a:bodyPr>
-              <a:lstStyle/>
-              <a:p>
-                <a:r>
-                  <a:rPr lang="en-US" sz="2400" dirty="0" smtClean="0">
-                    <a:latin typeface="Times New Roman" panose="02020603050405020304" pitchFamily="18" charset="0"/>
-                    <a:cs typeface="Times New Roman" panose="02020603050405020304" pitchFamily="18" charset="0"/>
-                  </a:rPr>
-                  <a:t>Flamingo mesh </a:t>
-                </a:r>
-              </a:p>
-              <a:p>
-                <a:pPr lvl="1"/>
-                <a:r>
-                  <a:rPr lang="en-US" sz="2000" dirty="0" smtClean="0">
-                    <a:latin typeface="Times New Roman" panose="02020603050405020304" pitchFamily="18" charset="0"/>
-                    <a:cs typeface="Times New Roman" panose="02020603050405020304" pitchFamily="18" charset="0"/>
-                  </a:rPr>
-                  <a:t>Monotonic moving along x directions</a:t>
-                </a:r>
-              </a:p>
-              <a:p>
-                <a:pPr lvl="1"/>
-                <a:r>
-                  <a:rPr lang="en-US" sz="2000" dirty="0" smtClean="0">
-                    <a:latin typeface="Times New Roman" panose="02020603050405020304" pitchFamily="18" charset="0"/>
-                    <a:cs typeface="Times New Roman" panose="02020603050405020304" pitchFamily="18" charset="0"/>
-                  </a:rPr>
-                  <a:t>Movement along y directions has different </a:t>
-                </a:r>
-                <a14:m>
-                  <m:oMath xmlns:m="http://schemas.openxmlformats.org/officeDocument/2006/math">
-                    <m:r>
-                      <a:rPr lang="en-US" sz="2000" i="1" dirty="0" smtClean="0">
-                        <a:latin typeface="Cambria Math"/>
-                        <a:cs typeface="Times New Roman" panose="02020603050405020304" pitchFamily="18" charset="0"/>
-                      </a:rPr>
-                      <m:t>𝑠𝑖𝑛</m:t>
-                    </m:r>
-                    <m:r>
-                      <a:rPr lang="en-US" sz="2000" i="1" dirty="0" smtClean="0">
-                        <a:latin typeface="Cambria Math"/>
-                        <a:cs typeface="Times New Roman" panose="02020603050405020304" pitchFamily="18" charset="0"/>
-                      </a:rPr>
-                      <m:t>⁡</m:t>
-                    </m:r>
-                  </m:oMath>
-                </a14:m>
-                <a:r>
-                  <a:rPr lang="en-US" sz="2000" dirty="0" smtClean="0">
-                    <a:latin typeface="Times New Roman" panose="02020603050405020304" pitchFamily="18" charset="0"/>
-                    <a:cs typeface="Times New Roman" panose="02020603050405020304" pitchFamily="18" charset="0"/>
-                  </a:rPr>
-                  <a:t> functions with respect to x and position of hitting objects</a:t>
-                </a:r>
-              </a:p>
-              <a:p>
-                <a:pPr lvl="1"/>
-                <a:r>
-                  <a:rPr lang="en-US" sz="2000" dirty="0" smtClean="0">
-                    <a:latin typeface="Times New Roman" panose="02020603050405020304" pitchFamily="18" charset="0"/>
-                    <a:cs typeface="Times New Roman" panose="02020603050405020304" pitchFamily="18" charset="0"/>
-                  </a:rPr>
-                  <a:t>Smoothing shading</a:t>
-                </a:r>
-              </a:p>
-              <a:p>
-                <a:r>
-                  <a:rPr lang="en-US" sz="2400" dirty="0" smtClean="0">
-                    <a:latin typeface="Times New Roman" panose="02020603050405020304" pitchFamily="18" charset="0"/>
-                    <a:cs typeface="Times New Roman" panose="02020603050405020304" pitchFamily="18" charset="0"/>
-                  </a:rPr>
-                  <a:t>Hitting ball</a:t>
-                </a:r>
-              </a:p>
-              <a:p>
-                <a:pPr lvl="1"/>
-                <a:r>
-                  <a:rPr lang="en-US" sz="2000" dirty="0" smtClean="0">
-                    <a:latin typeface="Times New Roman" panose="02020603050405020304" pitchFamily="18" charset="0"/>
-                    <a:cs typeface="Times New Roman" panose="02020603050405020304" pitchFamily="18" charset="0"/>
-                  </a:rPr>
-                  <a:t>Ball geometry</a:t>
-                </a:r>
-              </a:p>
-              <a:p>
-                <a:pPr lvl="1"/>
-                <a:r>
-                  <a:rPr lang="en-US" sz="2000" dirty="0" smtClean="0">
-                    <a:latin typeface="Times New Roman" panose="02020603050405020304" pitchFamily="18" charset="0"/>
-                    <a:cs typeface="Times New Roman" panose="02020603050405020304" pitchFamily="18" charset="0"/>
-                  </a:rPr>
-                  <a:t>vertexShader2 and fragmentShader2</a:t>
-                </a:r>
-              </a:p>
-              <a:p>
-                <a:pPr lvl="1"/>
-                <a:endParaRPr lang="en-US" sz="2000" dirty="0">
-                  <a:latin typeface="Times New Roman" panose="02020603050405020304" pitchFamily="18" charset="0"/>
-                  <a:cs typeface="Times New Roman" panose="02020603050405020304" pitchFamily="18" charset="0"/>
-                </a:endParaRPr>
-              </a:p>
-            </p:txBody>
-          </p:sp>
-        </mc:Choice>
-        <mc:Fallback>
-          <p:sp>
-            <p:nvSpPr>
-              <p:cNvPr id="3" name="Content Placeholder 2"/>
-              <p:cNvSpPr>
-                <a:spLocks noGrp="1" noRot="1" noChangeAspect="1" noMove="1" noResize="1" noEditPoints="1" noAdjustHandles="1" noChangeArrowheads="1" noChangeShapeType="1" noTextEdit="1"/>
-              </p:cNvSpPr>
-              <p:nvPr>
-                <p:ph idx="1"/>
-              </p:nvPr>
-            </p:nvSpPr>
-            <p:spPr>
-              <a:blipFill rotWithShape="1">
-                <a:blip r:embed="rId2"/>
-                <a:stretch>
-                  <a:fillRect l="-963" t="-1436"/>
-                </a:stretch>
-              </a:blipFill>
-            </p:spPr>
-            <p:txBody>
-              <a:bodyPr/>
-              <a:lstStyle/>
-              <a:p>
-                <a:r>
-                  <a:rPr lang="en-US">
-                    <a:noFill/>
-                  </a:rPr>
-                  <a:t> </a:t>
-                </a:r>
-              </a:p>
-            </p:txBody>
-          </p:sp>
-        </mc:Fallback>
-      </mc:AlternateContent>
-      <p:pic>
-        <p:nvPicPr>
-          <p:cNvPr id="1026" name="Picture 2" descr="C:\Users\sliuap\Desktop\fireball.jpg"/>
-          <p:cNvPicPr>
-            <a:picLocks noChangeAspect="1" noChangeArrowheads="1"/>
-          </p:cNvPicPr>
-          <p:nvPr/>
-        </p:nvPicPr>
-        <p:blipFill>
-          <a:blip r:embed="rId3" cstate="print">
-            <a:extLst>
-              <a:ext uri="{28A0092B-C50C-407E-A947-70E740481C1C}">
-                <a14:useLocalDpi xmlns:a14="http://schemas.microsoft.com/office/drawing/2010/main" val="0"/>
-              </a:ext>
-            </a:extLst>
-          </a:blip>
-          <a:srcRect/>
-          <a:stretch>
-            <a:fillRect/>
-          </a:stretch>
-        </p:blipFill>
-        <p:spPr bwMode="auto">
+      <p:sp>
+        <p:nvSpPr>
+          <p:cNvPr id="3" name="Content Placeholder 2"/>
+          <p:cNvSpPr>
+            <a:spLocks noGrp="1"/>
+          </p:cNvSpPr>
+          <p:nvPr>
+            <p:ph idx="1"/>
+          </p:nvPr>
+        </p:nvSpPr>
+        <p:spPr>
           <a:xfrm>
-            <a:off x="6300192" y="2931790"/>
-            <a:ext cx="1735317" cy="1735317"/>
+            <a:off x="457200" y="1200150"/>
+            <a:ext cx="8229600" cy="3747863"/>
           </a:xfrm>
-          <a:prstGeom prst="rect">
-            <a:avLst/>
-          </a:prstGeom>
-          <a:noFill/>
-          <a:extLst>
-            <a:ext uri="{909E8E84-426E-40DD-AFC4-6F175D3DCCD1}">
-              <a14:hiddenFill xmlns:a14="http://schemas.microsoft.com/office/drawing/2010/main">
-                <a:solidFill>
-                  <a:srgbClr val="FFFFFF"/>
-                </a:solidFill>
-              </a14:hiddenFill>
-            </a:ext>
-          </a:extLst>
         </p:spPr>
-      </p:pic>
+        <p:txBody>
+          <a:bodyPr>
+            <a:normAutofit/>
+          </a:bodyPr>
+          <a:lstStyle/>
+          <a:p>
+            <a:r>
+              <a:rPr lang="en-US" sz="2400" dirty="0" smtClean="0">
+                <a:latin typeface="Times New Roman" panose="02020603050405020304" pitchFamily="18" charset="0"/>
+                <a:cs typeface="Times New Roman" panose="02020603050405020304" pitchFamily="18" charset="0"/>
+              </a:rPr>
+              <a:t>Ambient Light </a:t>
+            </a:r>
+          </a:p>
+          <a:p>
+            <a:pPr lvl="1"/>
+            <a:r>
+              <a:rPr lang="en-US" sz="2000" dirty="0" smtClean="0">
+                <a:latin typeface="Times New Roman" panose="02020603050405020304" pitchFamily="18" charset="0"/>
+                <a:cs typeface="Times New Roman" panose="02020603050405020304" pitchFamily="18" charset="0"/>
+              </a:rPr>
+              <a:t>White color with lower density (night) and higher density (day)</a:t>
+            </a:r>
+          </a:p>
+          <a:p>
+            <a:r>
+              <a:rPr lang="en-US" sz="2400" dirty="0" smtClean="0">
+                <a:latin typeface="Times New Roman" panose="02020603050405020304" pitchFamily="18" charset="0"/>
+                <a:cs typeface="Times New Roman" panose="02020603050405020304" pitchFamily="18" charset="0"/>
+              </a:rPr>
+              <a:t>Direct Light in the night</a:t>
+            </a:r>
+          </a:p>
+          <a:p>
+            <a:pPr lvl="1"/>
+            <a:r>
+              <a:rPr lang="en-US" sz="2000" dirty="0" smtClean="0">
+                <a:latin typeface="Times New Roman" panose="02020603050405020304" pitchFamily="18" charset="0"/>
+                <a:cs typeface="Times New Roman" panose="02020603050405020304" pitchFamily="18" charset="0"/>
+              </a:rPr>
+              <a:t>Density increases gradually to certain value</a:t>
+            </a:r>
+          </a:p>
+          <a:p>
+            <a:pPr lvl="1"/>
+            <a:r>
+              <a:rPr lang="en-US" sz="2000" dirty="0" smtClean="0">
+                <a:latin typeface="Times New Roman" panose="02020603050405020304" pitchFamily="18" charset="0"/>
+                <a:cs typeface="Times New Roman" panose="02020603050405020304" pitchFamily="18" charset="0"/>
+              </a:rPr>
+              <a:t>Position change over the flamingo’s </a:t>
+            </a:r>
+            <a:r>
+              <a:rPr lang="en-US" sz="2000" dirty="0" smtClean="0">
+                <a:latin typeface="Times New Roman" panose="02020603050405020304" pitchFamily="18" charset="0"/>
+                <a:cs typeface="Times New Roman" panose="02020603050405020304" pitchFamily="18" charset="0"/>
+              </a:rPr>
+              <a:t>position, mimic the effect of sun rising</a:t>
+            </a:r>
+            <a:endParaRPr lang="en-US" sz="2000" dirty="0" smtClean="0">
+              <a:latin typeface="Times New Roman" panose="02020603050405020304" pitchFamily="18" charset="0"/>
+              <a:cs typeface="Times New Roman" panose="02020603050405020304" pitchFamily="18" charset="0"/>
+            </a:endParaRPr>
+          </a:p>
+          <a:p>
+            <a:r>
+              <a:rPr lang="en-US" sz="2400" dirty="0" smtClean="0">
+                <a:latin typeface="Times New Roman" panose="02020603050405020304" pitchFamily="18" charset="0"/>
+                <a:cs typeface="Times New Roman" panose="02020603050405020304" pitchFamily="18" charset="0"/>
+              </a:rPr>
+              <a:t>Direct light in the day</a:t>
+            </a:r>
+          </a:p>
+          <a:p>
+            <a:pPr lvl="1"/>
+            <a:r>
+              <a:rPr lang="en-US" sz="2000" dirty="0" smtClean="0">
+                <a:latin typeface="Times New Roman" panose="02020603050405020304" pitchFamily="18" charset="0"/>
+                <a:cs typeface="Times New Roman" panose="02020603050405020304" pitchFamily="18" charset="0"/>
+              </a:rPr>
+              <a:t>Simulate the Sun with constant high density</a:t>
+            </a:r>
+          </a:p>
+          <a:p>
+            <a:pPr lvl="1"/>
+            <a:r>
+              <a:rPr lang="en-US" sz="2000" dirty="0" smtClean="0">
+                <a:latin typeface="Times New Roman" panose="02020603050405020304" pitchFamily="18" charset="0"/>
+                <a:cs typeface="Times New Roman" panose="02020603050405020304" pitchFamily="18" charset="0"/>
+              </a:rPr>
+              <a:t>Keep stationary on the sky</a:t>
+            </a:r>
+          </a:p>
+          <a:p>
+            <a:pPr lvl="1"/>
+            <a:endParaRPr lang="en-US" sz="2000" dirty="0">
+              <a:latin typeface="Times New Roman" panose="02020603050405020304" pitchFamily="18" charset="0"/>
+              <a:cs typeface="Times New Roman" panose="02020603050405020304" pitchFamily="18" charset="0"/>
+            </a:endParaRPr>
+          </a:p>
+        </p:txBody>
+      </p:sp>
     </p:spTree>
     <p:extLst>
       <p:ext uri="{BB962C8B-B14F-4D97-AF65-F5344CB8AC3E}">
-        <p14:creationId xmlns:p14="http://schemas.microsoft.com/office/powerpoint/2010/main" val="652161465"/>
+        <p14:creationId xmlns:p14="http://schemas.microsoft.com/office/powerpoint/2010/main" val="2227130276"/>
       </p:ext>
     </p:extLst>
   </p:cSld>
   <p:clrMapOvr>
     <a:masterClrMapping/>
   </p:clrMapOvr>
+  <p:timing>
+    <p:tnLst>
+      <p:par>
+        <p:cTn id="1" dur="indefinite" restart="never" nodeType="tmRoot"/>
+      </p:par>
+    </p:tnLst>
+  </p:timing>
 </p:sld>
 </file>
 
@@ -4309,7 +5729,14 @@
                 <a:latin typeface="Times New Roman" panose="02020603050405020304" pitchFamily="18" charset="0"/>
                 <a:cs typeface="Times New Roman" panose="02020603050405020304" pitchFamily="18" charset="0"/>
               </a:rPr>
-              <a:t>Mesh manipulation</a:t>
+              <a:t>Mesh </a:t>
+            </a:r>
+            <a:r>
+              <a:rPr lang="en-US" sz="2800" b="1" i="1" dirty="0" err="1" smtClean="0">
+                <a:latin typeface="Times New Roman" panose="02020603050405020304" pitchFamily="18" charset="0"/>
+                <a:cs typeface="Times New Roman" panose="02020603050405020304" pitchFamily="18" charset="0"/>
+              </a:rPr>
+              <a:t>manipulation:flamingo</a:t>
             </a:r>
             <a:endParaRPr lang="en-US" sz="2800" b="1" i="1" dirty="0">
               <a:latin typeface="Times New Roman" panose="02020603050405020304" pitchFamily="18" charset="0"/>
@@ -4340,96 +5767,592 @@
                 <a:latin typeface="Times New Roman" panose="02020603050405020304" pitchFamily="18" charset="0"/>
                 <a:cs typeface="Times New Roman" panose="02020603050405020304" pitchFamily="18" charset="0"/>
               </a:rPr>
-              <a:t>Hitting ball</a:t>
-            </a:r>
-          </a:p>
-          <a:p>
-            <a:pPr lvl="1"/>
-            <a:endParaRPr lang="en-US" sz="2000" dirty="0">
+              <a:t>Morph </a:t>
+            </a:r>
+            <a:r>
+              <a:rPr lang="en-US" sz="2400" dirty="0" err="1" smtClean="0">
+                <a:latin typeface="Times New Roman" panose="02020603050405020304" pitchFamily="18" charset="0"/>
+                <a:cs typeface="Times New Roman" panose="02020603050405020304" pitchFamily="18" charset="0"/>
+              </a:rPr>
+              <a:t>normals</a:t>
+            </a:r>
+            <a:r>
+              <a:rPr lang="en-US" sz="2400" dirty="0" smtClean="0">
+                <a:latin typeface="Times New Roman" panose="02020603050405020304" pitchFamily="18" charset="0"/>
+                <a:cs typeface="Times New Roman" panose="02020603050405020304" pitchFamily="18" charset="0"/>
+              </a:rPr>
+              <a:t>:</a:t>
+            </a:r>
+          </a:p>
+          <a:p>
+            <a:pPr marL="0" indent="0">
+              <a:buNone/>
+            </a:pPr>
+            <a:r>
+              <a:rPr lang="en-US" sz="1600" dirty="0" err="1">
+                <a:latin typeface="Times New Roman" panose="02020603050405020304" pitchFamily="18" charset="0"/>
+                <a:cs typeface="Times New Roman" panose="02020603050405020304" pitchFamily="18" charset="0"/>
+              </a:rPr>
+              <a:t>var</a:t>
+            </a:r>
+            <a:r>
+              <a:rPr lang="en-US" sz="1600" dirty="0">
+                <a:latin typeface="Times New Roman" panose="02020603050405020304" pitchFamily="18" charset="0"/>
+                <a:cs typeface="Times New Roman" panose="02020603050405020304" pitchFamily="18" charset="0"/>
+              </a:rPr>
+              <a:t> material </a:t>
+            </a:r>
+            <a:r>
+              <a:rPr lang="en-US" sz="1600" dirty="0" smtClean="0">
+                <a:latin typeface="Times New Roman" panose="02020603050405020304" pitchFamily="18" charset="0"/>
+                <a:cs typeface="Times New Roman" panose="02020603050405020304" pitchFamily="18" charset="0"/>
+              </a:rPr>
+              <a:t>=</a:t>
+            </a:r>
+          </a:p>
+          <a:p>
+            <a:pPr marL="0" indent="0">
+              <a:buNone/>
+            </a:pPr>
+            <a:r>
+              <a:rPr lang="en-US" sz="1600" dirty="0" smtClean="0">
+                <a:latin typeface="Times New Roman" panose="02020603050405020304" pitchFamily="18" charset="0"/>
+                <a:cs typeface="Times New Roman" panose="02020603050405020304" pitchFamily="18" charset="0"/>
+              </a:rPr>
+              <a:t> </a:t>
+            </a:r>
+            <a:r>
+              <a:rPr lang="en-US" sz="1600" dirty="0">
+                <a:latin typeface="Times New Roman" panose="02020603050405020304" pitchFamily="18" charset="0"/>
+                <a:cs typeface="Times New Roman" panose="02020603050405020304" pitchFamily="18" charset="0"/>
+              </a:rPr>
+              <a:t>new </a:t>
+            </a:r>
+            <a:r>
+              <a:rPr lang="en-US" sz="1600" dirty="0" err="1">
+                <a:latin typeface="Times New Roman" panose="02020603050405020304" pitchFamily="18" charset="0"/>
+                <a:cs typeface="Times New Roman" panose="02020603050405020304" pitchFamily="18" charset="0"/>
+              </a:rPr>
+              <a:t>THREE.MeshPhongMaterial</a:t>
+            </a:r>
+            <a:r>
+              <a:rPr lang="en-US" sz="1600" dirty="0">
+                <a:latin typeface="Times New Roman" panose="02020603050405020304" pitchFamily="18" charset="0"/>
+                <a:cs typeface="Times New Roman" panose="02020603050405020304" pitchFamily="18" charset="0"/>
+              </a:rPr>
+              <a:t>( </a:t>
+            </a:r>
+            <a:r>
+              <a:rPr lang="en-US" sz="1600" dirty="0" smtClean="0">
+                <a:latin typeface="Times New Roman" panose="02020603050405020304" pitchFamily="18" charset="0"/>
+                <a:cs typeface="Times New Roman" panose="02020603050405020304" pitchFamily="18" charset="0"/>
+              </a:rPr>
+              <a:t>{</a:t>
+            </a:r>
+          </a:p>
+          <a:p>
+            <a:pPr marL="0" indent="0">
+              <a:buNone/>
+            </a:pPr>
+            <a:r>
+              <a:rPr lang="en-US" sz="1600" dirty="0" smtClean="0">
+                <a:latin typeface="Times New Roman" panose="02020603050405020304" pitchFamily="18" charset="0"/>
+                <a:cs typeface="Times New Roman" panose="02020603050405020304" pitchFamily="18" charset="0"/>
+              </a:rPr>
+              <a:t> </a:t>
+            </a:r>
+            <a:r>
+              <a:rPr lang="en-US" sz="1600" dirty="0">
+                <a:latin typeface="Times New Roman" panose="02020603050405020304" pitchFamily="18" charset="0"/>
+                <a:cs typeface="Times New Roman" panose="02020603050405020304" pitchFamily="18" charset="0"/>
+              </a:rPr>
+              <a:t>color: 0xffffff, </a:t>
+            </a:r>
+            <a:endParaRPr lang="en-US" sz="1600" dirty="0" smtClean="0">
               <a:latin typeface="Times New Roman" panose="02020603050405020304" pitchFamily="18" charset="0"/>
               <a:cs typeface="Times New Roman" panose="02020603050405020304" pitchFamily="18" charset="0"/>
             </a:endParaRPr>
           </a:p>
-        </p:txBody>
-      </p:sp>
-      <p:pic>
-        <p:nvPicPr>
-          <p:cNvPr id="1029" name="Picture 5"/>
-          <p:cNvPicPr>
-            <a:picLocks noChangeAspect="1" noChangeArrowheads="1"/>
-          </p:cNvPicPr>
+          <a:p>
+            <a:pPr marL="0" indent="0">
+              <a:buNone/>
+            </a:pPr>
+            <a:r>
+              <a:rPr lang="en-US" sz="1600" dirty="0" smtClean="0">
+                <a:latin typeface="Times New Roman" panose="02020603050405020304" pitchFamily="18" charset="0"/>
+                <a:cs typeface="Times New Roman" panose="02020603050405020304" pitchFamily="18" charset="0"/>
+              </a:rPr>
+              <a:t>specular</a:t>
+            </a:r>
+            <a:r>
+              <a:rPr lang="en-US" sz="1600" dirty="0">
+                <a:latin typeface="Times New Roman" panose="02020603050405020304" pitchFamily="18" charset="0"/>
+                <a:cs typeface="Times New Roman" panose="02020603050405020304" pitchFamily="18" charset="0"/>
+              </a:rPr>
+              <a:t>: 0xffffff, </a:t>
+            </a:r>
+            <a:endParaRPr lang="en-US" sz="1600" dirty="0" smtClean="0">
+              <a:latin typeface="Times New Roman" panose="02020603050405020304" pitchFamily="18" charset="0"/>
+              <a:cs typeface="Times New Roman" panose="02020603050405020304" pitchFamily="18" charset="0"/>
+            </a:endParaRPr>
+          </a:p>
+          <a:p>
+            <a:pPr marL="0" indent="0">
+              <a:buNone/>
+            </a:pPr>
+            <a:r>
+              <a:rPr lang="en-US" sz="1600" dirty="0" smtClean="0">
+                <a:latin typeface="Times New Roman" panose="02020603050405020304" pitchFamily="18" charset="0"/>
+                <a:cs typeface="Times New Roman" panose="02020603050405020304" pitchFamily="18" charset="0"/>
+              </a:rPr>
+              <a:t>shininess</a:t>
+            </a:r>
+            <a:r>
+              <a:rPr lang="en-US" sz="1600" dirty="0">
+                <a:latin typeface="Times New Roman" panose="02020603050405020304" pitchFamily="18" charset="0"/>
+                <a:cs typeface="Times New Roman" panose="02020603050405020304" pitchFamily="18" charset="0"/>
+              </a:rPr>
+              <a:t>: 20, </a:t>
+            </a:r>
+            <a:endParaRPr lang="en-US" sz="1600" dirty="0" smtClean="0">
+              <a:latin typeface="Times New Roman" panose="02020603050405020304" pitchFamily="18" charset="0"/>
+              <a:cs typeface="Times New Roman" panose="02020603050405020304" pitchFamily="18" charset="0"/>
+            </a:endParaRPr>
+          </a:p>
+          <a:p>
+            <a:pPr marL="0" indent="0">
+              <a:buNone/>
+            </a:pPr>
+            <a:r>
+              <a:rPr lang="en-US" sz="1600" dirty="0" err="1" smtClean="0">
+                <a:latin typeface="Times New Roman" panose="02020603050405020304" pitchFamily="18" charset="0"/>
+                <a:cs typeface="Times New Roman" panose="02020603050405020304" pitchFamily="18" charset="0"/>
+              </a:rPr>
+              <a:t>morphTargets</a:t>
+            </a:r>
+            <a:r>
+              <a:rPr lang="en-US" sz="1600" dirty="0">
+                <a:latin typeface="Times New Roman" panose="02020603050405020304" pitchFamily="18" charset="0"/>
+                <a:cs typeface="Times New Roman" panose="02020603050405020304" pitchFamily="18" charset="0"/>
+              </a:rPr>
+              <a:t>: true, </a:t>
+            </a:r>
+            <a:endParaRPr lang="en-US" sz="1600" dirty="0" smtClean="0">
+              <a:latin typeface="Times New Roman" panose="02020603050405020304" pitchFamily="18" charset="0"/>
+              <a:cs typeface="Times New Roman" panose="02020603050405020304" pitchFamily="18" charset="0"/>
+            </a:endParaRPr>
+          </a:p>
+          <a:p>
+            <a:pPr marL="0" indent="0">
+              <a:buNone/>
+            </a:pPr>
+            <a:r>
+              <a:rPr lang="en-US" sz="1600" dirty="0" err="1" smtClean="0">
+                <a:latin typeface="Times New Roman" panose="02020603050405020304" pitchFamily="18" charset="0"/>
+                <a:cs typeface="Times New Roman" panose="02020603050405020304" pitchFamily="18" charset="0"/>
+              </a:rPr>
+              <a:t>vertexColors</a:t>
+            </a:r>
+            <a:r>
+              <a:rPr lang="en-US" sz="1600" dirty="0">
+                <a:latin typeface="Times New Roman" panose="02020603050405020304" pitchFamily="18" charset="0"/>
+                <a:cs typeface="Times New Roman" panose="02020603050405020304" pitchFamily="18" charset="0"/>
+              </a:rPr>
+              <a:t>: </a:t>
+            </a:r>
+            <a:r>
+              <a:rPr lang="en-US" sz="1600" dirty="0" err="1">
+                <a:latin typeface="Times New Roman" panose="02020603050405020304" pitchFamily="18" charset="0"/>
+                <a:cs typeface="Times New Roman" panose="02020603050405020304" pitchFamily="18" charset="0"/>
+              </a:rPr>
+              <a:t>THREE.FaceColors</a:t>
+            </a:r>
+            <a:r>
+              <a:rPr lang="en-US" sz="1600" dirty="0">
+                <a:latin typeface="Times New Roman" panose="02020603050405020304" pitchFamily="18" charset="0"/>
+                <a:cs typeface="Times New Roman" panose="02020603050405020304" pitchFamily="18" charset="0"/>
+              </a:rPr>
+              <a:t>, </a:t>
+            </a:r>
+            <a:endParaRPr lang="en-US" sz="1600" dirty="0" smtClean="0">
+              <a:latin typeface="Times New Roman" panose="02020603050405020304" pitchFamily="18" charset="0"/>
+              <a:cs typeface="Times New Roman" panose="02020603050405020304" pitchFamily="18" charset="0"/>
+            </a:endParaRPr>
+          </a:p>
+          <a:p>
+            <a:pPr marL="0" indent="0">
+              <a:buNone/>
+            </a:pPr>
+            <a:r>
+              <a:rPr lang="en-US" sz="1600" dirty="0" smtClean="0">
+                <a:latin typeface="Times New Roman" panose="02020603050405020304" pitchFamily="18" charset="0"/>
+                <a:cs typeface="Times New Roman" panose="02020603050405020304" pitchFamily="18" charset="0"/>
+              </a:rPr>
+              <a:t>shading</a:t>
+            </a:r>
+            <a:r>
+              <a:rPr lang="en-US" sz="1600" dirty="0">
+                <a:latin typeface="Times New Roman" panose="02020603050405020304" pitchFamily="18" charset="0"/>
+                <a:cs typeface="Times New Roman" panose="02020603050405020304" pitchFamily="18" charset="0"/>
+              </a:rPr>
+              <a:t>: </a:t>
+            </a:r>
+            <a:r>
+              <a:rPr lang="en-US" sz="1600" dirty="0" err="1">
+                <a:latin typeface="Times New Roman" panose="02020603050405020304" pitchFamily="18" charset="0"/>
+                <a:cs typeface="Times New Roman" panose="02020603050405020304" pitchFamily="18" charset="0"/>
+              </a:rPr>
+              <a:t>THREE.FlatShading</a:t>
+            </a:r>
+            <a:r>
+              <a:rPr lang="en-US" sz="1600" dirty="0">
+                <a:latin typeface="Times New Roman" panose="02020603050405020304" pitchFamily="18" charset="0"/>
+                <a:cs typeface="Times New Roman" panose="02020603050405020304" pitchFamily="18" charset="0"/>
+              </a:rPr>
+              <a:t> } );</a:t>
+            </a:r>
+            <a:endParaRPr lang="en-US" sz="1600" dirty="0" smtClean="0">
+              <a:latin typeface="Times New Roman" panose="02020603050405020304" pitchFamily="18" charset="0"/>
+              <a:cs typeface="Times New Roman" panose="02020603050405020304" pitchFamily="18" charset="0"/>
+            </a:endParaRPr>
+          </a:p>
+        </p:txBody>
+      </p:sp>
+      <p:sp>
+        <p:nvSpPr>
+          <p:cNvPr id="4" name="文本框 3"/>
+          <p:cNvSpPr txBox="1"/>
           <p:nvPr/>
-        </p:nvPicPr>
-        <p:blipFill>
-          <a:blip r:embed="rId2">
-            <a:extLst>
-              <a:ext uri="{28A0092B-C50C-407E-A947-70E740481C1C}">
-                <a14:useLocalDpi xmlns:a14="http://schemas.microsoft.com/office/drawing/2010/main" val="0"/>
-              </a:ext>
-            </a:extLst>
-          </a:blip>
-          <a:srcRect/>
-          <a:stretch>
-            <a:fillRect/>
-          </a:stretch>
-        </p:blipFill>
-        <p:spPr bwMode="auto">
+        </p:nvSpPr>
+        <p:spPr>
           <a:xfrm>
-            <a:off x="539552" y="2399538"/>
-            <a:ext cx="1765228" cy="1563986"/>
+            <a:off x="4753208" y="1635646"/>
+            <a:ext cx="4227523" cy="2800767"/>
           </a:xfrm>
           <a:prstGeom prst="rect">
             <a:avLst/>
           </a:prstGeom>
           <a:noFill/>
-          <a:ln>
-            <a:noFill/>
-          </a:ln>
-          <a:extLst>
-            <a:ext uri="{909E8E84-426E-40DD-AFC4-6F175D3DCCD1}">
-              <a14:hiddenFill xmlns:a14="http://schemas.microsoft.com/office/drawing/2010/main">
-                <a:solidFill>
-                  <a:schemeClr val="accent1"/>
-                </a:solidFill>
-              </a14:hiddenFill>
-            </a:ext>
-            <a:ext uri="{91240B29-F687-4F45-9708-019B960494DF}">
-              <a14:hiddenLine xmlns:a14="http://schemas.microsoft.com/office/drawing/2010/main" w="9525">
-                <a:solidFill>
-                  <a:schemeClr val="tx1"/>
-                </a:solidFill>
-                <a:miter lim="800000"/>
-                <a:headEnd/>
-                <a:tailEnd/>
-              </a14:hiddenLine>
-            </a:ext>
-          </a:extLst>
         </p:spPr>
-      </p:pic>
+        <p:txBody>
+          <a:bodyPr wrap="square" rtlCol="0">
+            <a:spAutoFit/>
+          </a:bodyPr>
+          <a:lstStyle>
+            <a:defPPr>
+              <a:defRPr lang="zh-HK"/>
+            </a:defPPr>
+            <a:lvl1pPr>
+              <a:defRPr kumimoji="1"/>
+            </a:lvl1pPr>
+          </a:lstStyle>
+          <a:p>
+            <a:r>
+              <a:rPr lang="en-US" altLang="zh-CN" sz="1600" dirty="0">
+                <a:latin typeface="Times New Roman" panose="02020603050405020304" pitchFamily="18" charset="0"/>
+                <a:cs typeface="Times New Roman" panose="02020603050405020304" pitchFamily="18" charset="0"/>
+              </a:rPr>
+              <a:t> </a:t>
+            </a:r>
+            <a:r>
+              <a:rPr lang="en-US" altLang="zh-CN" sz="1600" dirty="0" err="1">
+                <a:latin typeface="Times New Roman" panose="02020603050405020304" pitchFamily="18" charset="0"/>
+                <a:cs typeface="Times New Roman" panose="02020603050405020304" pitchFamily="18" charset="0"/>
+              </a:rPr>
+              <a:t>geometry.computeMorphNormals</a:t>
+            </a:r>
+            <a:r>
+              <a:rPr lang="en-US" altLang="zh-CN" sz="1600" dirty="0" smtClean="0">
+                <a:latin typeface="Times New Roman" panose="02020603050405020304" pitchFamily="18" charset="0"/>
+                <a:cs typeface="Times New Roman" panose="02020603050405020304" pitchFamily="18" charset="0"/>
+              </a:rPr>
+              <a:t>();</a:t>
+            </a:r>
+          </a:p>
+          <a:p>
+            <a:r>
+              <a:rPr lang="en-US" altLang="zh-CN" sz="1600" dirty="0" smtClean="0">
+                <a:latin typeface="Times New Roman" panose="02020603050405020304" pitchFamily="18" charset="0"/>
+                <a:cs typeface="Times New Roman" panose="02020603050405020304" pitchFamily="18" charset="0"/>
+              </a:rPr>
+              <a:t> </a:t>
+            </a:r>
+            <a:r>
+              <a:rPr lang="en-US" altLang="zh-CN" sz="1600" dirty="0" err="1" smtClean="0">
+                <a:latin typeface="Times New Roman" panose="02020603050405020304" pitchFamily="18" charset="0"/>
+                <a:cs typeface="Times New Roman" panose="02020603050405020304" pitchFamily="18" charset="0"/>
+              </a:rPr>
+              <a:t>geometry.computeVertexNormals</a:t>
+            </a:r>
+            <a:r>
+              <a:rPr lang="en-US" altLang="zh-CN" sz="1600" dirty="0">
+                <a:latin typeface="Times New Roman" panose="02020603050405020304" pitchFamily="18" charset="0"/>
+                <a:cs typeface="Times New Roman" panose="02020603050405020304" pitchFamily="18" charset="0"/>
+              </a:rPr>
+              <a:t>();</a:t>
+            </a:r>
+            <a:endParaRPr lang="en-US" altLang="zh-CN" sz="1600" dirty="0">
+              <a:latin typeface="Times New Roman" panose="02020603050405020304" pitchFamily="18" charset="0"/>
+              <a:cs typeface="Times New Roman" panose="02020603050405020304" pitchFamily="18" charset="0"/>
+            </a:endParaRPr>
+          </a:p>
+          <a:p>
+            <a:r>
+              <a:rPr lang="en-US" altLang="zh-CN" sz="1600" dirty="0" err="1">
+                <a:latin typeface="Times New Roman" panose="02020603050405020304" pitchFamily="18" charset="0"/>
+                <a:cs typeface="Times New Roman" panose="02020603050405020304" pitchFamily="18" charset="0"/>
+              </a:rPr>
+              <a:t>var</a:t>
+            </a:r>
+            <a:r>
+              <a:rPr lang="en-US" altLang="zh-CN" sz="1600" dirty="0">
+                <a:latin typeface="Times New Roman" panose="02020603050405020304" pitchFamily="18" charset="0"/>
+                <a:cs typeface="Times New Roman" panose="02020603050405020304" pitchFamily="18" charset="0"/>
+              </a:rPr>
+              <a:t> material = </a:t>
+            </a:r>
+            <a:endParaRPr lang="en-US" altLang="zh-CN" sz="1600" dirty="0" smtClean="0">
+              <a:latin typeface="Times New Roman" panose="02020603050405020304" pitchFamily="18" charset="0"/>
+              <a:cs typeface="Times New Roman" panose="02020603050405020304" pitchFamily="18" charset="0"/>
+            </a:endParaRPr>
+          </a:p>
+          <a:p>
+            <a:r>
+              <a:rPr lang="en-US" altLang="zh-CN" sz="1600" dirty="0" smtClean="0">
+                <a:latin typeface="Times New Roman" panose="02020603050405020304" pitchFamily="18" charset="0"/>
+                <a:cs typeface="Times New Roman" panose="02020603050405020304" pitchFamily="18" charset="0"/>
+              </a:rPr>
+              <a:t>new </a:t>
+            </a:r>
+            <a:r>
+              <a:rPr lang="en-US" altLang="zh-CN" sz="1600" dirty="0" err="1">
+                <a:latin typeface="Times New Roman" panose="02020603050405020304" pitchFamily="18" charset="0"/>
+                <a:cs typeface="Times New Roman" panose="02020603050405020304" pitchFamily="18" charset="0"/>
+              </a:rPr>
+              <a:t>THREE.MeshPhongMaterial</a:t>
+            </a:r>
+            <a:r>
+              <a:rPr lang="en-US" altLang="zh-CN" sz="1600" dirty="0">
+                <a:latin typeface="Times New Roman" panose="02020603050405020304" pitchFamily="18" charset="0"/>
+                <a:cs typeface="Times New Roman" panose="02020603050405020304" pitchFamily="18" charset="0"/>
+              </a:rPr>
+              <a:t>( </a:t>
+            </a:r>
+            <a:r>
+              <a:rPr lang="en-US" altLang="zh-CN" sz="1600" dirty="0" smtClean="0">
+                <a:latin typeface="Times New Roman" panose="02020603050405020304" pitchFamily="18" charset="0"/>
+                <a:cs typeface="Times New Roman" panose="02020603050405020304" pitchFamily="18" charset="0"/>
+              </a:rPr>
+              <a:t>{</a:t>
+            </a:r>
+            <a:endParaRPr lang="en-US" altLang="zh-CN" sz="1600" dirty="0">
+              <a:latin typeface="Times New Roman" panose="02020603050405020304" pitchFamily="18" charset="0"/>
+              <a:cs typeface="Times New Roman" panose="02020603050405020304" pitchFamily="18" charset="0"/>
+            </a:endParaRPr>
+          </a:p>
+          <a:p>
+            <a:r>
+              <a:rPr lang="en-US" altLang="zh-CN" sz="1600" dirty="0" smtClean="0">
+                <a:latin typeface="Times New Roman" panose="02020603050405020304" pitchFamily="18" charset="0"/>
+                <a:cs typeface="Times New Roman" panose="02020603050405020304" pitchFamily="18" charset="0"/>
+              </a:rPr>
+              <a:t>color</a:t>
+            </a:r>
+            <a:r>
+              <a:rPr lang="en-US" altLang="zh-CN" sz="1600" dirty="0">
+                <a:latin typeface="Times New Roman" panose="02020603050405020304" pitchFamily="18" charset="0"/>
+                <a:cs typeface="Times New Roman" panose="02020603050405020304" pitchFamily="18" charset="0"/>
+              </a:rPr>
+              <a:t>: </a:t>
+            </a:r>
+            <a:r>
+              <a:rPr lang="en-US" altLang="zh-CN" sz="1600" dirty="0" smtClean="0">
+                <a:latin typeface="Times New Roman" panose="02020603050405020304" pitchFamily="18" charset="0"/>
+                <a:cs typeface="Times New Roman" panose="02020603050405020304" pitchFamily="18" charset="0"/>
+              </a:rPr>
+              <a:t>0xffffff,</a:t>
+            </a:r>
+          </a:p>
+          <a:p>
+            <a:r>
+              <a:rPr lang="en-US" altLang="zh-CN" sz="1600" dirty="0" smtClean="0">
+                <a:latin typeface="Times New Roman" panose="02020603050405020304" pitchFamily="18" charset="0"/>
+                <a:cs typeface="Times New Roman" panose="02020603050405020304" pitchFamily="18" charset="0"/>
+              </a:rPr>
+              <a:t>specular</a:t>
+            </a:r>
+            <a:r>
+              <a:rPr lang="en-US" altLang="zh-CN" sz="1600" dirty="0">
+                <a:latin typeface="Times New Roman" panose="02020603050405020304" pitchFamily="18" charset="0"/>
+                <a:cs typeface="Times New Roman" panose="02020603050405020304" pitchFamily="18" charset="0"/>
+              </a:rPr>
+              <a:t>: </a:t>
+            </a:r>
+            <a:r>
+              <a:rPr lang="en-US" altLang="zh-CN" sz="1600" dirty="0" smtClean="0">
+                <a:latin typeface="Times New Roman" panose="02020603050405020304" pitchFamily="18" charset="0"/>
+                <a:cs typeface="Times New Roman" panose="02020603050405020304" pitchFamily="18" charset="0"/>
+              </a:rPr>
+              <a:t>0x050505,</a:t>
+            </a:r>
+          </a:p>
+          <a:p>
+            <a:r>
+              <a:rPr lang="en-US" altLang="zh-CN" sz="1600" dirty="0" smtClean="0">
+                <a:latin typeface="Times New Roman" panose="02020603050405020304" pitchFamily="18" charset="0"/>
+                <a:cs typeface="Times New Roman" panose="02020603050405020304" pitchFamily="18" charset="0"/>
+              </a:rPr>
+              <a:t>shininess:100,</a:t>
+            </a:r>
+          </a:p>
+          <a:p>
+            <a:r>
+              <a:rPr lang="en-US" altLang="zh-CN" sz="1600" dirty="0" smtClean="0">
+                <a:latin typeface="Times New Roman" panose="02020603050405020304" pitchFamily="18" charset="0"/>
+                <a:cs typeface="Times New Roman" panose="02020603050405020304" pitchFamily="18" charset="0"/>
+              </a:rPr>
+              <a:t> </a:t>
+            </a:r>
+            <a:r>
+              <a:rPr lang="en-US" altLang="zh-CN" sz="1600" dirty="0" err="1" smtClean="0">
+                <a:latin typeface="Times New Roman" panose="02020603050405020304" pitchFamily="18" charset="0"/>
+                <a:cs typeface="Times New Roman" panose="02020603050405020304" pitchFamily="18" charset="0"/>
+              </a:rPr>
+              <a:t>morphTargets</a:t>
+            </a:r>
+            <a:r>
+              <a:rPr lang="en-US" altLang="zh-CN" sz="1600" dirty="0">
+                <a:latin typeface="Times New Roman" panose="02020603050405020304" pitchFamily="18" charset="0"/>
+                <a:cs typeface="Times New Roman" panose="02020603050405020304" pitchFamily="18" charset="0"/>
+              </a:rPr>
+              <a:t>: true</a:t>
+            </a:r>
+            <a:r>
+              <a:rPr lang="en-US" altLang="zh-CN" sz="1600" dirty="0" smtClean="0">
+                <a:latin typeface="Times New Roman" panose="02020603050405020304" pitchFamily="18" charset="0"/>
+                <a:cs typeface="Times New Roman" panose="02020603050405020304" pitchFamily="18" charset="0"/>
+              </a:rPr>
+              <a:t>,</a:t>
+            </a:r>
+          </a:p>
+          <a:p>
+            <a:r>
+              <a:rPr lang="en-US" altLang="zh-CN" sz="1600" dirty="0" smtClean="0">
+                <a:latin typeface="Times New Roman" panose="02020603050405020304" pitchFamily="18" charset="0"/>
+                <a:cs typeface="Times New Roman" panose="02020603050405020304" pitchFamily="18" charset="0"/>
+              </a:rPr>
+              <a:t> </a:t>
+            </a:r>
+            <a:r>
+              <a:rPr lang="en-US" altLang="zh-CN" sz="1600" dirty="0" err="1" smtClean="0">
+                <a:latin typeface="Times New Roman" panose="02020603050405020304" pitchFamily="18" charset="0"/>
+                <a:cs typeface="Times New Roman" panose="02020603050405020304" pitchFamily="18" charset="0"/>
+              </a:rPr>
+              <a:t>morphNormals</a:t>
+            </a:r>
+            <a:r>
+              <a:rPr lang="en-US" altLang="zh-CN" sz="1600" dirty="0">
+                <a:latin typeface="Times New Roman" panose="02020603050405020304" pitchFamily="18" charset="0"/>
+                <a:cs typeface="Times New Roman" panose="02020603050405020304" pitchFamily="18" charset="0"/>
+              </a:rPr>
+              <a:t>: true,	</a:t>
+            </a:r>
+            <a:endParaRPr lang="en-US" altLang="zh-CN" sz="1600" dirty="0" smtClean="0">
+              <a:latin typeface="Times New Roman" panose="02020603050405020304" pitchFamily="18" charset="0"/>
+              <a:cs typeface="Times New Roman" panose="02020603050405020304" pitchFamily="18" charset="0"/>
+            </a:endParaRPr>
+          </a:p>
+          <a:p>
+            <a:r>
+              <a:rPr lang="en-US" altLang="zh-CN" sz="1600" dirty="0" err="1" smtClean="0">
+                <a:latin typeface="Times New Roman" panose="02020603050405020304" pitchFamily="18" charset="0"/>
+                <a:cs typeface="Times New Roman" panose="02020603050405020304" pitchFamily="18" charset="0"/>
+              </a:rPr>
+              <a:t>vertexColors</a:t>
+            </a:r>
+            <a:r>
+              <a:rPr lang="en-US" altLang="zh-CN" sz="1600" dirty="0">
+                <a:latin typeface="Times New Roman" panose="02020603050405020304" pitchFamily="18" charset="0"/>
+                <a:cs typeface="Times New Roman" panose="02020603050405020304" pitchFamily="18" charset="0"/>
+              </a:rPr>
+              <a:t>: </a:t>
+            </a:r>
+            <a:r>
+              <a:rPr lang="en-US" altLang="zh-CN" sz="1600" dirty="0" err="1">
+                <a:latin typeface="Times New Roman" panose="02020603050405020304" pitchFamily="18" charset="0"/>
+                <a:cs typeface="Times New Roman" panose="02020603050405020304" pitchFamily="18" charset="0"/>
+              </a:rPr>
+              <a:t>THREE.FaceColors</a:t>
+            </a:r>
+            <a:r>
+              <a:rPr lang="en-US" altLang="zh-CN" sz="1600" dirty="0" smtClean="0">
+                <a:latin typeface="Times New Roman" panose="02020603050405020304" pitchFamily="18" charset="0"/>
+                <a:cs typeface="Times New Roman" panose="02020603050405020304" pitchFamily="18" charset="0"/>
+              </a:rPr>
+              <a:t>,</a:t>
+            </a:r>
+          </a:p>
+          <a:p>
+            <a:r>
+              <a:rPr lang="en-US" altLang="zh-CN" sz="1600" dirty="0" smtClean="0">
+                <a:latin typeface="Times New Roman" panose="02020603050405020304" pitchFamily="18" charset="0"/>
+                <a:cs typeface="Times New Roman" panose="02020603050405020304" pitchFamily="18" charset="0"/>
+              </a:rPr>
+              <a:t> shading</a:t>
+            </a:r>
+            <a:r>
+              <a:rPr lang="en-US" altLang="zh-CN" sz="1600" dirty="0">
+                <a:latin typeface="Times New Roman" panose="02020603050405020304" pitchFamily="18" charset="0"/>
+                <a:cs typeface="Times New Roman" panose="02020603050405020304" pitchFamily="18" charset="0"/>
+              </a:rPr>
+              <a:t>: </a:t>
+            </a:r>
+            <a:r>
+              <a:rPr lang="en-US" altLang="zh-CN" sz="1600" dirty="0" err="1" smtClean="0">
+                <a:latin typeface="Times New Roman" panose="02020603050405020304" pitchFamily="18" charset="0"/>
+                <a:cs typeface="Times New Roman" panose="02020603050405020304" pitchFamily="18" charset="0"/>
+              </a:rPr>
+              <a:t>THREE.SmoothShading</a:t>
+            </a:r>
+            <a:r>
+              <a:rPr lang="en-US" altLang="zh-CN" sz="1600" dirty="0" smtClean="0">
+                <a:latin typeface="Times New Roman" panose="02020603050405020304" pitchFamily="18" charset="0"/>
+                <a:cs typeface="Times New Roman" panose="02020603050405020304" pitchFamily="18" charset="0"/>
+              </a:rPr>
+              <a:t>} </a:t>
+            </a:r>
+            <a:r>
+              <a:rPr lang="en-US" altLang="zh-CN" sz="1600" dirty="0">
+                <a:latin typeface="Times New Roman" panose="02020603050405020304" pitchFamily="18" charset="0"/>
+                <a:cs typeface="Times New Roman" panose="02020603050405020304" pitchFamily="18" charset="0"/>
+              </a:rPr>
+              <a:t>);</a:t>
+            </a:r>
+            <a:endParaRPr lang="zh-CN" altLang="en-US" sz="1600" dirty="0">
+              <a:latin typeface="Times New Roman" panose="02020603050405020304" pitchFamily="18" charset="0"/>
+              <a:cs typeface="Times New Roman" panose="02020603050405020304" pitchFamily="18" charset="0"/>
+            </a:endParaRPr>
+          </a:p>
+        </p:txBody>
+      </p:sp>
       <p:pic>
         <p:nvPicPr>
-          <p:cNvPr id="4" name="Picture 3"/>
+          <p:cNvPr id="5" name="图片 4"/>
           <p:cNvPicPr>
             <a:picLocks noChangeAspect="1"/>
           </p:cNvPicPr>
           <p:nvPr/>
         </p:nvPicPr>
         <p:blipFill>
-          <a:blip r:embed="rId3" cstate="print">
-            <a:extLst>
-              <a:ext uri="{28A0092B-C50C-407E-A947-70E740481C1C}">
-                <a14:useLocalDpi xmlns:a14="http://schemas.microsoft.com/office/drawing/2010/main" val="0"/>
-              </a:ext>
-            </a:extLst>
-          </a:blip>
+          <a:blip r:embed="rId2"/>
           <a:stretch>
             <a:fillRect/>
           </a:stretch>
         </p:blipFill>
         <p:spPr>
           <a:xfrm>
-            <a:off x="3923928" y="1131590"/>
-            <a:ext cx="1560576" cy="1560576"/>
+            <a:off x="4753208" y="1635646"/>
+            <a:ext cx="3730123" cy="3223021"/>
           </a:xfrm>
           <a:prstGeom prst="rect">
             <a:avLst/>
@@ -4438,216 +6361,232 @@
       </p:pic>
       <p:pic>
         <p:nvPicPr>
-          <p:cNvPr id="5" name="Picture 4"/>
+          <p:cNvPr id="6" name="图片 5"/>
           <p:cNvPicPr>
             <a:picLocks noChangeAspect="1"/>
           </p:cNvPicPr>
           <p:nvPr/>
         </p:nvPicPr>
         <p:blipFill>
-          <a:blip r:embed="rId4">
-            <a:extLst>
-              <a:ext uri="{28A0092B-C50C-407E-A947-70E740481C1C}">
-                <a14:useLocalDpi xmlns:a14="http://schemas.microsoft.com/office/drawing/2010/main" val="0"/>
-              </a:ext>
-            </a:extLst>
-          </a:blip>
+          <a:blip r:embed="rId3"/>
           <a:stretch>
             <a:fillRect/>
           </a:stretch>
         </p:blipFill>
         <p:spPr>
           <a:xfrm>
-            <a:off x="3899724" y="2931790"/>
-            <a:ext cx="1560576" cy="1560576"/>
+            <a:off x="457200" y="1635646"/>
+            <a:ext cx="3369190" cy="3223021"/>
           </a:xfrm>
           <a:prstGeom prst="rect">
             <a:avLst/>
           </a:prstGeom>
         </p:spPr>
       </p:pic>
-      <p:pic>
-        <p:nvPicPr>
-          <p:cNvPr id="1030" name="Picture 6"/>
-          <p:cNvPicPr>
-            <a:picLocks noChangeAspect="1" noChangeArrowheads="1"/>
-          </p:cNvPicPr>
-          <p:nvPr/>
-        </p:nvPicPr>
-        <p:blipFill>
-          <a:blip r:embed="rId5">
-            <a:extLst>
-              <a:ext uri="{28A0092B-C50C-407E-A947-70E740481C1C}">
-                <a14:useLocalDpi xmlns:a14="http://schemas.microsoft.com/office/drawing/2010/main" val="0"/>
-              </a:ext>
-            </a:extLst>
-          </a:blip>
-          <a:srcRect/>
-          <a:stretch>
-            <a:fillRect/>
-          </a:stretch>
-        </p:blipFill>
-        <p:spPr bwMode="auto">
-          <a:xfrm>
-            <a:off x="7020272" y="2249033"/>
-            <a:ext cx="1785438" cy="1724397"/>
-          </a:xfrm>
-          <a:prstGeom prst="rect">
-            <a:avLst/>
-          </a:prstGeom>
-          <a:noFill/>
-          <a:ln>
-            <a:noFill/>
-          </a:ln>
-          <a:extLst>
-            <a:ext uri="{909E8E84-426E-40DD-AFC4-6F175D3DCCD1}">
-              <a14:hiddenFill xmlns:a14="http://schemas.microsoft.com/office/drawing/2010/main">
-                <a:solidFill>
-                  <a:schemeClr val="accent1"/>
-                </a:solidFill>
-              </a14:hiddenFill>
-            </a:ext>
-            <a:ext uri="{91240B29-F687-4F45-9708-019B960494DF}">
-              <a14:hiddenLine xmlns:a14="http://schemas.microsoft.com/office/drawing/2010/main" w="9525">
-                <a:solidFill>
-                  <a:schemeClr val="tx1"/>
-                </a:solidFill>
-                <a:miter lim="800000"/>
-                <a:headEnd/>
-                <a:tailEnd/>
-              </a14:hiddenLine>
-            </a:ext>
-          </a:extLst>
-        </p:spPr>
-      </p:pic>
-      <p:sp>
-        <p:nvSpPr>
-          <p:cNvPr id="6" name="Cross 5"/>
-          <p:cNvSpPr/>
-          <p:nvPr/>
-        </p:nvSpPr>
-        <p:spPr>
-          <a:xfrm>
-            <a:off x="2843808" y="2787774"/>
-            <a:ext cx="646916" cy="646916"/>
-          </a:xfrm>
-          <a:prstGeom prst="plus">
-            <a:avLst>
-              <a:gd name="adj" fmla="val 40000"/>
-            </a:avLst>
-          </a:prstGeom>
-        </p:spPr>
-        <p:style>
-          <a:lnRef idx="1">
-            <a:schemeClr val="dk1"/>
-          </a:lnRef>
-          <a:fillRef idx="3">
-            <a:schemeClr val="dk1"/>
-          </a:fillRef>
-          <a:effectRef idx="2">
-            <a:schemeClr val="dk1"/>
-          </a:effectRef>
-          <a:fontRef idx="minor">
-            <a:schemeClr val="lt1"/>
-          </a:fontRef>
-        </p:style>
-        <p:txBody>
-          <a:bodyPr rtlCol="0" anchor="ctr"/>
-          <a:lstStyle/>
-          <a:p>
-            <a:pPr algn="ctr"/>
-            <a:endParaRPr lang="en-US"/>
-          </a:p>
-        </p:txBody>
-      </p:sp>
-      <p:sp>
-        <p:nvSpPr>
-          <p:cNvPr id="7" name="TextBox 6"/>
-          <p:cNvSpPr txBox="1"/>
-          <p:nvPr/>
-        </p:nvSpPr>
-        <p:spPr>
-          <a:xfrm>
-            <a:off x="3804116" y="4587974"/>
-            <a:ext cx="1800200" cy="369332"/>
-          </a:xfrm>
-          <a:prstGeom prst="rect">
-            <a:avLst/>
-          </a:prstGeom>
-          <a:noFill/>
-        </p:spPr>
-        <p:txBody>
-          <a:bodyPr wrap="square" rtlCol="0">
-            <a:spAutoFit/>
-          </a:bodyPr>
-          <a:lstStyle/>
-          <a:p>
-            <a:r>
-              <a:rPr lang="en-US" dirty="0" smtClean="0">
-                <a:latin typeface="Times New Roman" panose="02020603050405020304" pitchFamily="18" charset="0"/>
-                <a:cs typeface="Times New Roman" panose="02020603050405020304" pitchFamily="18" charset="0"/>
-              </a:rPr>
-              <a:t>Noise and bump</a:t>
-            </a:r>
-            <a:endParaRPr lang="en-US" dirty="0">
-              <a:latin typeface="Times New Roman" panose="02020603050405020304" pitchFamily="18" charset="0"/>
-              <a:cs typeface="Times New Roman" panose="02020603050405020304" pitchFamily="18" charset="0"/>
-            </a:endParaRPr>
-          </a:p>
-        </p:txBody>
-      </p:sp>
-      <p:sp>
-        <p:nvSpPr>
-          <p:cNvPr id="8" name="Equal 7"/>
-          <p:cNvSpPr/>
-          <p:nvPr/>
-        </p:nvSpPr>
-        <p:spPr>
-          <a:xfrm>
-            <a:off x="5796136" y="2756907"/>
-            <a:ext cx="914400" cy="708650"/>
-          </a:xfrm>
-          <a:prstGeom prst="mathEqual">
-            <a:avLst/>
-          </a:prstGeom>
-        </p:spPr>
-        <p:style>
-          <a:lnRef idx="1">
-            <a:schemeClr val="dk1"/>
-          </a:lnRef>
-          <a:fillRef idx="3">
-            <a:schemeClr val="dk1"/>
-          </a:fillRef>
-          <a:effectRef idx="2">
-            <a:schemeClr val="dk1"/>
-          </a:effectRef>
-          <a:fontRef idx="minor">
-            <a:schemeClr val="lt1"/>
-          </a:fontRef>
-        </p:style>
-        <p:txBody>
-          <a:bodyPr rtlCol="0" anchor="ctr"/>
-          <a:lstStyle/>
-          <a:p>
-            <a:pPr algn="ctr"/>
-            <a:endParaRPr lang="en-US">
-              <a:solidFill>
-                <a:schemeClr val="tx1"/>
-              </a:solidFill>
-            </a:endParaRPr>
-          </a:p>
-        </p:txBody>
-      </p:sp>
     </p:spTree>
     <p:extLst>
       <p:ext uri="{BB962C8B-B14F-4D97-AF65-F5344CB8AC3E}">
-        <p14:creationId xmlns:p14="http://schemas.microsoft.com/office/powerpoint/2010/main" val="4091275918"/>
+        <p14:creationId xmlns:p14="http://schemas.microsoft.com/office/powerpoint/2010/main" val="652161465"/>
       </p:ext>
     </p:extLst>
   </p:cSld>
   <p:clrMapOvr>
     <a:masterClrMapping/>
   </p:clrMapOvr>
+  <p:timing>
+    <p:tnLst>
+      <p:par>
+        <p:cTn id="1" dur="indefinite" restart="never" nodeType="tmRoot">
+          <p:childTnLst>
+            <p:seq concurrent="1" nextAc="seek">
+              <p:cTn id="2" dur="indefinite" nodeType="mainSeq">
+                <p:childTnLst>
+                  <p:par>
+                    <p:cTn id="3" fill="hold">
+                      <p:stCondLst>
+                        <p:cond delay="indefinite"/>
+                      </p:stCondLst>
+                      <p:childTnLst>
+                        <p:par>
+                          <p:cTn id="4" fill="hold">
+                            <p:stCondLst>
+                              <p:cond delay="0"/>
+                            </p:stCondLst>
+                            <p:childTnLst>
+                              <p:par>
+                                <p:cTn id="5" presetID="2" presetClass="entr" presetSubtype="4" fill="hold" nodeType="clickEffect">
+                                  <p:stCondLst>
+                                    <p:cond delay="0"/>
+                                  </p:stCondLst>
+                                  <p:childTnLst>
+                                    <p:set>
+                                      <p:cBhvr>
+                                        <p:cTn id="6" dur="1" fill="hold">
+                                          <p:stCondLst>
+                                            <p:cond delay="0"/>
+                                          </p:stCondLst>
+                                        </p:cTn>
+                                        <p:tgtEl>
+                                          <p:spTgt spid="6"/>
+                                        </p:tgtEl>
+                                        <p:attrNameLst>
+                                          <p:attrName>style.visibility</p:attrName>
+                                        </p:attrNameLst>
+                                      </p:cBhvr>
+                                      <p:to>
+                                        <p:strVal val="visible"/>
+                                      </p:to>
+                                    </p:set>
+                                    <p:anim calcmode="lin" valueType="num">
+                                      <p:cBhvr additive="base">
+                                        <p:cTn id="7" dur="500" fill="hold"/>
+                                        <p:tgtEl>
+                                          <p:spTgt spid="6"/>
+                                        </p:tgtEl>
+                                        <p:attrNameLst>
+                                          <p:attrName>ppt_x</p:attrName>
+                                        </p:attrNameLst>
+                                      </p:cBhvr>
+                                      <p:tavLst>
+                                        <p:tav tm="0">
+                                          <p:val>
+                                            <p:strVal val="#ppt_x"/>
+                                          </p:val>
+                                        </p:tav>
+                                        <p:tav tm="100000">
+                                          <p:val>
+                                            <p:strVal val="#ppt_x"/>
+                                          </p:val>
+                                        </p:tav>
+                                      </p:tavLst>
+                                    </p:anim>
+                                    <p:anim calcmode="lin" valueType="num">
+                                      <p:cBhvr additive="base">
+                                        <p:cTn id="8" dur="500" fill="hold"/>
+                                        <p:tgtEl>
+                                          <p:spTgt spid="6"/>
+                                        </p:tgtEl>
+                                        <p:attrNameLst>
+                                          <p:attrName>ppt_y</p:attrName>
+                                        </p:attrNameLst>
+                                      </p:cBhvr>
+                                      <p:tavLst>
+                                        <p:tav tm="0">
+                                          <p:val>
+                                            <p:strVal val="1+#ppt_h/2"/>
+                                          </p:val>
+                                        </p:tav>
+                                        <p:tav tm="100000">
+                                          <p:val>
+                                            <p:strVal val="#ppt_y"/>
+                                          </p:val>
+                                        </p:tav>
+                                      </p:tavLst>
+                                    </p:anim>
+                                  </p:childTnLst>
+                                </p:cTn>
+                              </p:par>
+                              <p:par>
+                                <p:cTn id="9" presetID="2" presetClass="entr" presetSubtype="4" fill="hold" nodeType="withEffect">
+                                  <p:stCondLst>
+                                    <p:cond delay="0"/>
+                                  </p:stCondLst>
+                                  <p:childTnLst>
+                                    <p:set>
+                                      <p:cBhvr>
+                                        <p:cTn id="10" dur="1" fill="hold">
+                                          <p:stCondLst>
+                                            <p:cond delay="0"/>
+                                          </p:stCondLst>
+                                        </p:cTn>
+                                        <p:tgtEl>
+                                          <p:spTgt spid="5"/>
+                                        </p:tgtEl>
+                                        <p:attrNameLst>
+                                          <p:attrName>style.visibility</p:attrName>
+                                        </p:attrNameLst>
+                                      </p:cBhvr>
+                                      <p:to>
+                                        <p:strVal val="visible"/>
+                                      </p:to>
+                                    </p:set>
+                                    <p:anim calcmode="lin" valueType="num">
+                                      <p:cBhvr additive="base">
+                                        <p:cTn id="11" dur="500" fill="hold"/>
+                                        <p:tgtEl>
+                                          <p:spTgt spid="5"/>
+                                        </p:tgtEl>
+                                        <p:attrNameLst>
+                                          <p:attrName>ppt_x</p:attrName>
+                                        </p:attrNameLst>
+                                      </p:cBhvr>
+                                      <p:tavLst>
+                                        <p:tav tm="0">
+                                          <p:val>
+                                            <p:strVal val="#ppt_x"/>
+                                          </p:val>
+                                        </p:tav>
+                                        <p:tav tm="100000">
+                                          <p:val>
+                                            <p:strVal val="#ppt_x"/>
+                                          </p:val>
+                                        </p:tav>
+                                      </p:tavLst>
+                                    </p:anim>
+                                    <p:anim calcmode="lin" valueType="num">
+                                      <p:cBhvr additive="base">
+                                        <p:cTn id="12" dur="500" fill="hold"/>
+                                        <p:tgtEl>
+                                          <p:spTgt spid="5"/>
+                                        </p:tgtEl>
+                                        <p:attrNameLst>
+                                          <p:attrName>ppt_y</p:attrName>
+                                        </p:attrNameLst>
+                                      </p:cBhvr>
+                                      <p:tavLst>
+                                        <p:tav tm="0">
+                                          <p:val>
+                                            <p:strVal val="1+#ppt_h/2"/>
+                                          </p:val>
+                                        </p:tav>
+                                        <p:tav tm="100000">
+                                          <p:val>
+                                            <p:strVal val="#ppt_y"/>
+                                          </p:val>
+                                        </p:tav>
+                                      </p:tavLst>
+                                    </p:anim>
+                                  </p:childTnLst>
+                                </p:cTn>
+                              </p:par>
+                            </p:childTnLst>
+                          </p:cTn>
+                        </p:par>
+                      </p:childTnLst>
+                    </p:cTn>
+                  </p:par>
+                </p:childTnLst>
+              </p:cTn>
+              <p:prevCondLst>
+                <p:cond evt="onPrev" delay="0">
+                  <p:tgtEl>
+                    <p:sldTgt/>
+                  </p:tgtEl>
+                </p:cond>
+              </p:prevCondLst>
+              <p:nextCondLst>
+                <p:cond evt="onNext" delay="0">
+                  <p:tgtEl>
+                    <p:sldTgt/>
+                  </p:tgtEl>
+                </p:cond>
+              </p:nextCondLst>
+            </p:seq>
+          </p:childTnLst>
+        </p:cTn>
+      </p:par>
+    </p:tnLst>
+  </p:timing>
 </p:sld>
 </file>
 
@@ -4691,7 +6630,14 @@
                 <a:latin typeface="Times New Roman" panose="02020603050405020304" pitchFamily="18" charset="0"/>
                 <a:cs typeface="Times New Roman" panose="02020603050405020304" pitchFamily="18" charset="0"/>
               </a:rPr>
-              <a:t>User Interaction</a:t>
+              <a:t>Mesh </a:t>
+            </a:r>
+            <a:r>
+              <a:rPr lang="en-US" sz="2800" b="1" i="1" dirty="0" err="1" smtClean="0">
+                <a:latin typeface="Times New Roman" panose="02020603050405020304" pitchFamily="18" charset="0"/>
+                <a:cs typeface="Times New Roman" panose="02020603050405020304" pitchFamily="18" charset="0"/>
+              </a:rPr>
+              <a:t>manipulation:flamingo</a:t>
             </a:r>
             <a:endParaRPr lang="en-US" sz="2800" b="1" i="1" dirty="0">
               <a:latin typeface="Times New Roman" panose="02020603050405020304" pitchFamily="18" charset="0"/>
@@ -4702,7 +6648,7 @@
       </p:sp>
       <p:sp>
         <p:nvSpPr>
-          <p:cNvPr id="3" name="Content Placeholder 2"/>
+          <p:cNvPr id="7" name="内容占位符 6"/>
           <p:cNvSpPr>
             <a:spLocks noGrp="1"/>
           </p:cNvSpPr>
@@ -4712,159 +6658,1089 @@
         </p:nvSpPr>
         <p:spPr/>
         <p:txBody>
-          <a:bodyPr>
-            <a:normAutofit/>
+          <a:bodyPr/>
+          <a:lstStyle/>
+          <a:p>
+            <a:r>
+              <a:rPr kumimoji="1" lang="en-US" altLang="zh-CN" dirty="0" smtClean="0"/>
+              <a:t>Position</a:t>
+            </a:r>
+          </a:p>
+          <a:p>
+            <a:endParaRPr kumimoji="1" lang="zh-CN" altLang="en-US" dirty="0"/>
+          </a:p>
+        </p:txBody>
+      </p:sp>
+      <p:sp>
+        <p:nvSpPr>
+          <p:cNvPr id="8" name="文本框 7"/>
+          <p:cNvSpPr txBox="1"/>
+          <p:nvPr/>
+        </p:nvSpPr>
+        <p:spPr>
+          <a:xfrm>
+            <a:off x="457201" y="1772534"/>
+            <a:ext cx="3610744" cy="1323439"/>
+          </a:xfrm>
+          <a:prstGeom prst="rect">
+            <a:avLst/>
+          </a:prstGeom>
+          <a:noFill/>
+        </p:spPr>
+        <p:txBody>
+          <a:bodyPr wrap="square" rtlCol="0">
+            <a:spAutoFit/>
           </a:bodyPr>
-          <a:lstStyle/>
-          <a:p>
-            <a:r>
-              <a:rPr lang="en-US" sz="2400" dirty="0" smtClean="0">
-                <a:latin typeface="Times New Roman" panose="02020603050405020304" pitchFamily="18" charset="0"/>
-                <a:cs typeface="Times New Roman" panose="02020603050405020304" pitchFamily="18" charset="0"/>
-              </a:rPr>
-              <a:t>Keyboard</a:t>
-            </a:r>
-          </a:p>
-          <a:p>
-            <a:pPr lvl="1"/>
-            <a:r>
-              <a:rPr lang="en-US" sz="2000" dirty="0" smtClean="0">
-                <a:latin typeface="Times New Roman" panose="02020603050405020304" pitchFamily="18" charset="0"/>
-                <a:cs typeface="Times New Roman" panose="02020603050405020304" pitchFamily="18" charset="0"/>
-              </a:rPr>
-              <a:t>0: stop or continue any movement;</a:t>
-            </a:r>
-          </a:p>
-          <a:p>
-            <a:pPr lvl="1"/>
-            <a:r>
-              <a:rPr lang="en-US" sz="2000" dirty="0" smtClean="0">
-                <a:latin typeface="Times New Roman" panose="02020603050405020304" pitchFamily="18" charset="0"/>
-                <a:cs typeface="Times New Roman" panose="02020603050405020304" pitchFamily="18" charset="0"/>
-              </a:rPr>
-              <a:t>1: </a:t>
-            </a:r>
-            <a:r>
-              <a:rPr lang="en-US" altLang="zh-HK" sz="2000" dirty="0" smtClean="0">
-                <a:latin typeface="Times New Roman" panose="02020603050405020304" pitchFamily="18" charset="0"/>
-                <a:cs typeface="Times New Roman" panose="02020603050405020304" pitchFamily="18" charset="0"/>
-              </a:rPr>
-              <a:t>move along positive x (right);</a:t>
-            </a:r>
-            <a:endParaRPr lang="en-US" sz="2000" dirty="0" smtClean="0">
+          <a:lstStyle>
+            <a:defPPr>
+              <a:defRPr lang="zh-HK"/>
+            </a:defPPr>
+            <a:lvl1pPr>
+              <a:defRPr kumimoji="1"/>
+            </a:lvl1pPr>
+          </a:lstStyle>
+          <a:p>
+            <a:r>
+              <a:rPr lang="en-US" altLang="zh-CN" sz="1600" dirty="0" smtClean="0">
+                <a:latin typeface="Times New Roman" panose="02020603050405020304" pitchFamily="18" charset="0"/>
+                <a:cs typeface="Times New Roman" panose="02020603050405020304" pitchFamily="18" charset="0"/>
+              </a:rPr>
+              <a:t>Before hitting the ball:</a:t>
+            </a:r>
+          </a:p>
+          <a:p>
+            <a:endParaRPr lang="en-US" altLang="zh-CN" sz="1600" dirty="0">
               <a:latin typeface="Times New Roman" panose="02020603050405020304" pitchFamily="18" charset="0"/>
               <a:cs typeface="Times New Roman" panose="02020603050405020304" pitchFamily="18" charset="0"/>
             </a:endParaRPr>
           </a:p>
           <a:p>
-            <a:pPr lvl="1"/>
-            <a:r>
-              <a:rPr lang="en-US" sz="2000" dirty="0" smtClean="0">
-                <a:latin typeface="Times New Roman" panose="02020603050405020304" pitchFamily="18" charset="0"/>
-                <a:cs typeface="Times New Roman" panose="02020603050405020304" pitchFamily="18" charset="0"/>
-              </a:rPr>
-              <a:t>2: move along negative x (left, by default);</a:t>
-            </a:r>
-          </a:p>
-          <a:p>
-            <a:pPr lvl="1"/>
-            <a:r>
-              <a:rPr lang="en-US" sz="2000" dirty="0" smtClean="0">
-                <a:latin typeface="Times New Roman" panose="02020603050405020304" pitchFamily="18" charset="0"/>
-                <a:cs typeface="Times New Roman" panose="02020603050405020304" pitchFamily="18" charset="0"/>
-              </a:rPr>
-              <a:t>3: </a:t>
-            </a:r>
-            <a:r>
-              <a:rPr lang="en-US" altLang="zh-HK" sz="2000" dirty="0" smtClean="0">
-                <a:latin typeface="Times New Roman" panose="02020603050405020304" pitchFamily="18" charset="0"/>
-                <a:cs typeface="Times New Roman" panose="02020603050405020304" pitchFamily="18" charset="0"/>
-              </a:rPr>
-              <a:t>move along positive y (down); </a:t>
-            </a:r>
-          </a:p>
-          <a:p>
-            <a:pPr lvl="1"/>
-            <a:r>
-              <a:rPr lang="en-US" sz="2000" dirty="0" smtClean="0">
-                <a:latin typeface="Times New Roman" panose="02020603050405020304" pitchFamily="18" charset="0"/>
-                <a:cs typeface="Times New Roman" panose="02020603050405020304" pitchFamily="18" charset="0"/>
-              </a:rPr>
-              <a:t>4: </a:t>
-            </a:r>
-            <a:r>
-              <a:rPr lang="en-US" altLang="zh-HK" sz="2000" dirty="0" smtClean="0">
-                <a:latin typeface="Times New Roman" panose="02020603050405020304" pitchFamily="18" charset="0"/>
-                <a:cs typeface="Times New Roman" panose="02020603050405020304" pitchFamily="18" charset="0"/>
-              </a:rPr>
-              <a:t>move along negative y (up); </a:t>
-            </a:r>
-          </a:p>
-          <a:p>
-            <a:pPr lvl="1"/>
-            <a:r>
-              <a:rPr lang="en-US" altLang="zh-HK" sz="2000" dirty="0" smtClean="0">
-                <a:latin typeface="Times New Roman" panose="02020603050405020304" pitchFamily="18" charset="0"/>
-                <a:cs typeface="Times New Roman" panose="02020603050405020304" pitchFamily="18" charset="0"/>
-              </a:rPr>
-              <a:t>5: move along positive z (farther); </a:t>
-            </a:r>
-          </a:p>
-          <a:p>
-            <a:pPr lvl="1"/>
-            <a:r>
-              <a:rPr lang="en-US" altLang="zh-HK" sz="2000" dirty="0">
-                <a:latin typeface="Times New Roman" panose="02020603050405020304" pitchFamily="18" charset="0"/>
-                <a:cs typeface="Times New Roman" panose="02020603050405020304" pitchFamily="18" charset="0"/>
-              </a:rPr>
-              <a:t>6</a:t>
-            </a:r>
-            <a:r>
-              <a:rPr lang="en-US" altLang="zh-HK" sz="2000" dirty="0" smtClean="0">
-                <a:latin typeface="Times New Roman" panose="02020603050405020304" pitchFamily="18" charset="0"/>
-                <a:cs typeface="Times New Roman" panose="02020603050405020304" pitchFamily="18" charset="0"/>
-              </a:rPr>
-              <a:t>: move along negative z (nearer); </a:t>
-            </a:r>
-          </a:p>
-          <a:p>
-            <a:pPr lvl="1"/>
-            <a:endParaRPr lang="en-US" sz="2000" dirty="0" smtClean="0">
+            <a:r>
+              <a:rPr lang="en-US" altLang="zh-CN" sz="1600" dirty="0">
+                <a:latin typeface="Times New Roman" panose="02020603050405020304" pitchFamily="18" charset="0"/>
+                <a:cs typeface="Times New Roman" panose="02020603050405020304" pitchFamily="18" charset="0"/>
+              </a:rPr>
+              <a:t>meshes[ </a:t>
+            </a:r>
+            <a:r>
+              <a:rPr lang="en-US" altLang="zh-CN" sz="1600" dirty="0" err="1">
+                <a:latin typeface="Times New Roman" panose="02020603050405020304" pitchFamily="18" charset="0"/>
+                <a:cs typeface="Times New Roman" panose="02020603050405020304" pitchFamily="18" charset="0"/>
+              </a:rPr>
+              <a:t>i</a:t>
+            </a:r>
+            <a:r>
+              <a:rPr lang="en-US" altLang="zh-CN" sz="1600" dirty="0">
+                <a:latin typeface="Times New Roman" panose="02020603050405020304" pitchFamily="18" charset="0"/>
+                <a:cs typeface="Times New Roman" panose="02020603050405020304" pitchFamily="18" charset="0"/>
+              </a:rPr>
+              <a:t> ].</a:t>
+            </a:r>
+            <a:r>
+              <a:rPr lang="en-US" altLang="zh-CN" sz="1600" dirty="0" err="1">
+                <a:latin typeface="Times New Roman" panose="02020603050405020304" pitchFamily="18" charset="0"/>
+                <a:cs typeface="Times New Roman" panose="02020603050405020304" pitchFamily="18" charset="0"/>
+              </a:rPr>
+              <a:t>position.x</a:t>
+            </a:r>
+            <a:r>
+              <a:rPr lang="en-US" altLang="zh-CN" sz="1600" dirty="0">
+                <a:latin typeface="Times New Roman" panose="02020603050405020304" pitchFamily="18" charset="0"/>
+                <a:cs typeface="Times New Roman" panose="02020603050405020304" pitchFamily="18" charset="0"/>
+              </a:rPr>
+              <a:t>-=step</a:t>
+            </a:r>
+            <a:r>
+              <a:rPr lang="en-US" altLang="zh-CN" sz="1600" dirty="0" smtClean="0">
+                <a:latin typeface="Times New Roman" panose="02020603050405020304" pitchFamily="18" charset="0"/>
+                <a:cs typeface="Times New Roman" panose="02020603050405020304" pitchFamily="18" charset="0"/>
+              </a:rPr>
+              <a:t>;</a:t>
+            </a:r>
+          </a:p>
+          <a:p>
+            <a:r>
+              <a:rPr lang="en-US" altLang="zh-CN" sz="1600" dirty="0">
+                <a:latin typeface="Times New Roman" panose="02020603050405020304" pitchFamily="18" charset="0"/>
+                <a:cs typeface="Times New Roman" panose="02020603050405020304" pitchFamily="18" charset="0"/>
+              </a:rPr>
+              <a:t>meshes[</a:t>
+            </a:r>
+            <a:r>
+              <a:rPr lang="en-US" altLang="zh-CN" sz="1600" dirty="0" err="1">
+                <a:latin typeface="Times New Roman" panose="02020603050405020304" pitchFamily="18" charset="0"/>
+                <a:cs typeface="Times New Roman" panose="02020603050405020304" pitchFamily="18" charset="0"/>
+              </a:rPr>
+              <a:t>i</a:t>
+            </a:r>
+            <a:r>
+              <a:rPr lang="en-US" altLang="zh-CN" sz="1600" dirty="0">
+                <a:latin typeface="Times New Roman" panose="02020603050405020304" pitchFamily="18" charset="0"/>
+                <a:cs typeface="Times New Roman" panose="02020603050405020304" pitchFamily="18" charset="0"/>
+              </a:rPr>
+              <a:t>].</a:t>
+            </a:r>
+            <a:r>
+              <a:rPr lang="en-US" altLang="zh-CN" sz="1600" dirty="0" err="1">
+                <a:latin typeface="Times New Roman" panose="02020603050405020304" pitchFamily="18" charset="0"/>
+                <a:cs typeface="Times New Roman" panose="02020603050405020304" pitchFamily="18" charset="0"/>
+              </a:rPr>
+              <a:t>position.y</a:t>
+            </a:r>
+            <a:r>
+              <a:rPr lang="en-US" altLang="zh-CN" sz="1600" dirty="0">
+                <a:latin typeface="Times New Roman" panose="02020603050405020304" pitchFamily="18" charset="0"/>
+                <a:cs typeface="Times New Roman" panose="02020603050405020304" pitchFamily="18" charset="0"/>
+              </a:rPr>
+              <a:t>=50 + 4*</a:t>
+            </a:r>
+            <a:r>
+              <a:rPr lang="en-US" altLang="zh-CN" sz="1600" dirty="0" err="1">
+                <a:latin typeface="Times New Roman" panose="02020603050405020304" pitchFamily="18" charset="0"/>
+                <a:cs typeface="Times New Roman" panose="02020603050405020304" pitchFamily="18" charset="0"/>
+              </a:rPr>
+              <a:t>Math.cos</a:t>
+            </a:r>
+            <a:r>
+              <a:rPr lang="en-US" altLang="zh-CN" sz="1600" dirty="0">
+                <a:latin typeface="Times New Roman" panose="02020603050405020304" pitchFamily="18" charset="0"/>
+                <a:cs typeface="Times New Roman" panose="02020603050405020304" pitchFamily="18" charset="0"/>
+              </a:rPr>
+              <a:t>(</a:t>
+            </a:r>
+            <a:r>
+              <a:rPr lang="en-US" altLang="zh-CN" sz="1600" dirty="0" err="1">
+                <a:latin typeface="Times New Roman" panose="02020603050405020304" pitchFamily="18" charset="0"/>
+                <a:cs typeface="Times New Roman" panose="02020603050405020304" pitchFamily="18" charset="0"/>
+              </a:rPr>
+              <a:t>px</a:t>
+            </a:r>
+            <a:r>
+              <a:rPr lang="en-US" altLang="zh-CN" sz="1600" dirty="0">
+                <a:latin typeface="Times New Roman" panose="02020603050405020304" pitchFamily="18" charset="0"/>
+                <a:cs typeface="Times New Roman" panose="02020603050405020304" pitchFamily="18" charset="0"/>
+              </a:rPr>
+              <a:t>/10);</a:t>
+            </a:r>
+            <a:endParaRPr lang="zh-CN" altLang="en-US" sz="1600" dirty="0">
               <a:latin typeface="Times New Roman" panose="02020603050405020304" pitchFamily="18" charset="0"/>
               <a:cs typeface="Times New Roman" panose="02020603050405020304" pitchFamily="18" charset="0"/>
             </a:endParaRPr>
           </a:p>
-          <a:p>
-            <a:endParaRPr lang="en-US" sz="2400" dirty="0">
+        </p:txBody>
+      </p:sp>
+      <p:sp>
+        <p:nvSpPr>
+          <p:cNvPr id="9" name="文本框 8"/>
+          <p:cNvSpPr txBox="1"/>
+          <p:nvPr/>
+        </p:nvSpPr>
+        <p:spPr>
+          <a:xfrm>
+            <a:off x="4355976" y="1772534"/>
+            <a:ext cx="4330824" cy="1569660"/>
+          </a:xfrm>
+          <a:prstGeom prst="rect">
+            <a:avLst/>
+          </a:prstGeom>
+          <a:noFill/>
+        </p:spPr>
+        <p:txBody>
+          <a:bodyPr wrap="square" rtlCol="0">
+            <a:spAutoFit/>
+          </a:bodyPr>
+          <a:lstStyle>
+            <a:defPPr>
+              <a:defRPr lang="zh-HK"/>
+            </a:defPPr>
+            <a:lvl1pPr>
+              <a:defRPr kumimoji="1"/>
+            </a:lvl1pPr>
+          </a:lstStyle>
+          <a:p>
+            <a:r>
+              <a:rPr lang="en-US" altLang="zh-CN" sz="1600" dirty="0" smtClean="0">
+                <a:latin typeface="Times New Roman" panose="02020603050405020304" pitchFamily="18" charset="0"/>
+                <a:cs typeface="Times New Roman" panose="02020603050405020304" pitchFamily="18" charset="0"/>
+              </a:rPr>
+              <a:t>When hitting the ball:</a:t>
+            </a:r>
+          </a:p>
+          <a:p>
+            <a:endParaRPr lang="en-US" altLang="zh-CN" sz="1600" dirty="0">
               <a:latin typeface="Times New Roman" panose="02020603050405020304" pitchFamily="18" charset="0"/>
               <a:cs typeface="Times New Roman" panose="02020603050405020304" pitchFamily="18" charset="0"/>
             </a:endParaRPr>
           </a:p>
           <a:p>
-            <a:endParaRPr lang="en-US" sz="2000" dirty="0" smtClean="0">
+            <a:r>
+              <a:rPr lang="en-US" altLang="zh-CN" sz="1600" dirty="0">
+                <a:latin typeface="Times New Roman" panose="02020603050405020304" pitchFamily="18" charset="0"/>
+                <a:cs typeface="Times New Roman" panose="02020603050405020304" pitchFamily="18" charset="0"/>
+              </a:rPr>
+              <a:t>meshes[ </a:t>
+            </a:r>
+            <a:r>
+              <a:rPr lang="en-US" altLang="zh-CN" sz="1600" dirty="0" err="1">
+                <a:latin typeface="Times New Roman" panose="02020603050405020304" pitchFamily="18" charset="0"/>
+                <a:cs typeface="Times New Roman" panose="02020603050405020304" pitchFamily="18" charset="0"/>
+              </a:rPr>
+              <a:t>i</a:t>
+            </a:r>
+            <a:r>
+              <a:rPr lang="en-US" altLang="zh-CN" sz="1600" dirty="0">
+                <a:latin typeface="Times New Roman" panose="02020603050405020304" pitchFamily="18" charset="0"/>
+                <a:cs typeface="Times New Roman" panose="02020603050405020304" pitchFamily="18" charset="0"/>
+              </a:rPr>
+              <a:t> ].</a:t>
+            </a:r>
+            <a:r>
+              <a:rPr lang="en-US" altLang="zh-CN" sz="1600" dirty="0" err="1">
+                <a:latin typeface="Times New Roman" panose="02020603050405020304" pitchFamily="18" charset="0"/>
+                <a:cs typeface="Times New Roman" panose="02020603050405020304" pitchFamily="18" charset="0"/>
+              </a:rPr>
+              <a:t>position.x</a:t>
+            </a:r>
+            <a:r>
+              <a:rPr lang="en-US" altLang="zh-CN" sz="1600" dirty="0">
+                <a:latin typeface="Times New Roman" panose="02020603050405020304" pitchFamily="18" charset="0"/>
+                <a:cs typeface="Times New Roman" panose="02020603050405020304" pitchFamily="18" charset="0"/>
+              </a:rPr>
+              <a:t>-=</a:t>
+            </a:r>
+            <a:r>
+              <a:rPr lang="en-US" altLang="zh-CN" sz="1600" dirty="0" smtClean="0">
+                <a:latin typeface="Times New Roman" panose="02020603050405020304" pitchFamily="18" charset="0"/>
+                <a:cs typeface="Times New Roman" panose="02020603050405020304" pitchFamily="18" charset="0"/>
+              </a:rPr>
+              <a:t>step;</a:t>
+            </a:r>
+          </a:p>
+          <a:p>
+            <a:r>
+              <a:rPr lang="en-US" altLang="zh-CN" sz="1600" dirty="0" smtClean="0">
+                <a:latin typeface="Times New Roman" panose="02020603050405020304" pitchFamily="18" charset="0"/>
+                <a:cs typeface="Times New Roman" panose="02020603050405020304" pitchFamily="18" charset="0"/>
+              </a:rPr>
+              <a:t>if(</a:t>
+            </a:r>
+            <a:r>
+              <a:rPr lang="en-US" altLang="zh-CN" sz="1600" dirty="0" err="1" smtClean="0">
+                <a:latin typeface="Times New Roman" panose="02020603050405020304" pitchFamily="18" charset="0"/>
+                <a:cs typeface="Times New Roman" panose="02020603050405020304" pitchFamily="18" charset="0"/>
+              </a:rPr>
+              <a:t>Math.abs</a:t>
+            </a:r>
+            <a:r>
+              <a:rPr lang="en-US" altLang="zh-CN" sz="1600" dirty="0" smtClean="0">
+                <a:latin typeface="Times New Roman" panose="02020603050405020304" pitchFamily="18" charset="0"/>
+                <a:cs typeface="Times New Roman" panose="02020603050405020304" pitchFamily="18" charset="0"/>
+              </a:rPr>
+              <a:t>(</a:t>
+            </a:r>
+            <a:r>
+              <a:rPr lang="en-US" altLang="zh-CN" sz="1600" dirty="0" err="1" smtClean="0">
+                <a:latin typeface="Times New Roman" panose="02020603050405020304" pitchFamily="18" charset="0"/>
+                <a:cs typeface="Times New Roman" panose="02020603050405020304" pitchFamily="18" charset="0"/>
+              </a:rPr>
+              <a:t>px</a:t>
+            </a:r>
+            <a:r>
+              <a:rPr lang="en-US" altLang="zh-CN" sz="1600" dirty="0">
+                <a:latin typeface="Times New Roman" panose="02020603050405020304" pitchFamily="18" charset="0"/>
+                <a:cs typeface="Times New Roman" panose="02020603050405020304" pitchFamily="18" charset="0"/>
+              </a:rPr>
+              <a:t>-</a:t>
+            </a:r>
+            <a:r>
+              <a:rPr lang="en-US" altLang="zh-CN" sz="1600" dirty="0" smtClean="0">
+                <a:latin typeface="Times New Roman" panose="02020603050405020304" pitchFamily="18" charset="0"/>
+                <a:cs typeface="Times New Roman" panose="02020603050405020304" pitchFamily="18" charset="0"/>
+              </a:rPr>
+              <a:t>meshes[</a:t>
+            </a:r>
+            <a:r>
+              <a:rPr lang="en-US" altLang="zh-CN" sz="1600" dirty="0" err="1" smtClean="0">
+                <a:latin typeface="Times New Roman" panose="02020603050405020304" pitchFamily="18" charset="0"/>
+                <a:cs typeface="Times New Roman" panose="02020603050405020304" pitchFamily="18" charset="0"/>
+              </a:rPr>
+              <a:t>meshlen</a:t>
+            </a:r>
+            <a:r>
+              <a:rPr lang="en-US" altLang="zh-CN" sz="1600" dirty="0">
+                <a:latin typeface="Times New Roman" panose="02020603050405020304" pitchFamily="18" charset="0"/>
+                <a:cs typeface="Times New Roman" panose="02020603050405020304" pitchFamily="18" charset="0"/>
+              </a:rPr>
+              <a:t>].</a:t>
+            </a:r>
+            <a:r>
+              <a:rPr lang="en-US" altLang="zh-CN" sz="1600" dirty="0" err="1">
+                <a:latin typeface="Times New Roman" panose="02020603050405020304" pitchFamily="18" charset="0"/>
+                <a:cs typeface="Times New Roman" panose="02020603050405020304" pitchFamily="18" charset="0"/>
+              </a:rPr>
+              <a:t>position.x</a:t>
+            </a:r>
+            <a:r>
+              <a:rPr lang="en-US" altLang="zh-CN" sz="1600" dirty="0">
+                <a:latin typeface="Times New Roman" panose="02020603050405020304" pitchFamily="18" charset="0"/>
+                <a:cs typeface="Times New Roman" panose="02020603050405020304" pitchFamily="18" charset="0"/>
+              </a:rPr>
+              <a:t>)&lt;60</a:t>
+            </a:r>
+            <a:r>
+              <a:rPr lang="en-US" altLang="zh-CN" sz="1600" dirty="0" smtClean="0">
+                <a:latin typeface="Times New Roman" panose="02020603050405020304" pitchFamily="18" charset="0"/>
+                <a:cs typeface="Times New Roman" panose="02020603050405020304" pitchFamily="18" charset="0"/>
+              </a:rPr>
+              <a:t>){</a:t>
+            </a:r>
+          </a:p>
+          <a:p>
+            <a:r>
+              <a:rPr lang="en-US" altLang="zh-CN" sz="1600" dirty="0" smtClean="0">
+                <a:latin typeface="Times New Roman" panose="02020603050405020304" pitchFamily="18" charset="0"/>
+                <a:cs typeface="Times New Roman" panose="02020603050405020304" pitchFamily="18" charset="0"/>
+              </a:rPr>
+              <a:t>meshes[</a:t>
+            </a:r>
+            <a:r>
+              <a:rPr lang="en-US" altLang="zh-CN" sz="1600" dirty="0" err="1" smtClean="0">
+                <a:latin typeface="Times New Roman" panose="02020603050405020304" pitchFamily="18" charset="0"/>
+                <a:cs typeface="Times New Roman" panose="02020603050405020304" pitchFamily="18" charset="0"/>
+              </a:rPr>
+              <a:t>i</a:t>
+            </a:r>
+            <a:r>
+              <a:rPr lang="en-US" altLang="zh-CN" sz="1600" dirty="0">
+                <a:latin typeface="Times New Roman" panose="02020603050405020304" pitchFamily="18" charset="0"/>
+                <a:cs typeface="Times New Roman" panose="02020603050405020304" pitchFamily="18" charset="0"/>
+              </a:rPr>
+              <a:t>].</a:t>
+            </a:r>
+            <a:r>
+              <a:rPr lang="en-US" altLang="zh-CN" sz="1600" dirty="0" err="1">
+                <a:latin typeface="Times New Roman" panose="02020603050405020304" pitchFamily="18" charset="0"/>
+                <a:cs typeface="Times New Roman" panose="02020603050405020304" pitchFamily="18" charset="0"/>
+              </a:rPr>
+              <a:t>position.y</a:t>
+            </a:r>
+            <a:r>
+              <a:rPr lang="en-US" altLang="zh-CN" sz="1600" dirty="0">
+                <a:latin typeface="Times New Roman" panose="02020603050405020304" pitchFamily="18" charset="0"/>
+                <a:cs typeface="Times New Roman" panose="02020603050405020304" pitchFamily="18" charset="0"/>
+              </a:rPr>
+              <a:t>=50+25*</a:t>
+            </a:r>
+            <a:r>
+              <a:rPr lang="en-US" altLang="zh-CN" sz="1600" dirty="0" err="1">
+                <a:latin typeface="Times New Roman" panose="02020603050405020304" pitchFamily="18" charset="0"/>
+                <a:cs typeface="Times New Roman" panose="02020603050405020304" pitchFamily="18" charset="0"/>
+              </a:rPr>
+              <a:t>Math.cos</a:t>
+            </a:r>
+            <a:r>
+              <a:rPr lang="en-US" altLang="zh-CN" sz="1600" dirty="0">
+                <a:latin typeface="Times New Roman" panose="02020603050405020304" pitchFamily="18" charset="0"/>
+                <a:cs typeface="Times New Roman" panose="02020603050405020304" pitchFamily="18" charset="0"/>
+              </a:rPr>
+              <a:t>(0.5*</a:t>
+            </a:r>
+            <a:r>
+              <a:rPr lang="en-US" altLang="zh-CN" sz="1600" dirty="0" err="1">
+                <a:latin typeface="Times New Roman" panose="02020603050405020304" pitchFamily="18" charset="0"/>
+                <a:cs typeface="Times New Roman" panose="02020603050405020304" pitchFamily="18" charset="0"/>
+              </a:rPr>
+              <a:t>Math.PI</a:t>
+            </a:r>
+            <a:r>
+              <a:rPr lang="en-US" altLang="zh-CN" sz="1600" dirty="0">
+                <a:latin typeface="Times New Roman" panose="02020603050405020304" pitchFamily="18" charset="0"/>
+                <a:cs typeface="Times New Roman" panose="02020603050405020304" pitchFamily="18" charset="0"/>
+              </a:rPr>
+              <a:t>*(</a:t>
+            </a:r>
+            <a:r>
+              <a:rPr lang="en-US" altLang="zh-CN" sz="1600" dirty="0" err="1">
+                <a:latin typeface="Times New Roman" panose="02020603050405020304" pitchFamily="18" charset="0"/>
+                <a:cs typeface="Times New Roman" panose="02020603050405020304" pitchFamily="18" charset="0"/>
+              </a:rPr>
+              <a:t>px</a:t>
+            </a:r>
+            <a:r>
+              <a:rPr lang="en-US" altLang="zh-CN" sz="1600" dirty="0">
+                <a:latin typeface="Times New Roman" panose="02020603050405020304" pitchFamily="18" charset="0"/>
+                <a:cs typeface="Times New Roman" panose="02020603050405020304" pitchFamily="18" charset="0"/>
+              </a:rPr>
+              <a:t>-meshes[</a:t>
+            </a:r>
+            <a:r>
+              <a:rPr lang="en-US" altLang="zh-CN" sz="1600" dirty="0" err="1">
+                <a:latin typeface="Times New Roman" panose="02020603050405020304" pitchFamily="18" charset="0"/>
+                <a:cs typeface="Times New Roman" panose="02020603050405020304" pitchFamily="18" charset="0"/>
+              </a:rPr>
+              <a:t>meshlen</a:t>
+            </a:r>
+            <a:r>
+              <a:rPr lang="en-US" altLang="zh-CN" sz="1600" dirty="0">
+                <a:latin typeface="Times New Roman" panose="02020603050405020304" pitchFamily="18" charset="0"/>
+                <a:cs typeface="Times New Roman" panose="02020603050405020304" pitchFamily="18" charset="0"/>
+              </a:rPr>
+              <a:t>].</a:t>
+            </a:r>
+            <a:r>
+              <a:rPr lang="en-US" altLang="zh-CN" sz="1600" dirty="0" err="1">
+                <a:latin typeface="Times New Roman" panose="02020603050405020304" pitchFamily="18" charset="0"/>
+                <a:cs typeface="Times New Roman" panose="02020603050405020304" pitchFamily="18" charset="0"/>
+              </a:rPr>
+              <a:t>position.x</a:t>
+            </a:r>
+            <a:r>
+              <a:rPr lang="en-US" altLang="zh-CN" sz="1600" dirty="0">
+                <a:latin typeface="Times New Roman" panose="02020603050405020304" pitchFamily="18" charset="0"/>
+                <a:cs typeface="Times New Roman" panose="02020603050405020304" pitchFamily="18" charset="0"/>
+              </a:rPr>
+              <a:t>)/60</a:t>
+            </a:r>
+            <a:r>
+              <a:rPr lang="en-US" altLang="zh-CN" sz="1600" dirty="0" smtClean="0">
+                <a:latin typeface="Times New Roman" panose="02020603050405020304" pitchFamily="18" charset="0"/>
+                <a:cs typeface="Times New Roman" panose="02020603050405020304" pitchFamily="18" charset="0"/>
+              </a:rPr>
+              <a:t>)}</a:t>
+            </a:r>
+            <a:endParaRPr lang="zh-CN" altLang="en-US" sz="1600" dirty="0">
               <a:latin typeface="Times New Roman" panose="02020603050405020304" pitchFamily="18" charset="0"/>
               <a:cs typeface="Times New Roman" panose="02020603050405020304" pitchFamily="18" charset="0"/>
             </a:endParaRPr>
           </a:p>
-          <a:p>
-            <a:pPr lvl="1"/>
-            <a:endParaRPr lang="en-US" sz="2000" dirty="0">
-              <a:latin typeface="Times New Roman" panose="02020603050405020304" pitchFamily="18" charset="0"/>
-              <a:cs typeface="Times New Roman" panose="02020603050405020304" pitchFamily="18" charset="0"/>
-            </a:endParaRPr>
-          </a:p>
-        </p:txBody>
-      </p:sp>
+        </p:txBody>
+      </p:sp>
+      <p:pic>
+        <p:nvPicPr>
+          <p:cNvPr id="10" name="图片 9"/>
+          <p:cNvPicPr>
+            <a:picLocks noChangeAspect="1"/>
+          </p:cNvPicPr>
+          <p:nvPr/>
+        </p:nvPicPr>
+        <p:blipFill rotWithShape="1">
+          <a:blip r:embed="rId2"/>
+          <a:srcRect r="1295"/>
+          <a:stretch/>
+        </p:blipFill>
+        <p:spPr>
+          <a:xfrm>
+            <a:off x="251520" y="4137815"/>
+            <a:ext cx="2705055" cy="306143"/>
+          </a:xfrm>
+          <a:prstGeom prst="rect">
+            <a:avLst/>
+          </a:prstGeom>
+        </p:spPr>
+      </p:pic>
+      <p:grpSp>
+        <p:nvGrpSpPr>
+          <p:cNvPr id="27" name="组 26"/>
+          <p:cNvGrpSpPr/>
+          <p:nvPr/>
+        </p:nvGrpSpPr>
+        <p:grpSpPr>
+          <a:xfrm>
+            <a:off x="3707487" y="3468290"/>
+            <a:ext cx="4979313" cy="975668"/>
+            <a:chOff x="3707487" y="3252266"/>
+            <a:chExt cx="4979313" cy="975668"/>
+          </a:xfrm>
+        </p:grpSpPr>
+        <p:grpSp>
+          <p:nvGrpSpPr>
+            <p:cNvPr id="14" name="组 13"/>
+            <p:cNvGrpSpPr/>
+            <p:nvPr/>
+          </p:nvGrpSpPr>
+          <p:grpSpPr>
+            <a:xfrm>
+              <a:off x="3707487" y="3885582"/>
+              <a:ext cx="4979313" cy="323831"/>
+              <a:chOff x="3563888" y="3720667"/>
+              <a:chExt cx="4979313" cy="323831"/>
+            </a:xfrm>
+          </p:grpSpPr>
+          <p:pic>
+            <p:nvPicPr>
+              <p:cNvPr id="12" name="图片 11"/>
+              <p:cNvPicPr>
+                <a:picLocks noChangeAspect="1"/>
+              </p:cNvPicPr>
+              <p:nvPr/>
+            </p:nvPicPr>
+            <p:blipFill rotWithShape="1">
+              <a:blip r:embed="rId2"/>
+              <a:srcRect r="1295"/>
+              <a:stretch/>
+            </p:blipFill>
+            <p:spPr>
+              <a:xfrm>
+                <a:off x="5838146" y="3720667"/>
+                <a:ext cx="2705055" cy="306143"/>
+              </a:xfrm>
+              <a:prstGeom prst="rect">
+                <a:avLst/>
+              </a:prstGeom>
+            </p:spPr>
+          </p:pic>
+          <p:pic>
+            <p:nvPicPr>
+              <p:cNvPr id="13" name="图片 12"/>
+              <p:cNvPicPr>
+                <a:picLocks noChangeAspect="1"/>
+              </p:cNvPicPr>
+              <p:nvPr/>
+            </p:nvPicPr>
+            <p:blipFill rotWithShape="1">
+              <a:blip r:embed="rId2"/>
+              <a:srcRect r="1295"/>
+              <a:stretch/>
+            </p:blipFill>
+            <p:spPr>
+              <a:xfrm>
+                <a:off x="3563888" y="3738355"/>
+                <a:ext cx="2705055" cy="306143"/>
+              </a:xfrm>
+              <a:prstGeom prst="rect">
+                <a:avLst/>
+              </a:prstGeom>
+            </p:spPr>
+          </p:pic>
+        </p:grpSp>
+        <p:sp>
+          <p:nvSpPr>
+            <p:cNvPr id="15" name="椭圆 14"/>
+            <p:cNvSpPr>
+              <a:spLocks noChangeAspect="1"/>
+            </p:cNvSpPr>
+            <p:nvPr/>
+          </p:nvSpPr>
+          <p:spPr>
+            <a:xfrm>
+              <a:off x="6300192" y="3998369"/>
+              <a:ext cx="112350" cy="108000"/>
+            </a:xfrm>
+            <a:prstGeom prst="ellipse">
+              <a:avLst/>
+            </a:prstGeom>
+          </p:spPr>
+          <p:style>
+            <a:lnRef idx="2">
+              <a:schemeClr val="accent1">
+                <a:shade val="50000"/>
+              </a:schemeClr>
+            </a:lnRef>
+            <a:fillRef idx="1">
+              <a:schemeClr val="accent1"/>
+            </a:fillRef>
+            <a:effectRef idx="0">
+              <a:schemeClr val="accent1"/>
+            </a:effectRef>
+            <a:fontRef idx="minor">
+              <a:schemeClr val="lt1"/>
+            </a:fontRef>
+          </p:style>
+          <p:txBody>
+            <a:bodyPr rtlCol="0" anchor="ctr"/>
+            <a:lstStyle/>
+            <a:p>
+              <a:pPr algn="ctr"/>
+              <a:endParaRPr kumimoji="1" lang="zh-CN" altLang="en-US"/>
+            </a:p>
+          </p:txBody>
+        </p:sp>
+        <p:sp>
+          <p:nvSpPr>
+            <p:cNvPr id="16" name="椭圆 15"/>
+            <p:cNvSpPr>
+              <a:spLocks noChangeAspect="1"/>
+            </p:cNvSpPr>
+            <p:nvPr/>
+          </p:nvSpPr>
+          <p:spPr>
+            <a:xfrm>
+              <a:off x="6444208" y="4083918"/>
+              <a:ext cx="74900" cy="72000"/>
+            </a:xfrm>
+            <a:prstGeom prst="ellipse">
+              <a:avLst/>
+            </a:prstGeom>
+            <a:solidFill>
+              <a:schemeClr val="bg1"/>
+            </a:solidFill>
+            <a:ln>
+              <a:noFill/>
+            </a:ln>
+          </p:spPr>
+          <p:style>
+            <a:lnRef idx="2">
+              <a:schemeClr val="accent1">
+                <a:shade val="50000"/>
+              </a:schemeClr>
+            </a:lnRef>
+            <a:fillRef idx="1">
+              <a:schemeClr val="accent1"/>
+            </a:fillRef>
+            <a:effectRef idx="0">
+              <a:schemeClr val="accent1"/>
+            </a:effectRef>
+            <a:fontRef idx="minor">
+              <a:schemeClr val="lt1"/>
+            </a:fontRef>
+          </p:style>
+          <p:txBody>
+            <a:bodyPr rtlCol="0" anchor="ctr"/>
+            <a:lstStyle/>
+            <a:p>
+              <a:pPr algn="ctr"/>
+              <a:endParaRPr kumimoji="1" lang="zh-CN" altLang="en-US"/>
+            </a:p>
+          </p:txBody>
+        </p:sp>
+        <p:sp>
+          <p:nvSpPr>
+            <p:cNvPr id="17" name="椭圆 16"/>
+            <p:cNvSpPr>
+              <a:spLocks noChangeAspect="1"/>
+            </p:cNvSpPr>
+            <p:nvPr/>
+          </p:nvSpPr>
+          <p:spPr>
+            <a:xfrm>
+              <a:off x="6585332" y="4155934"/>
+              <a:ext cx="74900" cy="72000"/>
+            </a:xfrm>
+            <a:prstGeom prst="ellipse">
+              <a:avLst/>
+            </a:prstGeom>
+            <a:solidFill>
+              <a:schemeClr val="bg1"/>
+            </a:solidFill>
+            <a:ln>
+              <a:noFill/>
+            </a:ln>
+          </p:spPr>
+          <p:style>
+            <a:lnRef idx="2">
+              <a:schemeClr val="accent1">
+                <a:shade val="50000"/>
+              </a:schemeClr>
+            </a:lnRef>
+            <a:fillRef idx="1">
+              <a:schemeClr val="accent1"/>
+            </a:fillRef>
+            <a:effectRef idx="0">
+              <a:schemeClr val="accent1"/>
+            </a:effectRef>
+            <a:fontRef idx="minor">
+              <a:schemeClr val="lt1"/>
+            </a:fontRef>
+          </p:style>
+          <p:txBody>
+            <a:bodyPr rtlCol="0" anchor="ctr"/>
+            <a:lstStyle/>
+            <a:p>
+              <a:pPr algn="ctr"/>
+              <a:endParaRPr kumimoji="1" lang="zh-CN" altLang="en-US"/>
+            </a:p>
+          </p:txBody>
+        </p:sp>
+        <p:sp>
+          <p:nvSpPr>
+            <p:cNvPr id="18" name="椭圆 17"/>
+            <p:cNvSpPr>
+              <a:spLocks noChangeAspect="1"/>
+            </p:cNvSpPr>
+            <p:nvPr/>
+          </p:nvSpPr>
+          <p:spPr>
+            <a:xfrm>
+              <a:off x="6729348" y="4083918"/>
+              <a:ext cx="74900" cy="72000"/>
+            </a:xfrm>
+            <a:prstGeom prst="ellipse">
+              <a:avLst/>
+            </a:prstGeom>
+            <a:solidFill>
+              <a:schemeClr val="bg1"/>
+            </a:solidFill>
+            <a:ln>
+              <a:noFill/>
+            </a:ln>
+          </p:spPr>
+          <p:style>
+            <a:lnRef idx="2">
+              <a:schemeClr val="accent1">
+                <a:shade val="50000"/>
+              </a:schemeClr>
+            </a:lnRef>
+            <a:fillRef idx="1">
+              <a:schemeClr val="accent1"/>
+            </a:fillRef>
+            <a:effectRef idx="0">
+              <a:schemeClr val="accent1"/>
+            </a:effectRef>
+            <a:fontRef idx="minor">
+              <a:schemeClr val="lt1"/>
+            </a:fontRef>
+          </p:style>
+          <p:txBody>
+            <a:bodyPr rtlCol="0" anchor="ctr"/>
+            <a:lstStyle/>
+            <a:p>
+              <a:pPr algn="ctr"/>
+              <a:endParaRPr kumimoji="1" lang="zh-CN" altLang="en-US"/>
+            </a:p>
+          </p:txBody>
+        </p:sp>
+        <p:sp>
+          <p:nvSpPr>
+            <p:cNvPr id="19" name="椭圆 18"/>
+            <p:cNvSpPr>
+              <a:spLocks noChangeAspect="1"/>
+            </p:cNvSpPr>
+            <p:nvPr/>
+          </p:nvSpPr>
+          <p:spPr>
+            <a:xfrm>
+              <a:off x="6873364" y="4011910"/>
+              <a:ext cx="74900" cy="72000"/>
+            </a:xfrm>
+            <a:prstGeom prst="ellipse">
+              <a:avLst/>
+            </a:prstGeom>
+            <a:solidFill>
+              <a:schemeClr val="bg1"/>
+            </a:solidFill>
+            <a:ln>
+              <a:noFill/>
+            </a:ln>
+          </p:spPr>
+          <p:style>
+            <a:lnRef idx="2">
+              <a:schemeClr val="accent1">
+                <a:shade val="50000"/>
+              </a:schemeClr>
+            </a:lnRef>
+            <a:fillRef idx="1">
+              <a:schemeClr val="accent1"/>
+            </a:fillRef>
+            <a:effectRef idx="0">
+              <a:schemeClr val="accent1"/>
+            </a:effectRef>
+            <a:fontRef idx="minor">
+              <a:schemeClr val="lt1"/>
+            </a:fontRef>
+          </p:style>
+          <p:txBody>
+            <a:bodyPr rtlCol="0" anchor="ctr"/>
+            <a:lstStyle/>
+            <a:p>
+              <a:pPr algn="ctr"/>
+              <a:endParaRPr kumimoji="1" lang="zh-CN" altLang="en-US"/>
+            </a:p>
+          </p:txBody>
+        </p:sp>
+        <p:sp>
+          <p:nvSpPr>
+            <p:cNvPr id="20" name="椭圆 19"/>
+            <p:cNvSpPr>
+              <a:spLocks noChangeAspect="1"/>
+            </p:cNvSpPr>
+            <p:nvPr/>
+          </p:nvSpPr>
+          <p:spPr>
+            <a:xfrm>
+              <a:off x="6225292" y="3939910"/>
+              <a:ext cx="74900" cy="72000"/>
+            </a:xfrm>
+            <a:prstGeom prst="ellipse">
+              <a:avLst/>
+            </a:prstGeom>
+            <a:solidFill>
+              <a:schemeClr val="bg1"/>
+            </a:solidFill>
+            <a:ln>
+              <a:noFill/>
+            </a:ln>
+          </p:spPr>
+          <p:style>
+            <a:lnRef idx="2">
+              <a:schemeClr val="accent1">
+                <a:shade val="50000"/>
+              </a:schemeClr>
+            </a:lnRef>
+            <a:fillRef idx="1">
+              <a:schemeClr val="accent1"/>
+            </a:fillRef>
+            <a:effectRef idx="0">
+              <a:schemeClr val="accent1"/>
+            </a:effectRef>
+            <a:fontRef idx="minor">
+              <a:schemeClr val="lt1"/>
+            </a:fontRef>
+          </p:style>
+          <p:txBody>
+            <a:bodyPr rtlCol="0" anchor="ctr"/>
+            <a:lstStyle/>
+            <a:p>
+              <a:pPr algn="ctr"/>
+              <a:endParaRPr kumimoji="1" lang="zh-CN" altLang="en-US"/>
+            </a:p>
+          </p:txBody>
+        </p:sp>
+        <p:sp>
+          <p:nvSpPr>
+            <p:cNvPr id="21" name="椭圆 20"/>
+            <p:cNvSpPr>
+              <a:spLocks noChangeAspect="1"/>
+            </p:cNvSpPr>
+            <p:nvPr/>
+          </p:nvSpPr>
+          <p:spPr>
+            <a:xfrm>
+              <a:off x="6081276" y="3867894"/>
+              <a:ext cx="74900" cy="72000"/>
+            </a:xfrm>
+            <a:prstGeom prst="ellipse">
+              <a:avLst/>
+            </a:prstGeom>
+            <a:solidFill>
+              <a:schemeClr val="bg1"/>
+            </a:solidFill>
+            <a:ln>
+              <a:noFill/>
+            </a:ln>
+          </p:spPr>
+          <p:style>
+            <a:lnRef idx="2">
+              <a:schemeClr val="accent1">
+                <a:shade val="50000"/>
+              </a:schemeClr>
+            </a:lnRef>
+            <a:fillRef idx="1">
+              <a:schemeClr val="accent1"/>
+            </a:fillRef>
+            <a:effectRef idx="0">
+              <a:schemeClr val="accent1"/>
+            </a:effectRef>
+            <a:fontRef idx="minor">
+              <a:schemeClr val="lt1"/>
+            </a:fontRef>
+          </p:style>
+          <p:txBody>
+            <a:bodyPr rtlCol="0" anchor="ctr"/>
+            <a:lstStyle/>
+            <a:p>
+              <a:pPr algn="ctr"/>
+              <a:endParaRPr kumimoji="1" lang="zh-CN" altLang="en-US"/>
+            </a:p>
+          </p:txBody>
+        </p:sp>
+        <p:sp>
+          <p:nvSpPr>
+            <p:cNvPr id="22" name="椭圆 21"/>
+            <p:cNvSpPr>
+              <a:spLocks noChangeAspect="1"/>
+            </p:cNvSpPr>
+            <p:nvPr/>
+          </p:nvSpPr>
+          <p:spPr>
+            <a:xfrm>
+              <a:off x="5940152" y="3939902"/>
+              <a:ext cx="74900" cy="72000"/>
+            </a:xfrm>
+            <a:prstGeom prst="ellipse">
+              <a:avLst/>
+            </a:prstGeom>
+            <a:solidFill>
+              <a:schemeClr val="bg1"/>
+            </a:solidFill>
+            <a:ln>
+              <a:noFill/>
+            </a:ln>
+          </p:spPr>
+          <p:style>
+            <a:lnRef idx="2">
+              <a:schemeClr val="accent1">
+                <a:shade val="50000"/>
+              </a:schemeClr>
+            </a:lnRef>
+            <a:fillRef idx="1">
+              <a:schemeClr val="accent1"/>
+            </a:fillRef>
+            <a:effectRef idx="0">
+              <a:schemeClr val="accent1"/>
+            </a:effectRef>
+            <a:fontRef idx="minor">
+              <a:schemeClr val="lt1"/>
+            </a:fontRef>
+          </p:style>
+          <p:txBody>
+            <a:bodyPr rtlCol="0" anchor="ctr"/>
+            <a:lstStyle/>
+            <a:p>
+              <a:pPr algn="ctr"/>
+              <a:endParaRPr kumimoji="1" lang="zh-CN" altLang="en-US"/>
+            </a:p>
+          </p:txBody>
+        </p:sp>
+        <p:sp>
+          <p:nvSpPr>
+            <p:cNvPr id="23" name="椭圆 22"/>
+            <p:cNvSpPr>
+              <a:spLocks noChangeAspect="1"/>
+            </p:cNvSpPr>
+            <p:nvPr/>
+          </p:nvSpPr>
+          <p:spPr>
+            <a:xfrm>
+              <a:off x="5796136" y="4011918"/>
+              <a:ext cx="74900" cy="72000"/>
+            </a:xfrm>
+            <a:prstGeom prst="ellipse">
+              <a:avLst/>
+            </a:prstGeom>
+            <a:solidFill>
+              <a:schemeClr val="bg1"/>
+            </a:solidFill>
+            <a:ln>
+              <a:noFill/>
+            </a:ln>
+          </p:spPr>
+          <p:style>
+            <a:lnRef idx="2">
+              <a:schemeClr val="accent1">
+                <a:shade val="50000"/>
+              </a:schemeClr>
+            </a:lnRef>
+            <a:fillRef idx="1">
+              <a:schemeClr val="accent1"/>
+            </a:fillRef>
+            <a:effectRef idx="0">
+              <a:schemeClr val="accent1"/>
+            </a:effectRef>
+            <a:fontRef idx="minor">
+              <a:schemeClr val="lt1"/>
+            </a:fontRef>
+          </p:style>
+          <p:txBody>
+            <a:bodyPr rtlCol="0" anchor="ctr"/>
+            <a:lstStyle/>
+            <a:p>
+              <a:pPr algn="ctr"/>
+              <a:endParaRPr kumimoji="1" lang="zh-CN" altLang="en-US"/>
+            </a:p>
+          </p:txBody>
+        </p:sp>
+        <p:sp>
+          <p:nvSpPr>
+            <p:cNvPr id="26" name="任意形状 25"/>
+            <p:cNvSpPr/>
+            <p:nvPr/>
+          </p:nvSpPr>
+          <p:spPr>
+            <a:xfrm>
+              <a:off x="5802733" y="3252266"/>
+              <a:ext cx="1156592" cy="805693"/>
+            </a:xfrm>
+            <a:custGeom>
+              <a:avLst/>
+              <a:gdLst>
+                <a:gd name="connsiteX0" fmla="*/ 1156592 w 1156592"/>
+                <a:gd name="connsiteY0" fmla="*/ 780979 h 805693"/>
+                <a:gd name="connsiteX1" fmla="*/ 583239 w 1156592"/>
+                <a:gd name="connsiteY1" fmla="*/ 32 h 805693"/>
+                <a:gd name="connsiteX2" fmla="*/ 0 w 1156592"/>
+                <a:gd name="connsiteY2" fmla="*/ 805693 h 805693"/>
+              </a:gdLst>
+              <a:ahLst/>
+              <a:cxnLst>
+                <a:cxn ang="0">
+                  <a:pos x="connsiteX0" y="connsiteY0"/>
+                </a:cxn>
+                <a:cxn ang="0">
+                  <a:pos x="connsiteX1" y="connsiteY1"/>
+                </a:cxn>
+                <a:cxn ang="0">
+                  <a:pos x="connsiteX2" y="connsiteY2"/>
+                </a:cxn>
+              </a:cxnLst>
+              <a:rect l="l" t="t" r="r" b="b"/>
+              <a:pathLst>
+                <a:path w="1156592" h="805693">
+                  <a:moveTo>
+                    <a:pt x="1156592" y="780979"/>
+                  </a:moveTo>
+                  <a:cubicBezTo>
+                    <a:pt x="966298" y="388446"/>
+                    <a:pt x="776004" y="-4087"/>
+                    <a:pt x="583239" y="32"/>
+                  </a:cubicBezTo>
+                  <a:cubicBezTo>
+                    <a:pt x="390474" y="4151"/>
+                    <a:pt x="93911" y="671416"/>
+                    <a:pt x="0" y="805693"/>
+                  </a:cubicBezTo>
+                </a:path>
+              </a:pathLst>
+            </a:custGeom>
+            <a:noFill/>
+            <a:ln w="9525">
+              <a:solidFill>
+                <a:srgbClr val="FF0000"/>
+              </a:solidFill>
+            </a:ln>
+          </p:spPr>
+          <p:style>
+            <a:lnRef idx="2">
+              <a:schemeClr val="accent1">
+                <a:shade val="50000"/>
+              </a:schemeClr>
+            </a:lnRef>
+            <a:fillRef idx="1">
+              <a:schemeClr val="accent1"/>
+            </a:fillRef>
+            <a:effectRef idx="0">
+              <a:schemeClr val="accent1"/>
+            </a:effectRef>
+            <a:fontRef idx="minor">
+              <a:schemeClr val="lt1"/>
+            </a:fontRef>
+          </p:style>
+          <p:txBody>
+            <a:bodyPr rtlCol="0" anchor="ctr"/>
+            <a:lstStyle/>
+            <a:p>
+              <a:pPr algn="ctr"/>
+              <a:endParaRPr kumimoji="1" lang="zh-CN" altLang="en-US"/>
+            </a:p>
+          </p:txBody>
+        </p:sp>
+      </p:grpSp>
     </p:spTree>
     <p:extLst>
       <p:ext uri="{BB962C8B-B14F-4D97-AF65-F5344CB8AC3E}">
-        <p14:creationId xmlns:p14="http://schemas.microsoft.com/office/powerpoint/2010/main" val="1518543636"/>
+        <p14:creationId xmlns:p14="http://schemas.microsoft.com/office/powerpoint/2010/main" val="755470392"/>
       </p:ext>
     </p:extLst>
   </p:cSld>
   <p:clrMapOvr>
     <a:masterClrMapping/>
   </p:clrMapOvr>
+  <p:timing>
+    <p:tnLst>
+      <p:par>
+        <p:cTn id="1" dur="indefinite" restart="never" nodeType="tmRoot"/>
+      </p:par>
+    </p:tnLst>
+  </p:timing>
 </p:sld>
 </file>
 

</xml_diff>